<commit_message>
new ppt and rmd
</commit_message>
<xml_diff>
--- a/Beers_and_Breweries.pptx
+++ b/Beers_and_Breweries.pptx
@@ -4,6 +4,9 @@
   <p:sldMasterIdLst>
     <p:sldMasterId id="2147483648" r:id="rId1"/>
   </p:sldMasterIdLst>
+  <p:notesMasterIdLst>
+    <p:notesMasterId r:id="rId23"/>
+  </p:notesMasterIdLst>
   <p:sldIdLst>
     <p:sldId id="256" r:id="rId2"/>
     <p:sldId id="257" r:id="rId3"/>
@@ -24,7 +27,8 @@
     <p:sldId id="261" r:id="rId18"/>
     <p:sldId id="262" r:id="rId19"/>
     <p:sldId id="276" r:id="rId20"/>
-    <p:sldId id="277" r:id="rId21"/>
+    <p:sldId id="278" r:id="rId21"/>
+    <p:sldId id="277" r:id="rId22"/>
   </p:sldIdLst>
   <p:sldSz cx="12192000" cy="6858000"/>
   <p:notesSz cx="6858000" cy="9144000"/>
@@ -131,6 +135,1944 @@
 </p:presentation>
 </file>
 
+<file path=ppt/notesMasters/notesMaster1.xml><?xml version="1.0" encoding="utf-8"?>
+<p:notesMaster xmlns:a="http://schemas.openxmlformats.org/drawingml/2006/main" xmlns:r="http://schemas.openxmlformats.org/officeDocument/2006/relationships" xmlns:p="http://schemas.openxmlformats.org/presentationml/2006/main">
+  <p:cSld>
+    <p:bg>
+      <p:bgRef idx="1001">
+        <a:schemeClr val="bg1"/>
+      </p:bgRef>
+    </p:bg>
+    <p:spTree>
+      <p:nvGrpSpPr>
+        <p:cNvPr id="1" name=""/>
+        <p:cNvGrpSpPr/>
+        <p:nvPr/>
+      </p:nvGrpSpPr>
+      <p:grpSpPr>
+        <a:xfrm>
+          <a:off x="0" y="0"/>
+          <a:ext cx="0" cy="0"/>
+          <a:chOff x="0" y="0"/>
+          <a:chExt cx="0" cy="0"/>
+        </a:xfrm>
+      </p:grpSpPr>
+      <p:sp>
+        <p:nvSpPr>
+          <p:cNvPr id="2" name="Header Placeholder 1"/>
+          <p:cNvSpPr>
+            <a:spLocks noGrp="1"/>
+          </p:cNvSpPr>
+          <p:nvPr>
+            <p:ph type="hdr" sz="quarter"/>
+          </p:nvPr>
+        </p:nvSpPr>
+        <p:spPr>
+          <a:xfrm>
+            <a:off x="0" y="0"/>
+            <a:ext cx="2971800" cy="458788"/>
+          </a:xfrm>
+          <a:prstGeom prst="rect">
+            <a:avLst/>
+          </a:prstGeom>
+        </p:spPr>
+        <p:txBody>
+          <a:bodyPr vert="horz" lIns="91440" tIns="45720" rIns="91440" bIns="45720" rtlCol="0"/>
+          <a:lstStyle>
+            <a:lvl1pPr algn="l">
+              <a:defRPr sz="1200"/>
+            </a:lvl1pPr>
+          </a:lstStyle>
+          <a:p>
+            <a:endParaRPr lang="en-US"/>
+          </a:p>
+        </p:txBody>
+      </p:sp>
+      <p:sp>
+        <p:nvSpPr>
+          <p:cNvPr id="3" name="Date Placeholder 2"/>
+          <p:cNvSpPr>
+            <a:spLocks noGrp="1"/>
+          </p:cNvSpPr>
+          <p:nvPr>
+            <p:ph type="dt" idx="1"/>
+          </p:nvPr>
+        </p:nvSpPr>
+        <p:spPr>
+          <a:xfrm>
+            <a:off x="3884613" y="0"/>
+            <a:ext cx="2971800" cy="458788"/>
+          </a:xfrm>
+          <a:prstGeom prst="rect">
+            <a:avLst/>
+          </a:prstGeom>
+        </p:spPr>
+        <p:txBody>
+          <a:bodyPr vert="horz" lIns="91440" tIns="45720" rIns="91440" bIns="45720" rtlCol="0"/>
+          <a:lstStyle>
+            <a:lvl1pPr algn="r">
+              <a:defRPr sz="1200"/>
+            </a:lvl1pPr>
+          </a:lstStyle>
+          <a:p>
+            <a:fld id="{99C1D520-A1CA-4161-B5D5-FF1CB1424987}" type="datetimeFigureOut">
+              <a:rPr lang="en-US" smtClean="0"/>
+              <a:t>2/23/2021</a:t>
+            </a:fld>
+            <a:endParaRPr lang="en-US"/>
+          </a:p>
+        </p:txBody>
+      </p:sp>
+      <p:sp>
+        <p:nvSpPr>
+          <p:cNvPr id="4" name="Slide Image Placeholder 3"/>
+          <p:cNvSpPr>
+            <a:spLocks noGrp="1" noRot="1" noChangeAspect="1"/>
+          </p:cNvSpPr>
+          <p:nvPr>
+            <p:ph type="sldImg" idx="2"/>
+          </p:nvPr>
+        </p:nvSpPr>
+        <p:spPr>
+          <a:xfrm>
+            <a:off x="685800" y="1143000"/>
+            <a:ext cx="5486400" cy="3086100"/>
+          </a:xfrm>
+          <a:prstGeom prst="rect">
+            <a:avLst/>
+          </a:prstGeom>
+          <a:noFill/>
+          <a:ln w="12700">
+            <a:solidFill>
+              <a:prstClr val="black"/>
+            </a:solidFill>
+          </a:ln>
+        </p:spPr>
+        <p:txBody>
+          <a:bodyPr vert="horz" lIns="91440" tIns="45720" rIns="91440" bIns="45720" rtlCol="0" anchor="ctr"/>
+          <a:lstStyle/>
+          <a:p>
+            <a:endParaRPr lang="en-US"/>
+          </a:p>
+        </p:txBody>
+      </p:sp>
+      <p:sp>
+        <p:nvSpPr>
+          <p:cNvPr id="5" name="Notes Placeholder 4"/>
+          <p:cNvSpPr>
+            <a:spLocks noGrp="1"/>
+          </p:cNvSpPr>
+          <p:nvPr>
+            <p:ph type="body" sz="quarter" idx="3"/>
+          </p:nvPr>
+        </p:nvSpPr>
+        <p:spPr>
+          <a:xfrm>
+            <a:off x="685800" y="4400550"/>
+            <a:ext cx="5486400" cy="3600450"/>
+          </a:xfrm>
+          <a:prstGeom prst="rect">
+            <a:avLst/>
+          </a:prstGeom>
+        </p:spPr>
+        <p:txBody>
+          <a:bodyPr vert="horz" lIns="91440" tIns="45720" rIns="91440" bIns="45720" rtlCol="0"/>
+          <a:lstStyle/>
+          <a:p>
+            <a:pPr lvl="0"/>
+            <a:r>
+              <a:rPr lang="en-US"/>
+              <a:t>Click to edit Master text styles</a:t>
+            </a:r>
+          </a:p>
+          <a:p>
+            <a:pPr lvl="1"/>
+            <a:r>
+              <a:rPr lang="en-US"/>
+              <a:t>Second level</a:t>
+            </a:r>
+          </a:p>
+          <a:p>
+            <a:pPr lvl="2"/>
+            <a:r>
+              <a:rPr lang="en-US"/>
+              <a:t>Third level</a:t>
+            </a:r>
+          </a:p>
+          <a:p>
+            <a:pPr lvl="3"/>
+            <a:r>
+              <a:rPr lang="en-US"/>
+              <a:t>Fourth level</a:t>
+            </a:r>
+          </a:p>
+          <a:p>
+            <a:pPr lvl="4"/>
+            <a:r>
+              <a:rPr lang="en-US"/>
+              <a:t>Fifth level</a:t>
+            </a:r>
+          </a:p>
+        </p:txBody>
+      </p:sp>
+      <p:sp>
+        <p:nvSpPr>
+          <p:cNvPr id="6" name="Footer Placeholder 5"/>
+          <p:cNvSpPr>
+            <a:spLocks noGrp="1"/>
+          </p:cNvSpPr>
+          <p:nvPr>
+            <p:ph type="ftr" sz="quarter" idx="4"/>
+          </p:nvPr>
+        </p:nvSpPr>
+        <p:spPr>
+          <a:xfrm>
+            <a:off x="0" y="8685213"/>
+            <a:ext cx="2971800" cy="458787"/>
+          </a:xfrm>
+          <a:prstGeom prst="rect">
+            <a:avLst/>
+          </a:prstGeom>
+        </p:spPr>
+        <p:txBody>
+          <a:bodyPr vert="horz" lIns="91440" tIns="45720" rIns="91440" bIns="45720" rtlCol="0" anchor="b"/>
+          <a:lstStyle>
+            <a:lvl1pPr algn="l">
+              <a:defRPr sz="1200"/>
+            </a:lvl1pPr>
+          </a:lstStyle>
+          <a:p>
+            <a:endParaRPr lang="en-US"/>
+          </a:p>
+        </p:txBody>
+      </p:sp>
+      <p:sp>
+        <p:nvSpPr>
+          <p:cNvPr id="7" name="Slide Number Placeholder 6"/>
+          <p:cNvSpPr>
+            <a:spLocks noGrp="1"/>
+          </p:cNvSpPr>
+          <p:nvPr>
+            <p:ph type="sldNum" sz="quarter" idx="5"/>
+          </p:nvPr>
+        </p:nvSpPr>
+        <p:spPr>
+          <a:xfrm>
+            <a:off x="3884613" y="8685213"/>
+            <a:ext cx="2971800" cy="458787"/>
+          </a:xfrm>
+          <a:prstGeom prst="rect">
+            <a:avLst/>
+          </a:prstGeom>
+        </p:spPr>
+        <p:txBody>
+          <a:bodyPr vert="horz" lIns="91440" tIns="45720" rIns="91440" bIns="45720" rtlCol="0" anchor="b"/>
+          <a:lstStyle>
+            <a:lvl1pPr algn="r">
+              <a:defRPr sz="1200"/>
+            </a:lvl1pPr>
+          </a:lstStyle>
+          <a:p>
+            <a:fld id="{501499A2-1326-4FB0-82A2-456B0524BFAF}" type="slidenum">
+              <a:rPr lang="en-US" smtClean="0"/>
+              <a:t>‹#›</a:t>
+            </a:fld>
+            <a:endParaRPr lang="en-US"/>
+          </a:p>
+        </p:txBody>
+      </p:sp>
+    </p:spTree>
+    <p:extLst>
+      <p:ext uri="{BB962C8B-B14F-4D97-AF65-F5344CB8AC3E}">
+        <p14:creationId xmlns:p14="http://schemas.microsoft.com/office/powerpoint/2010/main" val="3854553393"/>
+      </p:ext>
+    </p:extLst>
+  </p:cSld>
+  <p:clrMap bg1="lt1" tx1="dk1" bg2="lt2" tx2="dk2" accent1="accent1" accent2="accent2" accent3="accent3" accent4="accent4" accent5="accent5" accent6="accent6" hlink="hlink" folHlink="folHlink"/>
+  <p:notesStyle>
+    <a:lvl1pPr marL="0" algn="l" defTabSz="914400" rtl="0" eaLnBrk="1" latinLnBrk="0" hangingPunct="1">
+      <a:defRPr sz="1200" kern="1200">
+        <a:solidFill>
+          <a:schemeClr val="tx1"/>
+        </a:solidFill>
+        <a:latin typeface="+mn-lt"/>
+        <a:ea typeface="+mn-ea"/>
+        <a:cs typeface="+mn-cs"/>
+      </a:defRPr>
+    </a:lvl1pPr>
+    <a:lvl2pPr marL="457200" algn="l" defTabSz="914400" rtl="0" eaLnBrk="1" latinLnBrk="0" hangingPunct="1">
+      <a:defRPr sz="1200" kern="1200">
+        <a:solidFill>
+          <a:schemeClr val="tx1"/>
+        </a:solidFill>
+        <a:latin typeface="+mn-lt"/>
+        <a:ea typeface="+mn-ea"/>
+        <a:cs typeface="+mn-cs"/>
+      </a:defRPr>
+    </a:lvl2pPr>
+    <a:lvl3pPr marL="914400" algn="l" defTabSz="914400" rtl="0" eaLnBrk="1" latinLnBrk="0" hangingPunct="1">
+      <a:defRPr sz="1200" kern="1200">
+        <a:solidFill>
+          <a:schemeClr val="tx1"/>
+        </a:solidFill>
+        <a:latin typeface="+mn-lt"/>
+        <a:ea typeface="+mn-ea"/>
+        <a:cs typeface="+mn-cs"/>
+      </a:defRPr>
+    </a:lvl3pPr>
+    <a:lvl4pPr marL="1371600" algn="l" defTabSz="914400" rtl="0" eaLnBrk="1" latinLnBrk="0" hangingPunct="1">
+      <a:defRPr sz="1200" kern="1200">
+        <a:solidFill>
+          <a:schemeClr val="tx1"/>
+        </a:solidFill>
+        <a:latin typeface="+mn-lt"/>
+        <a:ea typeface="+mn-ea"/>
+        <a:cs typeface="+mn-cs"/>
+      </a:defRPr>
+    </a:lvl4pPr>
+    <a:lvl5pPr marL="1828800" algn="l" defTabSz="914400" rtl="0" eaLnBrk="1" latinLnBrk="0" hangingPunct="1">
+      <a:defRPr sz="1200" kern="1200">
+        <a:solidFill>
+          <a:schemeClr val="tx1"/>
+        </a:solidFill>
+        <a:latin typeface="+mn-lt"/>
+        <a:ea typeface="+mn-ea"/>
+        <a:cs typeface="+mn-cs"/>
+      </a:defRPr>
+    </a:lvl5pPr>
+    <a:lvl6pPr marL="2286000" algn="l" defTabSz="914400" rtl="0" eaLnBrk="1" latinLnBrk="0" hangingPunct="1">
+      <a:defRPr sz="1200" kern="1200">
+        <a:solidFill>
+          <a:schemeClr val="tx1"/>
+        </a:solidFill>
+        <a:latin typeface="+mn-lt"/>
+        <a:ea typeface="+mn-ea"/>
+        <a:cs typeface="+mn-cs"/>
+      </a:defRPr>
+    </a:lvl6pPr>
+    <a:lvl7pPr marL="2743200" algn="l" defTabSz="914400" rtl="0" eaLnBrk="1" latinLnBrk="0" hangingPunct="1">
+      <a:defRPr sz="1200" kern="1200">
+        <a:solidFill>
+          <a:schemeClr val="tx1"/>
+        </a:solidFill>
+        <a:latin typeface="+mn-lt"/>
+        <a:ea typeface="+mn-ea"/>
+        <a:cs typeface="+mn-cs"/>
+      </a:defRPr>
+    </a:lvl7pPr>
+    <a:lvl8pPr marL="3200400" algn="l" defTabSz="914400" rtl="0" eaLnBrk="1" latinLnBrk="0" hangingPunct="1">
+      <a:defRPr sz="1200" kern="1200">
+        <a:solidFill>
+          <a:schemeClr val="tx1"/>
+        </a:solidFill>
+        <a:latin typeface="+mn-lt"/>
+        <a:ea typeface="+mn-ea"/>
+        <a:cs typeface="+mn-cs"/>
+      </a:defRPr>
+    </a:lvl8pPr>
+    <a:lvl9pPr marL="3657600" algn="l" defTabSz="914400" rtl="0" eaLnBrk="1" latinLnBrk="0" hangingPunct="1">
+      <a:defRPr sz="1200" kern="1200">
+        <a:solidFill>
+          <a:schemeClr val="tx1"/>
+        </a:solidFill>
+        <a:latin typeface="+mn-lt"/>
+        <a:ea typeface="+mn-ea"/>
+        <a:cs typeface="+mn-cs"/>
+      </a:defRPr>
+    </a:lvl9pPr>
+  </p:notesStyle>
+</p:notesMaster>
+</file>
+
+<file path=ppt/notesSlides/notesSlide1.xml><?xml version="1.0" encoding="utf-8"?>
+<p:notes xmlns:a="http://schemas.openxmlformats.org/drawingml/2006/main" xmlns:r="http://schemas.openxmlformats.org/officeDocument/2006/relationships" xmlns:p="http://schemas.openxmlformats.org/presentationml/2006/main">
+  <p:cSld>
+    <p:spTree>
+      <p:nvGrpSpPr>
+        <p:cNvPr id="1" name=""/>
+        <p:cNvGrpSpPr/>
+        <p:nvPr/>
+      </p:nvGrpSpPr>
+      <p:grpSpPr>
+        <a:xfrm>
+          <a:off x="0" y="0"/>
+          <a:ext cx="0" cy="0"/>
+          <a:chOff x="0" y="0"/>
+          <a:chExt cx="0" cy="0"/>
+        </a:xfrm>
+      </p:grpSpPr>
+      <p:sp>
+        <p:nvSpPr>
+          <p:cNvPr id="2" name="Slide Image Placeholder 1"/>
+          <p:cNvSpPr>
+            <a:spLocks noGrp="1" noRot="1" noChangeAspect="1"/>
+          </p:cNvSpPr>
+          <p:nvPr>
+            <p:ph type="sldImg"/>
+          </p:nvPr>
+        </p:nvSpPr>
+        <p:spPr/>
+      </p:sp>
+      <p:sp>
+        <p:nvSpPr>
+          <p:cNvPr id="3" name="Notes Placeholder 2"/>
+          <p:cNvSpPr>
+            <a:spLocks noGrp="1"/>
+          </p:cNvSpPr>
+          <p:nvPr>
+            <p:ph type="body" idx="1"/>
+          </p:nvPr>
+        </p:nvSpPr>
+        <p:spPr/>
+        <p:txBody>
+          <a:bodyPr/>
+          <a:lstStyle/>
+          <a:p>
+            <a:r>
+              <a:rPr lang="en-US" dirty="0"/>
+              <a:t>Good evening, voice inflection, Name introduction,</a:t>
+            </a:r>
+          </a:p>
+          <a:p>
+            <a:endParaRPr lang="en-US" dirty="0"/>
+          </a:p>
+        </p:txBody>
+      </p:sp>
+      <p:sp>
+        <p:nvSpPr>
+          <p:cNvPr id="4" name="Slide Number Placeholder 3"/>
+          <p:cNvSpPr>
+            <a:spLocks noGrp="1"/>
+          </p:cNvSpPr>
+          <p:nvPr>
+            <p:ph type="sldNum" sz="quarter" idx="5"/>
+          </p:nvPr>
+        </p:nvSpPr>
+        <p:spPr/>
+        <p:txBody>
+          <a:bodyPr/>
+          <a:lstStyle/>
+          <a:p>
+            <a:fld id="{501499A2-1326-4FB0-82A2-456B0524BFAF}" type="slidenum">
+              <a:rPr lang="en-US" smtClean="0"/>
+              <a:t>1</a:t>
+            </a:fld>
+            <a:endParaRPr lang="en-US"/>
+          </a:p>
+        </p:txBody>
+      </p:sp>
+    </p:spTree>
+    <p:extLst>
+      <p:ext uri="{BB962C8B-B14F-4D97-AF65-F5344CB8AC3E}">
+        <p14:creationId xmlns:p14="http://schemas.microsoft.com/office/powerpoint/2010/main" val="1015611513"/>
+      </p:ext>
+    </p:extLst>
+  </p:cSld>
+  <p:clrMapOvr>
+    <a:masterClrMapping/>
+  </p:clrMapOvr>
+</p:notes>
+</file>
+
+<file path=ppt/notesSlides/notesSlide10.xml><?xml version="1.0" encoding="utf-8"?>
+<p:notes xmlns:a="http://schemas.openxmlformats.org/drawingml/2006/main" xmlns:r="http://schemas.openxmlformats.org/officeDocument/2006/relationships" xmlns:p="http://schemas.openxmlformats.org/presentationml/2006/main">
+  <p:cSld>
+    <p:spTree>
+      <p:nvGrpSpPr>
+        <p:cNvPr id="1" name=""/>
+        <p:cNvGrpSpPr/>
+        <p:nvPr/>
+      </p:nvGrpSpPr>
+      <p:grpSpPr>
+        <a:xfrm>
+          <a:off x="0" y="0"/>
+          <a:ext cx="0" cy="0"/>
+          <a:chOff x="0" y="0"/>
+          <a:chExt cx="0" cy="0"/>
+        </a:xfrm>
+      </p:grpSpPr>
+      <p:sp>
+        <p:nvSpPr>
+          <p:cNvPr id="2" name="Slide Image Placeholder 1"/>
+          <p:cNvSpPr>
+            <a:spLocks noGrp="1" noRot="1" noChangeAspect="1"/>
+          </p:cNvSpPr>
+          <p:nvPr>
+            <p:ph type="sldImg"/>
+          </p:nvPr>
+        </p:nvSpPr>
+        <p:spPr/>
+      </p:sp>
+      <p:sp>
+        <p:nvSpPr>
+          <p:cNvPr id="3" name="Notes Placeholder 2"/>
+          <p:cNvSpPr>
+            <a:spLocks noGrp="1"/>
+          </p:cNvSpPr>
+          <p:nvPr>
+            <p:ph type="body" idx="1"/>
+          </p:nvPr>
+        </p:nvSpPr>
+        <p:spPr/>
+        <p:txBody>
+          <a:bodyPr/>
+          <a:lstStyle/>
+          <a:p>
+            <a:r>
+              <a:rPr lang="en-US" dirty="0"/>
+              <a:t>New Mexico has the minimum IBU median and West Virginia has the max median IBU.  </a:t>
+            </a:r>
+          </a:p>
+        </p:txBody>
+      </p:sp>
+      <p:sp>
+        <p:nvSpPr>
+          <p:cNvPr id="4" name="Slide Number Placeholder 3"/>
+          <p:cNvSpPr>
+            <a:spLocks noGrp="1"/>
+          </p:cNvSpPr>
+          <p:nvPr>
+            <p:ph type="sldNum" sz="quarter" idx="5"/>
+          </p:nvPr>
+        </p:nvSpPr>
+        <p:spPr/>
+        <p:txBody>
+          <a:bodyPr/>
+          <a:lstStyle/>
+          <a:p>
+            <a:fld id="{501499A2-1326-4FB0-82A2-456B0524BFAF}" type="slidenum">
+              <a:rPr lang="en-US" smtClean="0"/>
+              <a:t>13</a:t>
+            </a:fld>
+            <a:endParaRPr lang="en-US"/>
+          </a:p>
+        </p:txBody>
+      </p:sp>
+    </p:spTree>
+    <p:extLst>
+      <p:ext uri="{BB962C8B-B14F-4D97-AF65-F5344CB8AC3E}">
+        <p14:creationId xmlns:p14="http://schemas.microsoft.com/office/powerpoint/2010/main" val="329350997"/>
+      </p:ext>
+    </p:extLst>
+  </p:cSld>
+  <p:clrMapOvr>
+    <a:masterClrMapping/>
+  </p:clrMapOvr>
+</p:notes>
+</file>
+
+<file path=ppt/notesSlides/notesSlide11.xml><?xml version="1.0" encoding="utf-8"?>
+<p:notes xmlns:a="http://schemas.openxmlformats.org/drawingml/2006/main" xmlns:r="http://schemas.openxmlformats.org/officeDocument/2006/relationships" xmlns:p="http://schemas.openxmlformats.org/presentationml/2006/main">
+  <p:cSld>
+    <p:spTree>
+      <p:nvGrpSpPr>
+        <p:cNvPr id="1" name=""/>
+        <p:cNvGrpSpPr/>
+        <p:nvPr/>
+      </p:nvGrpSpPr>
+      <p:grpSpPr>
+        <a:xfrm>
+          <a:off x="0" y="0"/>
+          <a:ext cx="0" cy="0"/>
+          <a:chOff x="0" y="0"/>
+          <a:chExt cx="0" cy="0"/>
+        </a:xfrm>
+      </p:grpSpPr>
+      <p:sp>
+        <p:nvSpPr>
+          <p:cNvPr id="2" name="Slide Image Placeholder 1"/>
+          <p:cNvSpPr>
+            <a:spLocks noGrp="1" noRot="1" noChangeAspect="1"/>
+          </p:cNvSpPr>
+          <p:nvPr>
+            <p:ph type="sldImg"/>
+          </p:nvPr>
+        </p:nvSpPr>
+        <p:spPr/>
+      </p:sp>
+      <p:sp>
+        <p:nvSpPr>
+          <p:cNvPr id="3" name="Notes Placeholder 2"/>
+          <p:cNvSpPr>
+            <a:spLocks noGrp="1"/>
+          </p:cNvSpPr>
+          <p:nvPr>
+            <p:ph type="body" idx="1"/>
+          </p:nvPr>
+        </p:nvSpPr>
+        <p:spPr/>
+        <p:txBody>
+          <a:bodyPr/>
+          <a:lstStyle/>
+          <a:p>
+            <a:r>
+              <a:rPr lang="en-US" dirty="0"/>
+              <a:t>Maybe this is not a surprise since there are 40+ breweries in CO</a:t>
+            </a:r>
+          </a:p>
+          <a:p>
+            <a:endParaRPr lang="en-US" dirty="0"/>
+          </a:p>
+        </p:txBody>
+      </p:sp>
+      <p:sp>
+        <p:nvSpPr>
+          <p:cNvPr id="4" name="Slide Number Placeholder 3"/>
+          <p:cNvSpPr>
+            <a:spLocks noGrp="1"/>
+          </p:cNvSpPr>
+          <p:nvPr>
+            <p:ph type="sldNum" sz="quarter" idx="5"/>
+          </p:nvPr>
+        </p:nvSpPr>
+        <p:spPr/>
+        <p:txBody>
+          <a:bodyPr/>
+          <a:lstStyle/>
+          <a:p>
+            <a:fld id="{501499A2-1326-4FB0-82A2-456B0524BFAF}" type="slidenum">
+              <a:rPr lang="en-US" smtClean="0"/>
+              <a:t>14</a:t>
+            </a:fld>
+            <a:endParaRPr lang="en-US"/>
+          </a:p>
+        </p:txBody>
+      </p:sp>
+    </p:spTree>
+    <p:extLst>
+      <p:ext uri="{BB962C8B-B14F-4D97-AF65-F5344CB8AC3E}">
+        <p14:creationId xmlns:p14="http://schemas.microsoft.com/office/powerpoint/2010/main" val="3853197354"/>
+      </p:ext>
+    </p:extLst>
+  </p:cSld>
+  <p:clrMapOvr>
+    <a:masterClrMapping/>
+  </p:clrMapOvr>
+</p:notes>
+</file>
+
+<file path=ppt/notesSlides/notesSlide12.xml><?xml version="1.0" encoding="utf-8"?>
+<p:notes xmlns:a="http://schemas.openxmlformats.org/drawingml/2006/main" xmlns:r="http://schemas.openxmlformats.org/officeDocument/2006/relationships" xmlns:p="http://schemas.openxmlformats.org/presentationml/2006/main">
+  <p:cSld>
+    <p:spTree>
+      <p:nvGrpSpPr>
+        <p:cNvPr id="1" name=""/>
+        <p:cNvGrpSpPr/>
+        <p:nvPr/>
+      </p:nvGrpSpPr>
+      <p:grpSpPr>
+        <a:xfrm>
+          <a:off x="0" y="0"/>
+          <a:ext cx="0" cy="0"/>
+          <a:chOff x="0" y="0"/>
+          <a:chExt cx="0" cy="0"/>
+        </a:xfrm>
+      </p:grpSpPr>
+      <p:sp>
+        <p:nvSpPr>
+          <p:cNvPr id="2" name="Slide Image Placeholder 1"/>
+          <p:cNvSpPr>
+            <a:spLocks noGrp="1" noRot="1" noChangeAspect="1"/>
+          </p:cNvSpPr>
+          <p:nvPr>
+            <p:ph type="sldImg"/>
+          </p:nvPr>
+        </p:nvSpPr>
+        <p:spPr/>
+      </p:sp>
+      <p:sp>
+        <p:nvSpPr>
+          <p:cNvPr id="3" name="Notes Placeholder 2"/>
+          <p:cNvSpPr>
+            <a:spLocks noGrp="1"/>
+          </p:cNvSpPr>
+          <p:nvPr>
+            <p:ph type="body" idx="1"/>
+          </p:nvPr>
+        </p:nvSpPr>
+        <p:spPr/>
+        <p:txBody>
+          <a:bodyPr/>
+          <a:lstStyle/>
+          <a:p>
+            <a:r>
+              <a:rPr lang="en-US" dirty="0"/>
+              <a:t>Most of the beer is located around the lower IBU which could indicate that more bitter beer is less popular and thus sold less. </a:t>
+            </a:r>
+          </a:p>
+        </p:txBody>
+      </p:sp>
+      <p:sp>
+        <p:nvSpPr>
+          <p:cNvPr id="4" name="Slide Number Placeholder 3"/>
+          <p:cNvSpPr>
+            <a:spLocks noGrp="1"/>
+          </p:cNvSpPr>
+          <p:nvPr>
+            <p:ph type="sldNum" sz="quarter" idx="5"/>
+          </p:nvPr>
+        </p:nvSpPr>
+        <p:spPr/>
+        <p:txBody>
+          <a:bodyPr/>
+          <a:lstStyle/>
+          <a:p>
+            <a:fld id="{501499A2-1326-4FB0-82A2-456B0524BFAF}" type="slidenum">
+              <a:rPr lang="en-US" smtClean="0"/>
+              <a:t>15</a:t>
+            </a:fld>
+            <a:endParaRPr lang="en-US"/>
+          </a:p>
+        </p:txBody>
+      </p:sp>
+    </p:spTree>
+    <p:extLst>
+      <p:ext uri="{BB962C8B-B14F-4D97-AF65-F5344CB8AC3E}">
+        <p14:creationId xmlns:p14="http://schemas.microsoft.com/office/powerpoint/2010/main" val="3815663650"/>
+      </p:ext>
+    </p:extLst>
+  </p:cSld>
+  <p:clrMapOvr>
+    <a:masterClrMapping/>
+  </p:clrMapOvr>
+</p:notes>
+</file>
+
+<file path=ppt/notesSlides/notesSlide13.xml><?xml version="1.0" encoding="utf-8"?>
+<p:notes xmlns:a="http://schemas.openxmlformats.org/drawingml/2006/main" xmlns:r="http://schemas.openxmlformats.org/officeDocument/2006/relationships" xmlns:p="http://schemas.openxmlformats.org/presentationml/2006/main">
+  <p:cSld>
+    <p:spTree>
+      <p:nvGrpSpPr>
+        <p:cNvPr id="1" name=""/>
+        <p:cNvGrpSpPr/>
+        <p:nvPr/>
+      </p:nvGrpSpPr>
+      <p:grpSpPr>
+        <a:xfrm>
+          <a:off x="0" y="0"/>
+          <a:ext cx="0" cy="0"/>
+          <a:chOff x="0" y="0"/>
+          <a:chExt cx="0" cy="0"/>
+        </a:xfrm>
+      </p:grpSpPr>
+      <p:sp>
+        <p:nvSpPr>
+          <p:cNvPr id="2" name="Slide Image Placeholder 1"/>
+          <p:cNvSpPr>
+            <a:spLocks noGrp="1" noRot="1" noChangeAspect="1"/>
+          </p:cNvSpPr>
+          <p:nvPr>
+            <p:ph type="sldImg"/>
+          </p:nvPr>
+        </p:nvSpPr>
+        <p:spPr/>
+      </p:sp>
+      <p:sp>
+        <p:nvSpPr>
+          <p:cNvPr id="3" name="Notes Placeholder 2"/>
+          <p:cNvSpPr>
+            <a:spLocks noGrp="1"/>
+          </p:cNvSpPr>
+          <p:nvPr>
+            <p:ph type="body" idx="1"/>
+          </p:nvPr>
+        </p:nvSpPr>
+        <p:spPr/>
+        <p:txBody>
+          <a:bodyPr/>
+          <a:lstStyle/>
+          <a:p>
+            <a:r>
+              <a:rPr lang="en-US" dirty="0"/>
+              <a:t>It seems that most popular beers will have around 5% ABV so that is the peak we see in the middle. </a:t>
+            </a:r>
+          </a:p>
+        </p:txBody>
+      </p:sp>
+      <p:sp>
+        <p:nvSpPr>
+          <p:cNvPr id="4" name="Slide Number Placeholder 3"/>
+          <p:cNvSpPr>
+            <a:spLocks noGrp="1"/>
+          </p:cNvSpPr>
+          <p:nvPr>
+            <p:ph type="sldNum" sz="quarter" idx="5"/>
+          </p:nvPr>
+        </p:nvSpPr>
+        <p:spPr/>
+        <p:txBody>
+          <a:bodyPr/>
+          <a:lstStyle/>
+          <a:p>
+            <a:fld id="{501499A2-1326-4FB0-82A2-456B0524BFAF}" type="slidenum">
+              <a:rPr lang="en-US" smtClean="0"/>
+              <a:t>16</a:t>
+            </a:fld>
+            <a:endParaRPr lang="en-US"/>
+          </a:p>
+        </p:txBody>
+      </p:sp>
+    </p:spTree>
+    <p:extLst>
+      <p:ext uri="{BB962C8B-B14F-4D97-AF65-F5344CB8AC3E}">
+        <p14:creationId xmlns:p14="http://schemas.microsoft.com/office/powerpoint/2010/main" val="15604416"/>
+      </p:ext>
+    </p:extLst>
+  </p:cSld>
+  <p:clrMapOvr>
+    <a:masterClrMapping/>
+  </p:clrMapOvr>
+</p:notes>
+</file>
+
+<file path=ppt/notesSlides/notesSlide14.xml><?xml version="1.0" encoding="utf-8"?>
+<p:notes xmlns:a="http://schemas.openxmlformats.org/drawingml/2006/main" xmlns:r="http://schemas.openxmlformats.org/officeDocument/2006/relationships" xmlns:p="http://schemas.openxmlformats.org/presentationml/2006/main">
+  <p:cSld>
+    <p:spTree>
+      <p:nvGrpSpPr>
+        <p:cNvPr id="1" name=""/>
+        <p:cNvGrpSpPr/>
+        <p:nvPr/>
+      </p:nvGrpSpPr>
+      <p:grpSpPr>
+        <a:xfrm>
+          <a:off x="0" y="0"/>
+          <a:ext cx="0" cy="0"/>
+          <a:chOff x="0" y="0"/>
+          <a:chExt cx="0" cy="0"/>
+        </a:xfrm>
+      </p:grpSpPr>
+      <p:sp>
+        <p:nvSpPr>
+          <p:cNvPr id="2" name="Slide Image Placeholder 1"/>
+          <p:cNvSpPr>
+            <a:spLocks noGrp="1" noRot="1" noChangeAspect="1"/>
+          </p:cNvSpPr>
+          <p:nvPr>
+            <p:ph type="sldImg"/>
+          </p:nvPr>
+        </p:nvSpPr>
+        <p:spPr/>
+      </p:sp>
+      <p:sp>
+        <p:nvSpPr>
+          <p:cNvPr id="3" name="Notes Placeholder 2"/>
+          <p:cNvSpPr>
+            <a:spLocks noGrp="1"/>
+          </p:cNvSpPr>
+          <p:nvPr>
+            <p:ph type="body" idx="1"/>
+          </p:nvPr>
+        </p:nvSpPr>
+        <p:spPr/>
+        <p:txBody>
+          <a:bodyPr/>
+          <a:lstStyle/>
+          <a:p>
+            <a:r>
+              <a:rPr lang="en-US" dirty="0"/>
+              <a:t>Maybe we can mention min and max? maybe median/mean</a:t>
+            </a:r>
+          </a:p>
+        </p:txBody>
+      </p:sp>
+      <p:sp>
+        <p:nvSpPr>
+          <p:cNvPr id="4" name="Slide Number Placeholder 3"/>
+          <p:cNvSpPr>
+            <a:spLocks noGrp="1"/>
+          </p:cNvSpPr>
+          <p:nvPr>
+            <p:ph type="sldNum" sz="quarter" idx="5"/>
+          </p:nvPr>
+        </p:nvSpPr>
+        <p:spPr/>
+        <p:txBody>
+          <a:bodyPr/>
+          <a:lstStyle/>
+          <a:p>
+            <a:fld id="{501499A2-1326-4FB0-82A2-456B0524BFAF}" type="slidenum">
+              <a:rPr lang="en-US" smtClean="0"/>
+              <a:t>17</a:t>
+            </a:fld>
+            <a:endParaRPr lang="en-US"/>
+          </a:p>
+        </p:txBody>
+      </p:sp>
+    </p:spTree>
+    <p:extLst>
+      <p:ext uri="{BB962C8B-B14F-4D97-AF65-F5344CB8AC3E}">
+        <p14:creationId xmlns:p14="http://schemas.microsoft.com/office/powerpoint/2010/main" val="3712324901"/>
+      </p:ext>
+    </p:extLst>
+  </p:cSld>
+  <p:clrMapOvr>
+    <a:masterClrMapping/>
+  </p:clrMapOvr>
+</p:notes>
+</file>
+
+<file path=ppt/notesSlides/notesSlide15.xml><?xml version="1.0" encoding="utf-8"?>
+<p:notes xmlns:a="http://schemas.openxmlformats.org/drawingml/2006/main" xmlns:r="http://schemas.openxmlformats.org/officeDocument/2006/relationships" xmlns:p="http://schemas.openxmlformats.org/presentationml/2006/main">
+  <p:cSld>
+    <p:spTree>
+      <p:nvGrpSpPr>
+        <p:cNvPr id="1" name=""/>
+        <p:cNvGrpSpPr/>
+        <p:nvPr/>
+      </p:nvGrpSpPr>
+      <p:grpSpPr>
+        <a:xfrm>
+          <a:off x="0" y="0"/>
+          <a:ext cx="0" cy="0"/>
+          <a:chOff x="0" y="0"/>
+          <a:chExt cx="0" cy="0"/>
+        </a:xfrm>
+      </p:grpSpPr>
+      <p:sp>
+        <p:nvSpPr>
+          <p:cNvPr id="2" name="Slide Image Placeholder 1"/>
+          <p:cNvSpPr>
+            <a:spLocks noGrp="1" noRot="1" noChangeAspect="1"/>
+          </p:cNvSpPr>
+          <p:nvPr>
+            <p:ph type="sldImg"/>
+          </p:nvPr>
+        </p:nvSpPr>
+        <p:spPr/>
+      </p:sp>
+      <p:sp>
+        <p:nvSpPr>
+          <p:cNvPr id="3" name="Notes Placeholder 2"/>
+          <p:cNvSpPr>
+            <a:spLocks noGrp="1"/>
+          </p:cNvSpPr>
+          <p:nvPr>
+            <p:ph type="body" idx="1"/>
+          </p:nvPr>
+        </p:nvSpPr>
+        <p:spPr/>
+        <p:txBody>
+          <a:bodyPr/>
+          <a:lstStyle/>
+          <a:p>
+            <a:endParaRPr lang="en-US" dirty="0"/>
+          </a:p>
+        </p:txBody>
+      </p:sp>
+      <p:sp>
+        <p:nvSpPr>
+          <p:cNvPr id="4" name="Slide Number Placeholder 3"/>
+          <p:cNvSpPr>
+            <a:spLocks noGrp="1"/>
+          </p:cNvSpPr>
+          <p:nvPr>
+            <p:ph type="sldNum" sz="quarter" idx="5"/>
+          </p:nvPr>
+        </p:nvSpPr>
+        <p:spPr/>
+        <p:txBody>
+          <a:bodyPr/>
+          <a:lstStyle/>
+          <a:p>
+            <a:fld id="{501499A2-1326-4FB0-82A2-456B0524BFAF}" type="slidenum">
+              <a:rPr lang="en-US" smtClean="0"/>
+              <a:t>18</a:t>
+            </a:fld>
+            <a:endParaRPr lang="en-US"/>
+          </a:p>
+        </p:txBody>
+      </p:sp>
+    </p:spTree>
+    <p:extLst>
+      <p:ext uri="{BB962C8B-B14F-4D97-AF65-F5344CB8AC3E}">
+        <p14:creationId xmlns:p14="http://schemas.microsoft.com/office/powerpoint/2010/main" val="1904811706"/>
+      </p:ext>
+    </p:extLst>
+  </p:cSld>
+  <p:clrMapOvr>
+    <a:masterClrMapping/>
+  </p:clrMapOvr>
+</p:notes>
+</file>
+
+<file path=ppt/notesSlides/notesSlide16.xml><?xml version="1.0" encoding="utf-8"?>
+<p:notes xmlns:a="http://schemas.openxmlformats.org/drawingml/2006/main" xmlns:r="http://schemas.openxmlformats.org/officeDocument/2006/relationships" xmlns:p="http://schemas.openxmlformats.org/presentationml/2006/main">
+  <p:cSld>
+    <p:spTree>
+      <p:nvGrpSpPr>
+        <p:cNvPr id="1" name=""/>
+        <p:cNvGrpSpPr/>
+        <p:nvPr/>
+      </p:nvGrpSpPr>
+      <p:grpSpPr>
+        <a:xfrm>
+          <a:off x="0" y="0"/>
+          <a:ext cx="0" cy="0"/>
+          <a:chOff x="0" y="0"/>
+          <a:chExt cx="0" cy="0"/>
+        </a:xfrm>
+      </p:grpSpPr>
+      <p:sp>
+        <p:nvSpPr>
+          <p:cNvPr id="2" name="Slide Image Placeholder 1"/>
+          <p:cNvSpPr>
+            <a:spLocks noGrp="1" noRot="1" noChangeAspect="1"/>
+          </p:cNvSpPr>
+          <p:nvPr>
+            <p:ph type="sldImg"/>
+          </p:nvPr>
+        </p:nvSpPr>
+        <p:spPr/>
+      </p:sp>
+      <p:sp>
+        <p:nvSpPr>
+          <p:cNvPr id="3" name="Notes Placeholder 2"/>
+          <p:cNvSpPr>
+            <a:spLocks noGrp="1"/>
+          </p:cNvSpPr>
+          <p:nvPr>
+            <p:ph type="body" idx="1"/>
+          </p:nvPr>
+        </p:nvSpPr>
+        <p:spPr/>
+        <p:txBody>
+          <a:bodyPr/>
+          <a:lstStyle/>
+          <a:p>
+            <a:r>
+              <a:rPr lang="en-US" dirty="0"/>
+              <a:t>You might be wondering, “Why did they choose to impute the missing IBU by style?” It seemed to make the most sense as two different beers in the same style family will share an IBU or ABV close to the others in them. </a:t>
+            </a:r>
+          </a:p>
+          <a:p>
+            <a:endParaRPr lang="en-US" dirty="0"/>
+          </a:p>
+          <a:p>
+            <a:r>
+              <a:rPr lang="en-US" dirty="0"/>
+              <a:t>Thank you for your time and we are open to questions.</a:t>
+            </a:r>
+          </a:p>
+        </p:txBody>
+      </p:sp>
+      <p:sp>
+        <p:nvSpPr>
+          <p:cNvPr id="4" name="Slide Number Placeholder 3"/>
+          <p:cNvSpPr>
+            <a:spLocks noGrp="1"/>
+          </p:cNvSpPr>
+          <p:nvPr>
+            <p:ph type="sldNum" sz="quarter" idx="5"/>
+          </p:nvPr>
+        </p:nvSpPr>
+        <p:spPr/>
+        <p:txBody>
+          <a:bodyPr/>
+          <a:lstStyle/>
+          <a:p>
+            <a:fld id="{501499A2-1326-4FB0-82A2-456B0524BFAF}" type="slidenum">
+              <a:rPr lang="en-US" smtClean="0"/>
+              <a:t>20</a:t>
+            </a:fld>
+            <a:endParaRPr lang="en-US"/>
+          </a:p>
+        </p:txBody>
+      </p:sp>
+    </p:spTree>
+    <p:extLst>
+      <p:ext uri="{BB962C8B-B14F-4D97-AF65-F5344CB8AC3E}">
+        <p14:creationId xmlns:p14="http://schemas.microsoft.com/office/powerpoint/2010/main" val="402198552"/>
+      </p:ext>
+    </p:extLst>
+  </p:cSld>
+  <p:clrMapOvr>
+    <a:masterClrMapping/>
+  </p:clrMapOvr>
+</p:notes>
+</file>
+
+<file path=ppt/notesSlides/notesSlide17.xml><?xml version="1.0" encoding="utf-8"?>
+<p:notes xmlns:a="http://schemas.openxmlformats.org/drawingml/2006/main" xmlns:r="http://schemas.openxmlformats.org/officeDocument/2006/relationships" xmlns:p="http://schemas.openxmlformats.org/presentationml/2006/main">
+  <p:cSld>
+    <p:spTree>
+      <p:nvGrpSpPr>
+        <p:cNvPr id="1" name=""/>
+        <p:cNvGrpSpPr/>
+        <p:nvPr/>
+      </p:nvGrpSpPr>
+      <p:grpSpPr>
+        <a:xfrm>
+          <a:off x="0" y="0"/>
+          <a:ext cx="0" cy="0"/>
+          <a:chOff x="0" y="0"/>
+          <a:chExt cx="0" cy="0"/>
+        </a:xfrm>
+      </p:grpSpPr>
+      <p:sp>
+        <p:nvSpPr>
+          <p:cNvPr id="2" name="Slide Image Placeholder 1"/>
+          <p:cNvSpPr>
+            <a:spLocks noGrp="1" noRot="1" noChangeAspect="1"/>
+          </p:cNvSpPr>
+          <p:nvPr>
+            <p:ph type="sldImg"/>
+          </p:nvPr>
+        </p:nvSpPr>
+        <p:spPr/>
+      </p:sp>
+      <p:sp>
+        <p:nvSpPr>
+          <p:cNvPr id="3" name="Notes Placeholder 2"/>
+          <p:cNvSpPr>
+            <a:spLocks noGrp="1"/>
+          </p:cNvSpPr>
+          <p:nvPr>
+            <p:ph type="body" idx="1"/>
+          </p:nvPr>
+        </p:nvSpPr>
+        <p:spPr/>
+        <p:txBody>
+          <a:bodyPr/>
+          <a:lstStyle/>
+          <a:p>
+            <a:endParaRPr lang="en-US" dirty="0"/>
+          </a:p>
+        </p:txBody>
+      </p:sp>
+      <p:sp>
+        <p:nvSpPr>
+          <p:cNvPr id="4" name="Slide Number Placeholder 3"/>
+          <p:cNvSpPr>
+            <a:spLocks noGrp="1"/>
+          </p:cNvSpPr>
+          <p:nvPr>
+            <p:ph type="sldNum" sz="quarter" idx="5"/>
+          </p:nvPr>
+        </p:nvSpPr>
+        <p:spPr/>
+        <p:txBody>
+          <a:bodyPr/>
+          <a:lstStyle/>
+          <a:p>
+            <a:fld id="{501499A2-1326-4FB0-82A2-456B0524BFAF}" type="slidenum">
+              <a:rPr lang="en-US" smtClean="0"/>
+              <a:t>21</a:t>
+            </a:fld>
+            <a:endParaRPr lang="en-US"/>
+          </a:p>
+        </p:txBody>
+      </p:sp>
+    </p:spTree>
+    <p:extLst>
+      <p:ext uri="{BB962C8B-B14F-4D97-AF65-F5344CB8AC3E}">
+        <p14:creationId xmlns:p14="http://schemas.microsoft.com/office/powerpoint/2010/main" val="1010454502"/>
+      </p:ext>
+    </p:extLst>
+  </p:cSld>
+  <p:clrMapOvr>
+    <a:masterClrMapping/>
+  </p:clrMapOvr>
+</p:notes>
+</file>
+
+<file path=ppt/notesSlides/notesSlide2.xml><?xml version="1.0" encoding="utf-8"?>
+<p:notes xmlns:a="http://schemas.openxmlformats.org/drawingml/2006/main" xmlns:r="http://schemas.openxmlformats.org/officeDocument/2006/relationships" xmlns:p="http://schemas.openxmlformats.org/presentationml/2006/main">
+  <p:cSld>
+    <p:spTree>
+      <p:nvGrpSpPr>
+        <p:cNvPr id="1" name=""/>
+        <p:cNvGrpSpPr/>
+        <p:nvPr/>
+      </p:nvGrpSpPr>
+      <p:grpSpPr>
+        <a:xfrm>
+          <a:off x="0" y="0"/>
+          <a:ext cx="0" cy="0"/>
+          <a:chOff x="0" y="0"/>
+          <a:chExt cx="0" cy="0"/>
+        </a:xfrm>
+      </p:grpSpPr>
+      <p:sp>
+        <p:nvSpPr>
+          <p:cNvPr id="2" name="Slide Image Placeholder 1"/>
+          <p:cNvSpPr>
+            <a:spLocks noGrp="1" noRot="1" noChangeAspect="1"/>
+          </p:cNvSpPr>
+          <p:nvPr>
+            <p:ph type="sldImg"/>
+          </p:nvPr>
+        </p:nvSpPr>
+        <p:spPr/>
+      </p:sp>
+      <p:sp>
+        <p:nvSpPr>
+          <p:cNvPr id="3" name="Notes Placeholder 2"/>
+          <p:cNvSpPr>
+            <a:spLocks noGrp="1"/>
+          </p:cNvSpPr>
+          <p:nvPr>
+            <p:ph type="body" idx="1"/>
+          </p:nvPr>
+        </p:nvSpPr>
+        <p:spPr/>
+        <p:txBody>
+          <a:bodyPr/>
+          <a:lstStyle/>
+          <a:p>
+            <a:r>
+              <a:rPr lang="en-US" dirty="0"/>
+              <a:t>We want to investigate the relationship between ABV and IBU for several different beers and breweries. What kind of dataset do we have?</a:t>
+            </a:r>
+          </a:p>
+        </p:txBody>
+      </p:sp>
+      <p:sp>
+        <p:nvSpPr>
+          <p:cNvPr id="4" name="Slide Number Placeholder 3"/>
+          <p:cNvSpPr>
+            <a:spLocks noGrp="1"/>
+          </p:cNvSpPr>
+          <p:nvPr>
+            <p:ph type="sldNum" sz="quarter" idx="5"/>
+          </p:nvPr>
+        </p:nvSpPr>
+        <p:spPr/>
+        <p:txBody>
+          <a:bodyPr/>
+          <a:lstStyle/>
+          <a:p>
+            <a:fld id="{501499A2-1326-4FB0-82A2-456B0524BFAF}" type="slidenum">
+              <a:rPr lang="en-US" smtClean="0"/>
+              <a:t>3</a:t>
+            </a:fld>
+            <a:endParaRPr lang="en-US"/>
+          </a:p>
+        </p:txBody>
+      </p:sp>
+    </p:spTree>
+    <p:extLst>
+      <p:ext uri="{BB962C8B-B14F-4D97-AF65-F5344CB8AC3E}">
+        <p14:creationId xmlns:p14="http://schemas.microsoft.com/office/powerpoint/2010/main" val="63313948"/>
+      </p:ext>
+    </p:extLst>
+  </p:cSld>
+  <p:clrMapOvr>
+    <a:masterClrMapping/>
+  </p:clrMapOvr>
+</p:notes>
+</file>
+
+<file path=ppt/notesSlides/notesSlide3.xml><?xml version="1.0" encoding="utf-8"?>
+<p:notes xmlns:a="http://schemas.openxmlformats.org/drawingml/2006/main" xmlns:r="http://schemas.openxmlformats.org/officeDocument/2006/relationships" xmlns:p="http://schemas.openxmlformats.org/presentationml/2006/main">
+  <p:cSld>
+    <p:spTree>
+      <p:nvGrpSpPr>
+        <p:cNvPr id="1" name=""/>
+        <p:cNvGrpSpPr/>
+        <p:nvPr/>
+      </p:nvGrpSpPr>
+      <p:grpSpPr>
+        <a:xfrm>
+          <a:off x="0" y="0"/>
+          <a:ext cx="0" cy="0"/>
+          <a:chOff x="0" y="0"/>
+          <a:chExt cx="0" cy="0"/>
+        </a:xfrm>
+      </p:grpSpPr>
+      <p:sp>
+        <p:nvSpPr>
+          <p:cNvPr id="2" name="Slide Image Placeholder 1"/>
+          <p:cNvSpPr>
+            <a:spLocks noGrp="1" noRot="1" noChangeAspect="1"/>
+          </p:cNvSpPr>
+          <p:nvPr>
+            <p:ph type="sldImg"/>
+          </p:nvPr>
+        </p:nvSpPr>
+        <p:spPr/>
+      </p:sp>
+      <p:sp>
+        <p:nvSpPr>
+          <p:cNvPr id="3" name="Notes Placeholder 2"/>
+          <p:cNvSpPr>
+            <a:spLocks noGrp="1"/>
+          </p:cNvSpPr>
+          <p:nvPr>
+            <p:ph type="body" idx="1"/>
+          </p:nvPr>
+        </p:nvSpPr>
+        <p:spPr/>
+        <p:txBody>
+          <a:bodyPr/>
+          <a:lstStyle/>
+          <a:p>
+            <a:r>
+              <a:rPr lang="en-US" dirty="0"/>
+              <a:t>Intro to dataset, style is important for us since we imputed based on the median in the same style</a:t>
+            </a:r>
+          </a:p>
+          <a:p>
+            <a:endParaRPr lang="en-US" dirty="0"/>
+          </a:p>
+          <a:p>
+            <a:r>
+              <a:rPr lang="en-US" dirty="0"/>
+              <a:t>Styles of beer: Porters and Lagers, Amber  or Pale ales and the like</a:t>
+            </a:r>
+          </a:p>
+        </p:txBody>
+      </p:sp>
+      <p:sp>
+        <p:nvSpPr>
+          <p:cNvPr id="4" name="Slide Number Placeholder 3"/>
+          <p:cNvSpPr>
+            <a:spLocks noGrp="1"/>
+          </p:cNvSpPr>
+          <p:nvPr>
+            <p:ph type="sldNum" sz="quarter" idx="5"/>
+          </p:nvPr>
+        </p:nvSpPr>
+        <p:spPr/>
+        <p:txBody>
+          <a:bodyPr/>
+          <a:lstStyle/>
+          <a:p>
+            <a:fld id="{501499A2-1326-4FB0-82A2-456B0524BFAF}" type="slidenum">
+              <a:rPr lang="en-US" smtClean="0"/>
+              <a:t>4</a:t>
+            </a:fld>
+            <a:endParaRPr lang="en-US"/>
+          </a:p>
+        </p:txBody>
+      </p:sp>
+    </p:spTree>
+    <p:extLst>
+      <p:ext uri="{BB962C8B-B14F-4D97-AF65-F5344CB8AC3E}">
+        <p14:creationId xmlns:p14="http://schemas.microsoft.com/office/powerpoint/2010/main" val="1519875153"/>
+      </p:ext>
+    </p:extLst>
+  </p:cSld>
+  <p:clrMapOvr>
+    <a:masterClrMapping/>
+  </p:clrMapOvr>
+</p:notes>
+</file>
+
+<file path=ppt/notesSlides/notesSlide4.xml><?xml version="1.0" encoding="utf-8"?>
+<p:notes xmlns:a="http://schemas.openxmlformats.org/drawingml/2006/main" xmlns:r="http://schemas.openxmlformats.org/officeDocument/2006/relationships" xmlns:p="http://schemas.openxmlformats.org/presentationml/2006/main">
+  <p:cSld>
+    <p:spTree>
+      <p:nvGrpSpPr>
+        <p:cNvPr id="1" name=""/>
+        <p:cNvGrpSpPr/>
+        <p:nvPr/>
+      </p:nvGrpSpPr>
+      <p:grpSpPr>
+        <a:xfrm>
+          <a:off x="0" y="0"/>
+          <a:ext cx="0" cy="0"/>
+          <a:chOff x="0" y="0"/>
+          <a:chExt cx="0" cy="0"/>
+        </a:xfrm>
+      </p:grpSpPr>
+      <p:sp>
+        <p:nvSpPr>
+          <p:cNvPr id="2" name="Slide Image Placeholder 1"/>
+          <p:cNvSpPr>
+            <a:spLocks noGrp="1" noRot="1" noChangeAspect="1"/>
+          </p:cNvSpPr>
+          <p:nvPr>
+            <p:ph type="sldImg"/>
+          </p:nvPr>
+        </p:nvSpPr>
+        <p:spPr/>
+      </p:sp>
+      <p:sp>
+        <p:nvSpPr>
+          <p:cNvPr id="3" name="Notes Placeholder 2"/>
+          <p:cNvSpPr>
+            <a:spLocks noGrp="1"/>
+          </p:cNvSpPr>
+          <p:nvPr>
+            <p:ph type="body" idx="1"/>
+          </p:nvPr>
+        </p:nvSpPr>
+        <p:spPr/>
+        <p:txBody>
+          <a:bodyPr/>
+          <a:lstStyle/>
+          <a:p>
+            <a:r>
+              <a:rPr lang="en-US" dirty="0"/>
+              <a:t>The pie chart shows the number of unique breweries  in each state in a counterclockwise/alphabetic fashion. Starting from the 0 line and going CCW we can follow alphabetically and see that the chart goes from Arkansas to Wyoming. </a:t>
+            </a:r>
+          </a:p>
+        </p:txBody>
+      </p:sp>
+      <p:sp>
+        <p:nvSpPr>
+          <p:cNvPr id="4" name="Slide Number Placeholder 3"/>
+          <p:cNvSpPr>
+            <a:spLocks noGrp="1"/>
+          </p:cNvSpPr>
+          <p:nvPr>
+            <p:ph type="sldNum" sz="quarter" idx="5"/>
+          </p:nvPr>
+        </p:nvSpPr>
+        <p:spPr/>
+        <p:txBody>
+          <a:bodyPr/>
+          <a:lstStyle/>
+          <a:p>
+            <a:fld id="{501499A2-1326-4FB0-82A2-456B0524BFAF}" type="slidenum">
+              <a:rPr lang="en-US" smtClean="0"/>
+              <a:t>5</a:t>
+            </a:fld>
+            <a:endParaRPr lang="en-US"/>
+          </a:p>
+        </p:txBody>
+      </p:sp>
+    </p:spTree>
+    <p:extLst>
+      <p:ext uri="{BB962C8B-B14F-4D97-AF65-F5344CB8AC3E}">
+        <p14:creationId xmlns:p14="http://schemas.microsoft.com/office/powerpoint/2010/main" val="1179128347"/>
+      </p:ext>
+    </p:extLst>
+  </p:cSld>
+  <p:clrMapOvr>
+    <a:masterClrMapping/>
+  </p:clrMapOvr>
+</p:notes>
+</file>
+
+<file path=ppt/notesSlides/notesSlide5.xml><?xml version="1.0" encoding="utf-8"?>
+<p:notes xmlns:a="http://schemas.openxmlformats.org/drawingml/2006/main" xmlns:r="http://schemas.openxmlformats.org/officeDocument/2006/relationships" xmlns:p="http://schemas.openxmlformats.org/presentationml/2006/main">
+  <p:cSld>
+    <p:spTree>
+      <p:nvGrpSpPr>
+        <p:cNvPr id="1" name=""/>
+        <p:cNvGrpSpPr/>
+        <p:nvPr/>
+      </p:nvGrpSpPr>
+      <p:grpSpPr>
+        <a:xfrm>
+          <a:off x="0" y="0"/>
+          <a:ext cx="0" cy="0"/>
+          <a:chOff x="0" y="0"/>
+          <a:chExt cx="0" cy="0"/>
+        </a:xfrm>
+      </p:grpSpPr>
+      <p:sp>
+        <p:nvSpPr>
+          <p:cNvPr id="2" name="Slide Image Placeholder 1"/>
+          <p:cNvSpPr>
+            <a:spLocks noGrp="1" noRot="1" noChangeAspect="1"/>
+          </p:cNvSpPr>
+          <p:nvPr>
+            <p:ph type="sldImg"/>
+          </p:nvPr>
+        </p:nvSpPr>
+        <p:spPr/>
+      </p:sp>
+      <p:sp>
+        <p:nvSpPr>
+          <p:cNvPr id="3" name="Notes Placeholder 2"/>
+          <p:cNvSpPr>
+            <a:spLocks noGrp="1"/>
+          </p:cNvSpPr>
+          <p:nvPr>
+            <p:ph type="body" idx="1"/>
+          </p:nvPr>
+        </p:nvSpPr>
+        <p:spPr/>
+        <p:txBody>
+          <a:bodyPr/>
+          <a:lstStyle/>
+          <a:p>
+            <a:r>
+              <a:rPr lang="en-US" dirty="0"/>
+              <a:t>47 breweries in Colorado, 39 in California and 11 in Arizona</a:t>
+            </a:r>
+          </a:p>
+        </p:txBody>
+      </p:sp>
+      <p:sp>
+        <p:nvSpPr>
+          <p:cNvPr id="4" name="Slide Number Placeholder 3"/>
+          <p:cNvSpPr>
+            <a:spLocks noGrp="1"/>
+          </p:cNvSpPr>
+          <p:nvPr>
+            <p:ph type="sldNum" sz="quarter" idx="5"/>
+          </p:nvPr>
+        </p:nvSpPr>
+        <p:spPr/>
+        <p:txBody>
+          <a:bodyPr/>
+          <a:lstStyle/>
+          <a:p>
+            <a:fld id="{501499A2-1326-4FB0-82A2-456B0524BFAF}" type="slidenum">
+              <a:rPr lang="en-US" smtClean="0"/>
+              <a:t>6</a:t>
+            </a:fld>
+            <a:endParaRPr lang="en-US"/>
+          </a:p>
+        </p:txBody>
+      </p:sp>
+    </p:spTree>
+    <p:extLst>
+      <p:ext uri="{BB962C8B-B14F-4D97-AF65-F5344CB8AC3E}">
+        <p14:creationId xmlns:p14="http://schemas.microsoft.com/office/powerpoint/2010/main" val="2118883328"/>
+      </p:ext>
+    </p:extLst>
+  </p:cSld>
+  <p:clrMapOvr>
+    <a:masterClrMapping/>
+  </p:clrMapOvr>
+</p:notes>
+</file>
+
+<file path=ppt/notesSlides/notesSlide6.xml><?xml version="1.0" encoding="utf-8"?>
+<p:notes xmlns:a="http://schemas.openxmlformats.org/drawingml/2006/main" xmlns:r="http://schemas.openxmlformats.org/officeDocument/2006/relationships" xmlns:p="http://schemas.openxmlformats.org/presentationml/2006/main">
+  <p:cSld>
+    <p:spTree>
+      <p:nvGrpSpPr>
+        <p:cNvPr id="1" name=""/>
+        <p:cNvGrpSpPr/>
+        <p:nvPr/>
+      </p:nvGrpSpPr>
+      <p:grpSpPr>
+        <a:xfrm>
+          <a:off x="0" y="0"/>
+          <a:ext cx="0" cy="0"/>
+          <a:chOff x="0" y="0"/>
+          <a:chExt cx="0" cy="0"/>
+        </a:xfrm>
+      </p:grpSpPr>
+      <p:sp>
+        <p:nvSpPr>
+          <p:cNvPr id="2" name="Slide Image Placeholder 1"/>
+          <p:cNvSpPr>
+            <a:spLocks noGrp="1" noRot="1" noChangeAspect="1"/>
+          </p:cNvSpPr>
+          <p:nvPr>
+            <p:ph type="sldImg"/>
+          </p:nvPr>
+        </p:nvSpPr>
+        <p:spPr/>
+      </p:sp>
+      <p:sp>
+        <p:nvSpPr>
+          <p:cNvPr id="3" name="Notes Placeholder 2"/>
+          <p:cNvSpPr>
+            <a:spLocks noGrp="1"/>
+          </p:cNvSpPr>
+          <p:nvPr>
+            <p:ph type="body" idx="1"/>
+          </p:nvPr>
+        </p:nvSpPr>
+        <p:spPr/>
+        <p:txBody>
+          <a:bodyPr/>
+          <a:lstStyle/>
+          <a:p>
+            <a:r>
+              <a:rPr lang="en-US" dirty="0"/>
+              <a:t>The left plot shows the percentage of missing values by attribute. The right plot gives a picture of the percentage of missing vs available data. The bars at the farthest right show the percentage size( from bottom to top) of 1) the available data, 2) the largest missing data attribute, 3) the next largest missing data</a:t>
+            </a:r>
+          </a:p>
+          <a:p>
+            <a:br>
+              <a:rPr lang="en-US" dirty="0"/>
+            </a:br>
+            <a:r>
+              <a:rPr lang="en-US" dirty="0"/>
+              <a:t>So here that would be, a large portion of the data is available. Next, IBU is missing a lot of data. Following that ABV, then Style and finally at the smallest is the 2 missing brewery ID’s. </a:t>
+            </a:r>
+          </a:p>
+        </p:txBody>
+      </p:sp>
+      <p:sp>
+        <p:nvSpPr>
+          <p:cNvPr id="4" name="Slide Number Placeholder 3"/>
+          <p:cNvSpPr>
+            <a:spLocks noGrp="1"/>
+          </p:cNvSpPr>
+          <p:nvPr>
+            <p:ph type="sldNum" sz="quarter" idx="5"/>
+          </p:nvPr>
+        </p:nvSpPr>
+        <p:spPr/>
+        <p:txBody>
+          <a:bodyPr/>
+          <a:lstStyle/>
+          <a:p>
+            <a:fld id="{501499A2-1326-4FB0-82A2-456B0524BFAF}" type="slidenum">
+              <a:rPr lang="en-US" smtClean="0"/>
+              <a:t>7</a:t>
+            </a:fld>
+            <a:endParaRPr lang="en-US"/>
+          </a:p>
+        </p:txBody>
+      </p:sp>
+    </p:spTree>
+    <p:extLst>
+      <p:ext uri="{BB962C8B-B14F-4D97-AF65-F5344CB8AC3E}">
+        <p14:creationId xmlns:p14="http://schemas.microsoft.com/office/powerpoint/2010/main" val="474708762"/>
+      </p:ext>
+    </p:extLst>
+  </p:cSld>
+  <p:clrMapOvr>
+    <a:masterClrMapping/>
+  </p:clrMapOvr>
+</p:notes>
+</file>
+
+<file path=ppt/notesSlides/notesSlide7.xml><?xml version="1.0" encoding="utf-8"?>
+<p:notes xmlns:a="http://schemas.openxmlformats.org/drawingml/2006/main" xmlns:r="http://schemas.openxmlformats.org/officeDocument/2006/relationships" xmlns:p="http://schemas.openxmlformats.org/presentationml/2006/main">
+  <p:cSld>
+    <p:spTree>
+      <p:nvGrpSpPr>
+        <p:cNvPr id="1" name=""/>
+        <p:cNvGrpSpPr/>
+        <p:nvPr/>
+      </p:nvGrpSpPr>
+      <p:grpSpPr>
+        <a:xfrm>
+          <a:off x="0" y="0"/>
+          <a:ext cx="0" cy="0"/>
+          <a:chOff x="0" y="0"/>
+          <a:chExt cx="0" cy="0"/>
+        </a:xfrm>
+      </p:grpSpPr>
+      <p:sp>
+        <p:nvSpPr>
+          <p:cNvPr id="2" name="Slide Image Placeholder 1"/>
+          <p:cNvSpPr>
+            <a:spLocks noGrp="1" noRot="1" noChangeAspect="1"/>
+          </p:cNvSpPr>
+          <p:nvPr>
+            <p:ph type="sldImg"/>
+          </p:nvPr>
+        </p:nvSpPr>
+        <p:spPr/>
+      </p:sp>
+      <p:sp>
+        <p:nvSpPr>
+          <p:cNvPr id="3" name="Notes Placeholder 2"/>
+          <p:cNvSpPr>
+            <a:spLocks noGrp="1"/>
+          </p:cNvSpPr>
+          <p:nvPr>
+            <p:ph type="body" idx="1"/>
+          </p:nvPr>
+        </p:nvSpPr>
+        <p:spPr/>
+        <p:txBody>
+          <a:bodyPr/>
+          <a:lstStyle/>
+          <a:p>
+            <a:r>
+              <a:rPr lang="en-US" dirty="0"/>
+              <a:t>Self explanatory slide.</a:t>
+            </a:r>
+          </a:p>
+          <a:p>
+            <a:r>
+              <a:rPr lang="en-US" dirty="0"/>
+              <a:t>Most ABVs were found through research, and some IBUs along with them</a:t>
+            </a:r>
+          </a:p>
+          <a:p>
+            <a:endParaRPr lang="en-US" dirty="0"/>
+          </a:p>
+          <a:p>
+            <a:r>
+              <a:rPr lang="en-US" dirty="0"/>
+              <a:t>We can talk about how imputing on both statistics can be detrimental to the data.</a:t>
+            </a:r>
+          </a:p>
+          <a:p>
+            <a:pPr marL="0" marR="0" lvl="0" indent="0" algn="l" defTabSz="914400" rtl="0" eaLnBrk="1" fontAlgn="auto" latinLnBrk="0" hangingPunct="1">
+              <a:lnSpc>
+                <a:spcPct val="100000"/>
+              </a:lnSpc>
+              <a:spcBef>
+                <a:spcPts val="0"/>
+              </a:spcBef>
+              <a:spcAft>
+                <a:spcPts val="0"/>
+              </a:spcAft>
+              <a:buClrTx/>
+              <a:buSzTx/>
+              <a:buFontTx/>
+              <a:buNone/>
+              <a:tabLst/>
+              <a:defRPr/>
+            </a:pPr>
+            <a:r>
+              <a:rPr lang="en-US" b="1" i="0" dirty="0">
+                <a:solidFill>
+                  <a:srgbClr val="A2B525"/>
+                </a:solidFill>
+                <a:effectLst/>
+                <a:latin typeface="Source Sans Pro" panose="020B0503030403020204" pitchFamily="34" charset="0"/>
+              </a:rPr>
+              <a:t>Problem #1: Mean imputation does not preserve the relationships among variables.</a:t>
+            </a:r>
+          </a:p>
+          <a:p>
+            <a:pPr marL="0" marR="0" lvl="0" indent="0" algn="l" defTabSz="914400" rtl="0" eaLnBrk="1" fontAlgn="auto" latinLnBrk="0" hangingPunct="1">
+              <a:lnSpc>
+                <a:spcPct val="100000"/>
+              </a:lnSpc>
+              <a:spcBef>
+                <a:spcPts val="0"/>
+              </a:spcBef>
+              <a:spcAft>
+                <a:spcPts val="0"/>
+              </a:spcAft>
+              <a:buClrTx/>
+              <a:buSzTx/>
+              <a:buFontTx/>
+              <a:buNone/>
+              <a:tabLst/>
+              <a:defRPr/>
+            </a:pPr>
+            <a:r>
+              <a:rPr lang="en-US" b="1" i="0" dirty="0">
+                <a:solidFill>
+                  <a:srgbClr val="A2B525"/>
+                </a:solidFill>
+                <a:effectLst/>
+                <a:latin typeface="Source Sans Pro" panose="020B0503030403020204" pitchFamily="34" charset="0"/>
+              </a:rPr>
+              <a:t>Problem #2: Mean Imputation Leads to An Underestimate of Standard Errors</a:t>
+            </a:r>
+            <a:endParaRPr lang="en-US" dirty="0"/>
+          </a:p>
+          <a:p>
+            <a:r>
+              <a:rPr lang="en-US" dirty="0"/>
+              <a:t>Source: https://www.theanalysisfactor.com/mean-imputation/ - although this is about mean imputation, I think the effects still apply.</a:t>
+            </a:r>
+          </a:p>
+          <a:p>
+            <a:r>
+              <a:rPr lang="en-US" dirty="0"/>
+              <a:t>I think the essential point is that any kind of imputation will bias the standard error because the model is not aware that we added these values in(that has its own error). If it was aware then the error could be added automatically but since it isn’t, it’s kind of biased. </a:t>
+            </a:r>
+          </a:p>
+        </p:txBody>
+      </p:sp>
+      <p:sp>
+        <p:nvSpPr>
+          <p:cNvPr id="4" name="Slide Number Placeholder 3"/>
+          <p:cNvSpPr>
+            <a:spLocks noGrp="1"/>
+          </p:cNvSpPr>
+          <p:nvPr>
+            <p:ph type="sldNum" sz="quarter" idx="5"/>
+          </p:nvPr>
+        </p:nvSpPr>
+        <p:spPr/>
+        <p:txBody>
+          <a:bodyPr/>
+          <a:lstStyle/>
+          <a:p>
+            <a:fld id="{501499A2-1326-4FB0-82A2-456B0524BFAF}" type="slidenum">
+              <a:rPr lang="en-US" smtClean="0"/>
+              <a:t>8</a:t>
+            </a:fld>
+            <a:endParaRPr lang="en-US"/>
+          </a:p>
+        </p:txBody>
+      </p:sp>
+    </p:spTree>
+    <p:extLst>
+      <p:ext uri="{BB962C8B-B14F-4D97-AF65-F5344CB8AC3E}">
+        <p14:creationId xmlns:p14="http://schemas.microsoft.com/office/powerpoint/2010/main" val="3740150068"/>
+      </p:ext>
+    </p:extLst>
+  </p:cSld>
+  <p:clrMapOvr>
+    <a:masterClrMapping/>
+  </p:clrMapOvr>
+</p:notes>
+</file>
+
+<file path=ppt/notesSlides/notesSlide8.xml><?xml version="1.0" encoding="utf-8"?>
+<p:notes xmlns:a="http://schemas.openxmlformats.org/drawingml/2006/main" xmlns:r="http://schemas.openxmlformats.org/officeDocument/2006/relationships" xmlns:p="http://schemas.openxmlformats.org/presentationml/2006/main">
+  <p:cSld>
+    <p:spTree>
+      <p:nvGrpSpPr>
+        <p:cNvPr id="1" name=""/>
+        <p:cNvGrpSpPr/>
+        <p:nvPr/>
+      </p:nvGrpSpPr>
+      <p:grpSpPr>
+        <a:xfrm>
+          <a:off x="0" y="0"/>
+          <a:ext cx="0" cy="0"/>
+          <a:chOff x="0" y="0"/>
+          <a:chExt cx="0" cy="0"/>
+        </a:xfrm>
+      </p:grpSpPr>
+      <p:sp>
+        <p:nvSpPr>
+          <p:cNvPr id="2" name="Slide Image Placeholder 1"/>
+          <p:cNvSpPr>
+            <a:spLocks noGrp="1" noRot="1" noChangeAspect="1"/>
+          </p:cNvSpPr>
+          <p:nvPr>
+            <p:ph type="sldImg"/>
+          </p:nvPr>
+        </p:nvSpPr>
+        <p:spPr/>
+      </p:sp>
+      <p:sp>
+        <p:nvSpPr>
+          <p:cNvPr id="3" name="Notes Placeholder 2"/>
+          <p:cNvSpPr>
+            <a:spLocks noGrp="1"/>
+          </p:cNvSpPr>
+          <p:nvPr>
+            <p:ph type="body" idx="1"/>
+          </p:nvPr>
+        </p:nvSpPr>
+        <p:spPr/>
+        <p:txBody>
+          <a:bodyPr/>
+          <a:lstStyle/>
+          <a:p>
+            <a:endParaRPr lang="en-US" dirty="0"/>
+          </a:p>
+        </p:txBody>
+      </p:sp>
+      <p:sp>
+        <p:nvSpPr>
+          <p:cNvPr id="4" name="Slide Number Placeholder 3"/>
+          <p:cNvSpPr>
+            <a:spLocks noGrp="1"/>
+          </p:cNvSpPr>
+          <p:nvPr>
+            <p:ph type="sldNum" sz="quarter" idx="5"/>
+          </p:nvPr>
+        </p:nvSpPr>
+        <p:spPr/>
+        <p:txBody>
+          <a:bodyPr/>
+          <a:lstStyle/>
+          <a:p>
+            <a:fld id="{501499A2-1326-4FB0-82A2-456B0524BFAF}" type="slidenum">
+              <a:rPr lang="en-US" smtClean="0"/>
+              <a:t>9</a:t>
+            </a:fld>
+            <a:endParaRPr lang="en-US"/>
+          </a:p>
+        </p:txBody>
+      </p:sp>
+    </p:spTree>
+    <p:extLst>
+      <p:ext uri="{BB962C8B-B14F-4D97-AF65-F5344CB8AC3E}">
+        <p14:creationId xmlns:p14="http://schemas.microsoft.com/office/powerpoint/2010/main" val="2290954208"/>
+      </p:ext>
+    </p:extLst>
+  </p:cSld>
+  <p:clrMapOvr>
+    <a:masterClrMapping/>
+  </p:clrMapOvr>
+</p:notes>
+</file>
+
+<file path=ppt/notesSlides/notesSlide9.xml><?xml version="1.0" encoding="utf-8"?>
+<p:notes xmlns:a="http://schemas.openxmlformats.org/drawingml/2006/main" xmlns:r="http://schemas.openxmlformats.org/officeDocument/2006/relationships" xmlns:p="http://schemas.openxmlformats.org/presentationml/2006/main">
+  <p:cSld>
+    <p:spTree>
+      <p:nvGrpSpPr>
+        <p:cNvPr id="1" name=""/>
+        <p:cNvGrpSpPr/>
+        <p:nvPr/>
+      </p:nvGrpSpPr>
+      <p:grpSpPr>
+        <a:xfrm>
+          <a:off x="0" y="0"/>
+          <a:ext cx="0" cy="0"/>
+          <a:chOff x="0" y="0"/>
+          <a:chExt cx="0" cy="0"/>
+        </a:xfrm>
+      </p:grpSpPr>
+      <p:sp>
+        <p:nvSpPr>
+          <p:cNvPr id="2" name="Slide Image Placeholder 1"/>
+          <p:cNvSpPr>
+            <a:spLocks noGrp="1" noRot="1" noChangeAspect="1"/>
+          </p:cNvSpPr>
+          <p:nvPr>
+            <p:ph type="sldImg"/>
+          </p:nvPr>
+        </p:nvSpPr>
+        <p:spPr/>
+      </p:sp>
+      <p:sp>
+        <p:nvSpPr>
+          <p:cNvPr id="3" name="Notes Placeholder 2"/>
+          <p:cNvSpPr>
+            <a:spLocks noGrp="1"/>
+          </p:cNvSpPr>
+          <p:nvPr>
+            <p:ph type="body" idx="1"/>
+          </p:nvPr>
+        </p:nvSpPr>
+        <p:spPr/>
+        <p:txBody>
+          <a:bodyPr/>
+          <a:lstStyle/>
+          <a:p>
+            <a:r>
+              <a:rPr lang="en-US" dirty="0"/>
+              <a:t>Kentucky has the highest median abv, Utah has the lowest.</a:t>
+            </a:r>
+          </a:p>
+        </p:txBody>
+      </p:sp>
+      <p:sp>
+        <p:nvSpPr>
+          <p:cNvPr id="4" name="Slide Number Placeholder 3"/>
+          <p:cNvSpPr>
+            <a:spLocks noGrp="1"/>
+          </p:cNvSpPr>
+          <p:nvPr>
+            <p:ph type="sldNum" sz="quarter" idx="5"/>
+          </p:nvPr>
+        </p:nvSpPr>
+        <p:spPr/>
+        <p:txBody>
+          <a:bodyPr/>
+          <a:lstStyle/>
+          <a:p>
+            <a:fld id="{501499A2-1326-4FB0-82A2-456B0524BFAF}" type="slidenum">
+              <a:rPr lang="en-US" smtClean="0"/>
+              <a:t>12</a:t>
+            </a:fld>
+            <a:endParaRPr lang="en-US"/>
+          </a:p>
+        </p:txBody>
+      </p:sp>
+    </p:spTree>
+    <p:extLst>
+      <p:ext uri="{BB962C8B-B14F-4D97-AF65-F5344CB8AC3E}">
+        <p14:creationId xmlns:p14="http://schemas.microsoft.com/office/powerpoint/2010/main" val="1043697821"/>
+      </p:ext>
+    </p:extLst>
+  </p:cSld>
+  <p:clrMapOvr>
+    <a:masterClrMapping/>
+  </p:clrMapOvr>
+</p:notes>
+</file>
+
 <file path=ppt/slideLayouts/slideLayout1.xml><?xml version="1.0" encoding="utf-8"?>
 <p:sldLayout xmlns:a="http://schemas.openxmlformats.org/drawingml/2006/main" xmlns:r="http://schemas.openxmlformats.org/officeDocument/2006/relationships" xmlns:p="http://schemas.openxmlformats.org/presentationml/2006/main" type="title" preserve="1">
   <p:cSld name="Title Slide">
@@ -278,7 +2220,7 @@
           <a:p>
             <a:fld id="{428E7421-5055-4702-868C-964BE14A0920}" type="datetimeFigureOut">
               <a:rPr lang="en-US" smtClean="0"/>
-              <a:t>2/21/21</a:t>
+              <a:t>2/23/2021</a:t>
             </a:fld>
             <a:endParaRPr lang="en-US"/>
           </a:p>
@@ -476,7 +2418,7 @@
           <a:p>
             <a:fld id="{428E7421-5055-4702-868C-964BE14A0920}" type="datetimeFigureOut">
               <a:rPr lang="en-US" smtClean="0"/>
-              <a:t>2/21/21</a:t>
+              <a:t>2/23/2021</a:t>
             </a:fld>
             <a:endParaRPr lang="en-US"/>
           </a:p>
@@ -684,7 +2626,7 @@
           <a:p>
             <a:fld id="{428E7421-5055-4702-868C-964BE14A0920}" type="datetimeFigureOut">
               <a:rPr lang="en-US" smtClean="0"/>
-              <a:t>2/21/21</a:t>
+              <a:t>2/23/2021</a:t>
             </a:fld>
             <a:endParaRPr lang="en-US"/>
           </a:p>
@@ -882,7 +2824,7 @@
           <a:p>
             <a:fld id="{428E7421-5055-4702-868C-964BE14A0920}" type="datetimeFigureOut">
               <a:rPr lang="en-US" smtClean="0"/>
-              <a:t>2/21/21</a:t>
+              <a:t>2/23/2021</a:t>
             </a:fld>
             <a:endParaRPr lang="en-US"/>
           </a:p>
@@ -1157,7 +3099,7 @@
           <a:p>
             <a:fld id="{428E7421-5055-4702-868C-964BE14A0920}" type="datetimeFigureOut">
               <a:rPr lang="en-US" smtClean="0"/>
-              <a:t>2/21/21</a:t>
+              <a:t>2/23/2021</a:t>
             </a:fld>
             <a:endParaRPr lang="en-US"/>
           </a:p>
@@ -1422,7 +3364,7 @@
           <a:p>
             <a:fld id="{428E7421-5055-4702-868C-964BE14A0920}" type="datetimeFigureOut">
               <a:rPr lang="en-US" smtClean="0"/>
-              <a:t>2/21/21</a:t>
+              <a:t>2/23/2021</a:t>
             </a:fld>
             <a:endParaRPr lang="en-US"/>
           </a:p>
@@ -1834,7 +3776,7 @@
           <a:p>
             <a:fld id="{428E7421-5055-4702-868C-964BE14A0920}" type="datetimeFigureOut">
               <a:rPr lang="en-US" smtClean="0"/>
-              <a:t>2/21/21</a:t>
+              <a:t>2/23/2021</a:t>
             </a:fld>
             <a:endParaRPr lang="en-US"/>
           </a:p>
@@ -1975,7 +3917,7 @@
           <a:p>
             <a:fld id="{428E7421-5055-4702-868C-964BE14A0920}" type="datetimeFigureOut">
               <a:rPr lang="en-US" smtClean="0"/>
-              <a:t>2/21/21</a:t>
+              <a:t>2/23/2021</a:t>
             </a:fld>
             <a:endParaRPr lang="en-US"/>
           </a:p>
@@ -2088,7 +4030,7 @@
           <a:p>
             <a:fld id="{428E7421-5055-4702-868C-964BE14A0920}" type="datetimeFigureOut">
               <a:rPr lang="en-US" smtClean="0"/>
-              <a:t>2/21/21</a:t>
+              <a:t>2/23/2021</a:t>
             </a:fld>
             <a:endParaRPr lang="en-US"/>
           </a:p>
@@ -2399,7 +4341,7 @@
           <a:p>
             <a:fld id="{428E7421-5055-4702-868C-964BE14A0920}" type="datetimeFigureOut">
               <a:rPr lang="en-US" smtClean="0"/>
-              <a:t>2/21/21</a:t>
+              <a:t>2/23/2021</a:t>
             </a:fld>
             <a:endParaRPr lang="en-US"/>
           </a:p>
@@ -2687,7 +4629,7 @@
           <a:p>
             <a:fld id="{428E7421-5055-4702-868C-964BE14A0920}" type="datetimeFigureOut">
               <a:rPr lang="en-US" smtClean="0"/>
-              <a:t>2/21/21</a:t>
+              <a:t>2/23/2021</a:t>
             </a:fld>
             <a:endParaRPr lang="en-US"/>
           </a:p>
@@ -2928,7 +4870,7 @@
           <a:p>
             <a:fld id="{428E7421-5055-4702-868C-964BE14A0920}" type="datetimeFigureOut">
               <a:rPr lang="en-US" smtClean="0"/>
-              <a:t>2/21/21</a:t>
+              <a:t>2/23/2021</a:t>
             </a:fld>
             <a:endParaRPr lang="en-US"/>
           </a:p>
@@ -3411,7 +5353,7 @@
           <a:p>
             <a:r>
               <a:rPr lang="en-US" dirty="0"/>
-              <a:t>02/22/2021</a:t>
+              <a:t>02/23/2021</a:t>
             </a:r>
           </a:p>
         </p:txBody>
@@ -3791,7 +5733,7 @@
           <a:p>
             <a:r>
               <a:rPr lang="en-US" dirty="0"/>
-              <a:t>Median ABV by state</a:t>
+              <a:t>Median ABV by State</a:t>
             </a:r>
           </a:p>
         </p:txBody>
@@ -3812,16 +5754,21 @@
             <p:ph idx="1"/>
           </p:nvPr>
         </p:nvPicPr>
-        <p:blipFill>
-          <a:blip r:embed="rId2"/>
-          <a:stretch>
-            <a:fillRect/>
-          </a:stretch>
+        <p:blipFill rotWithShape="1">
+          <a:blip r:embed="rId3">
+            <a:extLst>
+              <a:ext uri="{28A0092B-C50C-407E-A947-70E740481C1C}">
+                <a14:useLocalDpi xmlns:a14="http://schemas.microsoft.com/office/drawing/2010/main" val="0"/>
+              </a:ext>
+            </a:extLst>
+          </a:blip>
+          <a:srcRect t="3005"/>
+          <a:stretch/>
         </p:blipFill>
         <p:spPr>
           <a:xfrm>
-            <a:off x="717365" y="1805961"/>
-            <a:ext cx="10757269" cy="4850478"/>
+            <a:off x="533257" y="1326515"/>
+            <a:ext cx="9570208" cy="5166360"/>
           </a:xfrm>
           <a:prstGeom prst="rect">
             <a:avLst/>
@@ -3881,7 +5828,7 @@
           <a:p>
             <a:r>
               <a:rPr lang="en-US" dirty="0"/>
-              <a:t>Median IBU by state</a:t>
+              <a:t>Median IBU by State</a:t>
             </a:r>
           </a:p>
         </p:txBody>
@@ -3902,15 +5849,14 @@
             <p:ph idx="1"/>
           </p:nvPr>
         </p:nvPicPr>
-        <p:blipFill>
-          <a:blip r:embed="rId2"/>
-          <a:stretch>
-            <a:fillRect/>
-          </a:stretch>
+        <p:blipFill rotWithShape="1">
+          <a:blip r:embed="rId3"/>
+          <a:srcRect t="1962" b="-1"/>
+          <a:stretch/>
         </p:blipFill>
         <p:spPr>
           <a:xfrm>
-            <a:off x="599767" y="1338661"/>
+            <a:off x="702637" y="1315801"/>
             <a:ext cx="10245213" cy="5284972"/>
           </a:xfrm>
           <a:prstGeom prst="rect">
@@ -4085,7 +6031,7 @@
           </p:nvPr>
         </p:nvPicPr>
         <p:blipFill>
-          <a:blip r:embed="rId2"/>
+          <a:blip r:embed="rId3"/>
           <a:stretch>
             <a:fillRect/>
           </a:stretch>
@@ -4198,7 +6144,7 @@
           <p:nvPr/>
         </p:nvPicPr>
         <p:blipFill>
-          <a:blip r:embed="rId2"/>
+          <a:blip r:embed="rId3"/>
           <a:stretch>
             <a:fillRect/>
           </a:stretch>
@@ -4266,7 +6212,7 @@
           <a:p>
             <a:r>
               <a:rPr lang="en-US" dirty="0"/>
-              <a:t>Summary statistics</a:t>
+              <a:t>Summary Statistics</a:t>
             </a:r>
           </a:p>
         </p:txBody>
@@ -4286,7 +6232,7 @@
           <p:nvPr/>
         </p:nvPicPr>
         <p:blipFill>
-          <a:blip r:embed="rId2"/>
+          <a:blip r:embed="rId3"/>
           <a:stretch>
             <a:fillRect/>
           </a:stretch>
@@ -4354,7 +6300,7 @@
           <a:p>
             <a:r>
               <a:rPr lang="en-US" dirty="0"/>
-              <a:t>ABV vs IBU relationship</a:t>
+              <a:t>ABV vs IBU Relationship</a:t>
             </a:r>
           </a:p>
         </p:txBody>
@@ -4376,14 +6322,14 @@
           </p:nvPr>
         </p:nvPicPr>
         <p:blipFill>
-          <a:blip r:embed="rId2"/>
+          <a:blip r:embed="rId3"/>
           <a:stretch>
             <a:fillRect/>
           </a:stretch>
         </p:blipFill>
         <p:spPr>
           <a:xfrm>
-            <a:off x="417786" y="1603977"/>
+            <a:off x="2296510" y="1403160"/>
             <a:ext cx="7598980" cy="5089715"/>
           </a:xfrm>
           <a:prstGeom prst="rect">
@@ -4473,7 +6419,7 @@
         </p:blipFill>
         <p:spPr>
           <a:xfrm>
-            <a:off x="707922" y="1797303"/>
+            <a:off x="2579371" y="1365788"/>
             <a:ext cx="7033257" cy="4613685"/>
           </a:xfrm>
           <a:prstGeom prst="rect">
@@ -4558,7 +6504,7 @@
         <p:spPr/>
         <p:txBody>
           <a:bodyPr>
-            <a:normAutofit lnSpcReduction="10000"/>
+            <a:normAutofit/>
           </a:bodyPr>
           <a:lstStyle/>
           <a:p>
@@ -4577,12 +6523,6 @@
             <a:r>
               <a:rPr lang="en-US" dirty="0"/>
               <a:t>Number of Breweries in each state</a:t>
-            </a:r>
-          </a:p>
-          <a:p>
-            <a:r>
-              <a:rPr lang="en-US" dirty="0"/>
-              <a:t>A peek at the data</a:t>
             </a:r>
           </a:p>
           <a:p>
@@ -4655,6 +6595,95 @@
           <p:cNvPr id="2" name="Title 1">
             <a:extLst>
               <a:ext uri="{FF2B5EF4-FFF2-40B4-BE49-F238E27FC236}">
+                <a16:creationId xmlns:a16="http://schemas.microsoft.com/office/drawing/2014/main" id="{E457A67E-7FA6-4751-AB9F-31EB6DC09A1B}"/>
+              </a:ext>
+            </a:extLst>
+          </p:cNvPr>
+          <p:cNvSpPr>
+            <a:spLocks noGrp="1"/>
+          </p:cNvSpPr>
+          <p:nvPr>
+            <p:ph type="title"/>
+          </p:nvPr>
+        </p:nvSpPr>
+        <p:spPr/>
+        <p:txBody>
+          <a:bodyPr/>
+          <a:lstStyle/>
+          <a:p>
+            <a:pPr algn="ctr"/>
+            <a:r>
+              <a:rPr lang="en-US" dirty="0"/>
+              <a:t>Any Questions?</a:t>
+            </a:r>
+          </a:p>
+        </p:txBody>
+      </p:sp>
+      <p:sp>
+        <p:nvSpPr>
+          <p:cNvPr id="3" name="Content Placeholder 2">
+            <a:extLst>
+              <a:ext uri="{FF2B5EF4-FFF2-40B4-BE49-F238E27FC236}">
+                <a16:creationId xmlns:a16="http://schemas.microsoft.com/office/drawing/2014/main" id="{B45B3E7F-4F4F-4F9B-8D20-7906ABCA6118}"/>
+              </a:ext>
+            </a:extLst>
+          </p:cNvPr>
+          <p:cNvSpPr>
+            <a:spLocks noGrp="1"/>
+          </p:cNvSpPr>
+          <p:nvPr>
+            <p:ph idx="1"/>
+          </p:nvPr>
+        </p:nvSpPr>
+        <p:spPr/>
+        <p:txBody>
+          <a:bodyPr>
+            <a:normAutofit/>
+          </a:bodyPr>
+          <a:lstStyle/>
+          <a:p>
+            <a:pPr marL="0" indent="0" algn="ctr">
+              <a:buNone/>
+            </a:pPr>
+            <a:endParaRPr lang="en-US" sz="4000" dirty="0"/>
+          </a:p>
+        </p:txBody>
+      </p:sp>
+    </p:spTree>
+    <p:extLst>
+      <p:ext uri="{BB962C8B-B14F-4D97-AF65-F5344CB8AC3E}">
+        <p14:creationId xmlns:p14="http://schemas.microsoft.com/office/powerpoint/2010/main" val="1341946735"/>
+      </p:ext>
+    </p:extLst>
+  </p:cSld>
+  <p:clrMapOvr>
+    <a:masterClrMapping/>
+  </p:clrMapOvr>
+</p:sld>
+</file>
+
+<file path=ppt/slides/slide21.xml><?xml version="1.0" encoding="utf-8"?>
+<p:sld xmlns:a="http://schemas.openxmlformats.org/drawingml/2006/main" xmlns:r="http://schemas.openxmlformats.org/officeDocument/2006/relationships" xmlns:p="http://schemas.openxmlformats.org/presentationml/2006/main">
+  <p:cSld>
+    <p:spTree>
+      <p:nvGrpSpPr>
+        <p:cNvPr id="1" name=""/>
+        <p:cNvGrpSpPr/>
+        <p:nvPr/>
+      </p:nvGrpSpPr>
+      <p:grpSpPr>
+        <a:xfrm>
+          <a:off x="0" y="0"/>
+          <a:ext cx="0" cy="0"/>
+          <a:chOff x="0" y="0"/>
+          <a:chExt cx="0" cy="0"/>
+        </a:xfrm>
+      </p:grpSpPr>
+      <p:sp>
+        <p:nvSpPr>
+          <p:cNvPr id="2" name="Title 1">
+            <a:extLst>
+              <a:ext uri="{FF2B5EF4-FFF2-40B4-BE49-F238E27FC236}">
                 <a16:creationId xmlns:a16="http://schemas.microsoft.com/office/drawing/2014/main" id="{E031AA78-DEA9-6A40-ACAD-B576347B8854}"/>
               </a:ext>
             </a:extLst>
@@ -4734,11 +6763,10 @@
           </p:cNvPicPr>
           <p:nvPr/>
         </p:nvPicPr>
-        <p:blipFill>
-          <a:blip r:embed="rId2"/>
-          <a:stretch>
-            <a:fillRect/>
-          </a:stretch>
+        <p:blipFill rotWithShape="1">
+          <a:blip r:embed="rId3"/>
+          <a:srcRect l="1544"/>
+          <a:stretch/>
         </p:blipFill>
         <p:spPr>
           <a:xfrm>
@@ -4831,7 +6859,7 @@
           <a:p>
             <a:r>
               <a:rPr lang="en-US" dirty="0"/>
-              <a:t>Asses the relationship between IBU and ABV for beers across different states</a:t>
+              <a:t>Assess the relationship between IBU and ABV for beers across different states</a:t>
             </a:r>
           </a:p>
         </p:txBody>
@@ -4909,7 +6937,7 @@
         <p:spPr>
           <a:xfrm>
             <a:off x="685023" y="1321356"/>
-            <a:ext cx="7499361" cy="369332"/>
+            <a:ext cx="7882479" cy="369332"/>
           </a:xfrm>
           <a:prstGeom prst="rect">
             <a:avLst/>
@@ -4924,7 +6952,7 @@
           <a:p>
             <a:r>
               <a:rPr lang="en-US" dirty="0"/>
-              <a:t>Beer data collected across the United states including the following properties:</a:t>
+              <a:t>The beer data collected across the United States includes the following properties:</a:t>
             </a:r>
           </a:p>
         </p:txBody>
@@ -4944,15 +6972,20 @@
           <p:nvPr/>
         </p:nvPicPr>
         <p:blipFill>
-          <a:blip r:embed="rId2"/>
-          <a:stretch>
-            <a:fillRect/>
-          </a:stretch>
+          <a:blip r:embed="rId3">
+            <a:extLst>
+              <a:ext uri="{28A0092B-C50C-407E-A947-70E740481C1C}">
+                <a14:useLocalDpi xmlns:a14="http://schemas.microsoft.com/office/drawing/2010/main" val="0"/>
+              </a:ext>
+            </a:extLst>
+          </a:blip>
+          <a:srcRect/>
+          <a:stretch/>
         </p:blipFill>
         <p:spPr>
           <a:xfrm>
-            <a:off x="718502" y="1984829"/>
-            <a:ext cx="4204598" cy="4233358"/>
+            <a:off x="690850" y="1994354"/>
+            <a:ext cx="4192944" cy="4233358"/>
           </a:xfrm>
           <a:prstGeom prst="rect">
             <a:avLst/>
@@ -5039,7 +7072,7 @@
           </p:nvPr>
         </p:nvPicPr>
         <p:blipFill>
-          <a:blip r:embed="rId2"/>
+          <a:blip r:embed="rId3"/>
           <a:stretch>
             <a:fillRect/>
           </a:stretch>
@@ -5129,14 +7162,14 @@
           </p:nvPr>
         </p:nvPicPr>
         <p:blipFill>
-          <a:blip r:embed="rId2"/>
+          <a:blip r:embed="rId3"/>
           <a:stretch>
             <a:fillRect/>
           </a:stretch>
         </p:blipFill>
         <p:spPr>
           <a:xfrm>
-            <a:off x="521876" y="1690688"/>
+            <a:off x="1271890" y="1516028"/>
             <a:ext cx="4387214" cy="4351338"/>
           </a:xfrm>
           <a:prstGeom prst="rect">
@@ -5150,36 +7183,6 @@
             <a:extLst>
               <a:ext uri="{FF2B5EF4-FFF2-40B4-BE49-F238E27FC236}">
                 <a16:creationId xmlns:a16="http://schemas.microsoft.com/office/drawing/2014/main" id="{D9DDF4B2-87FA-D949-8D40-CC5ACE7E3D7C}"/>
-              </a:ext>
-            </a:extLst>
-          </p:cNvPr>
-          <p:cNvPicPr>
-            <a:picLocks noChangeAspect="1"/>
-          </p:cNvPicPr>
-          <p:nvPr/>
-        </p:nvPicPr>
-        <p:blipFill>
-          <a:blip r:embed="rId3"/>
-          <a:stretch>
-            <a:fillRect/>
-          </a:stretch>
-        </p:blipFill>
-        <p:spPr>
-          <a:xfrm>
-            <a:off x="4909090" y="1690688"/>
-            <a:ext cx="4411984" cy="4351338"/>
-          </a:xfrm>
-          <a:prstGeom prst="rect">
-            <a:avLst/>
-          </a:prstGeom>
-        </p:spPr>
-      </p:pic>
-      <p:pic>
-        <p:nvPicPr>
-          <p:cNvPr id="6" name="Picture 5">
-            <a:extLst>
-              <a:ext uri="{FF2B5EF4-FFF2-40B4-BE49-F238E27FC236}">
-                <a16:creationId xmlns:a16="http://schemas.microsoft.com/office/drawing/2014/main" id="{82AE0360-BB5F-0A45-A681-F65DD02F1F48}"/>
               </a:ext>
             </a:extLst>
           </p:cNvPr>
@@ -5196,7 +7199,37 @@
         </p:blipFill>
         <p:spPr>
           <a:xfrm>
-            <a:off x="4758812" y="6042026"/>
+            <a:off x="5583965" y="1516028"/>
+            <a:ext cx="4411984" cy="4351338"/>
+          </a:xfrm>
+          <a:prstGeom prst="rect">
+            <a:avLst/>
+          </a:prstGeom>
+        </p:spPr>
+      </p:pic>
+      <p:pic>
+        <p:nvPicPr>
+          <p:cNvPr id="6" name="Picture 5">
+            <a:extLst>
+              <a:ext uri="{FF2B5EF4-FFF2-40B4-BE49-F238E27FC236}">
+                <a16:creationId xmlns:a16="http://schemas.microsoft.com/office/drawing/2014/main" id="{82AE0360-BB5F-0A45-A681-F65DD02F1F48}"/>
+              </a:ext>
+            </a:extLst>
+          </p:cNvPr>
+          <p:cNvPicPr>
+            <a:picLocks noChangeAspect="1"/>
+          </p:cNvPicPr>
+          <p:nvPr/>
+        </p:nvPicPr>
+        <p:blipFill>
+          <a:blip r:embed="rId5"/>
+          <a:stretch>
+            <a:fillRect/>
+          </a:stretch>
+        </p:blipFill>
+        <p:spPr>
+          <a:xfrm>
+            <a:off x="5508826" y="5867366"/>
             <a:ext cx="4411983" cy="296175"/>
           </a:xfrm>
           <a:prstGeom prst="rect">
@@ -5279,7 +7312,7 @@
           </p:nvPr>
         </p:nvPicPr>
         <p:blipFill>
-          <a:blip r:embed="rId2"/>
+          <a:blip r:embed="rId3"/>
           <a:stretch>
             <a:fillRect/>
           </a:stretch>
@@ -5381,7 +7414,7 @@
           <a:p>
             <a:r>
               <a:rPr lang="en-US" dirty="0"/>
-              <a:t>Drop entries missing both IBU and ABV with no DATA online </a:t>
+              <a:t>Drop entries missing both IBU and ABV with no data online </a:t>
             </a:r>
           </a:p>
           <a:p>
@@ -5483,21 +7516,13 @@
             </a:pPr>
             <a:r>
               <a:rPr lang="en-US" dirty="0"/>
-              <a:t>No DATA was </a:t>
-            </a:r>
-            <a:r>
-              <a:rPr lang="en-US" dirty="0" err="1"/>
-              <a:t>foundand</a:t>
-            </a:r>
+              <a:t>No data was found and thus entries with missing data are dropped for: </a:t>
+            </a:r>
+          </a:p>
+          <a:p>
             <a:r>
               <a:rPr lang="en-US" dirty="0"/>
-              <a:t> thus entries with missing data are dropped for: </a:t>
-            </a:r>
-          </a:p>
-          <a:p>
-            <a:r>
-              <a:rPr lang="en-US" dirty="0"/>
-              <a:t>Cedar creek - Special Release is ambiguous, missing ABV/IBU/Style it does not solve the QOI.</a:t>
+              <a:t>Cedar Creek - Special Release is ambiguous, missing ABV/IBU/Style it does not solve the QOI.</a:t>
             </a:r>
           </a:p>
           <a:p>
@@ -5511,7 +7536,7 @@
             </a:r>
             <a:r>
               <a:rPr lang="en-US" dirty="0"/>
-              <a:t> is not an actual beer but a type of can</a:t>
+              <a:t> is not an actual beer but a type of can.</a:t>
             </a:r>
           </a:p>
           <a:p>
@@ -5531,47 +7556,51 @@
           <a:p>
             <a:r>
               <a:rPr lang="en-US" dirty="0"/>
-              <a:t>Beer ID 2364, Royal Lager of Weston Brewing has no ABV/IBU</a:t>
+              <a:t>Beer ID 2364, Royal Lager of Weston Brewing has no ABV/IBU.</a:t>
             </a:r>
           </a:p>
           <a:p>
             <a:r>
               <a:rPr lang="en-US" dirty="0"/>
-              <a:t>Same for BID - 2322 Fort Pitt Brewing Company Fort Pitt Ale</a:t>
+              <a:t>Beer ID 2322,  Fort Pitt Brewing Company Fort Pitt Ale.</a:t>
             </a:r>
           </a:p>
           <a:p>
             <a:r>
               <a:rPr lang="en-US" dirty="0"/>
-              <a:t>Oskar Blues Brewery Birth IPA, 1750</a:t>
+              <a:t>Beer ID 1750, Oskar Blues Brewery Birth IPA.</a:t>
             </a:r>
           </a:p>
           <a:p>
             <a:r>
               <a:rPr lang="en-US" dirty="0"/>
-              <a:t>710, no data</a:t>
-            </a:r>
-          </a:p>
-          <a:p>
+              <a:t>Beer ID 710, no data.</a:t>
+            </a:r>
+          </a:p>
+          <a:p>
+            <a:r>
+              <a:rPr lang="en-US" dirty="0"/>
+              <a:t>Beer ID 273, </a:t>
+            </a:r>
             <a:r>
               <a:rPr lang="en-US" dirty="0" err="1"/>
               <a:t>MillKing</a:t>
             </a:r>
             <a:r>
               <a:rPr lang="en-US" dirty="0"/>
-              <a:t> It Productions AXL Pale Ale, 273 - out of business no info</a:t>
+              <a:t> It Productions AXL Pale Ale, out of business no info.</a:t>
             </a:r>
           </a:p>
           <a:p>
             <a:r>
               <a:rPr lang="en-US" dirty="0"/>
-              <a:t>1095 no data</a:t>
+              <a:t>Beer ID 1095, no data.</a:t>
             </a:r>
           </a:p>
           <a:p>
             <a:r>
               <a:rPr lang="en-US" dirty="0"/>
-              <a:t>963 no data</a:t>
+              <a:t>Beer ID 963, no data.</a:t>
             </a:r>
           </a:p>
           <a:p>
@@ -5885,4 +7914,299 @@
     </a:ext>
   </a:extLst>
 </a:theme>
+</file>
+
+<file path=ppt/theme/theme2.xml><?xml version="1.0" encoding="utf-8"?>
+<a:theme xmlns:a="http://schemas.openxmlformats.org/drawingml/2006/main" name="Office Theme">
+  <a:themeElements>
+    <a:clrScheme name="Office">
+      <a:dk1>
+        <a:sysClr val="windowText" lastClr="000000"/>
+      </a:dk1>
+      <a:lt1>
+        <a:sysClr val="window" lastClr="FFFFFF"/>
+      </a:lt1>
+      <a:dk2>
+        <a:srgbClr val="44546A"/>
+      </a:dk2>
+      <a:lt2>
+        <a:srgbClr val="E7E6E6"/>
+      </a:lt2>
+      <a:accent1>
+        <a:srgbClr val="4472C4"/>
+      </a:accent1>
+      <a:accent2>
+        <a:srgbClr val="ED7D31"/>
+      </a:accent2>
+      <a:accent3>
+        <a:srgbClr val="A5A5A5"/>
+      </a:accent3>
+      <a:accent4>
+        <a:srgbClr val="FFC000"/>
+      </a:accent4>
+      <a:accent5>
+        <a:srgbClr val="5B9BD5"/>
+      </a:accent5>
+      <a:accent6>
+        <a:srgbClr val="70AD47"/>
+      </a:accent6>
+      <a:hlink>
+        <a:srgbClr val="0563C1"/>
+      </a:hlink>
+      <a:folHlink>
+        <a:srgbClr val="954F72"/>
+      </a:folHlink>
+    </a:clrScheme>
+    <a:fontScheme name="Office">
+      <a:majorFont>
+        <a:latin typeface="Calibri Light" panose="020F0302020204030204"/>
+        <a:ea typeface=""/>
+        <a:cs typeface=""/>
+        <a:font script="Jpan" typeface="游ゴシック Light"/>
+        <a:font script="Hang" typeface="맑은 고딕"/>
+        <a:font script="Hans" typeface="等线 Light"/>
+        <a:font script="Hant" typeface="新細明體"/>
+        <a:font script="Arab" typeface="Times New Roman"/>
+        <a:font script="Hebr" typeface="Times New Roman"/>
+        <a:font script="Thai" typeface="Angsana New"/>
+        <a:font script="Ethi" typeface="Nyala"/>
+        <a:font script="Beng" typeface="Vrinda"/>
+        <a:font script="Gujr" typeface="Shruti"/>
+        <a:font script="Khmr" typeface="MoolBoran"/>
+        <a:font script="Knda" typeface="Tunga"/>
+        <a:font script="Guru" typeface="Raavi"/>
+        <a:font script="Cans" typeface="Euphemia"/>
+        <a:font script="Cher" typeface="Plantagenet Cherokee"/>
+        <a:font script="Yiii" typeface="Microsoft Yi Baiti"/>
+        <a:font script="Tibt" typeface="Microsoft Himalaya"/>
+        <a:font script="Thaa" typeface="MV Boli"/>
+        <a:font script="Deva" typeface="Mangal"/>
+        <a:font script="Telu" typeface="Gautami"/>
+        <a:font script="Taml" typeface="Latha"/>
+        <a:font script="Syrc" typeface="Estrangelo Edessa"/>
+        <a:font script="Orya" typeface="Kalinga"/>
+        <a:font script="Mlym" typeface="Kartika"/>
+        <a:font script="Laoo" typeface="DokChampa"/>
+        <a:font script="Sinh" typeface="Iskoola Pota"/>
+        <a:font script="Mong" typeface="Mongolian Baiti"/>
+        <a:font script="Viet" typeface="Times New Roman"/>
+        <a:font script="Uigh" typeface="Microsoft Uighur"/>
+        <a:font script="Geor" typeface="Sylfaen"/>
+        <a:font script="Armn" typeface="Arial"/>
+        <a:font script="Bugi" typeface="Leelawadee UI"/>
+        <a:font script="Bopo" typeface="Microsoft JhengHei"/>
+        <a:font script="Java" typeface="Javanese Text"/>
+        <a:font script="Lisu" typeface="Segoe UI"/>
+        <a:font script="Mymr" typeface="Myanmar Text"/>
+        <a:font script="Nkoo" typeface="Ebrima"/>
+        <a:font script="Olck" typeface="Nirmala UI"/>
+        <a:font script="Osma" typeface="Ebrima"/>
+        <a:font script="Phag" typeface="Phagspa"/>
+        <a:font script="Syrn" typeface="Estrangelo Edessa"/>
+        <a:font script="Syrj" typeface="Estrangelo Edessa"/>
+        <a:font script="Syre" typeface="Estrangelo Edessa"/>
+        <a:font script="Sora" typeface="Nirmala UI"/>
+        <a:font script="Tale" typeface="Microsoft Tai Le"/>
+        <a:font script="Talu" typeface="Microsoft New Tai Lue"/>
+        <a:font script="Tfng" typeface="Ebrima"/>
+      </a:majorFont>
+      <a:minorFont>
+        <a:latin typeface="Calibri" panose="020F0502020204030204"/>
+        <a:ea typeface=""/>
+        <a:cs typeface=""/>
+        <a:font script="Jpan" typeface="游ゴシック"/>
+        <a:font script="Hang" typeface="맑은 고딕"/>
+        <a:font script="Hans" typeface="等线"/>
+        <a:font script="Hant" typeface="新細明體"/>
+        <a:font script="Arab" typeface="Arial"/>
+        <a:font script="Hebr" typeface="Arial"/>
+        <a:font script="Thai" typeface="Cordia New"/>
+        <a:font script="Ethi" typeface="Nyala"/>
+        <a:font script="Beng" typeface="Vrinda"/>
+        <a:font script="Gujr" typeface="Shruti"/>
+        <a:font script="Khmr" typeface="DaunPenh"/>
+        <a:font script="Knda" typeface="Tunga"/>
+        <a:font script="Guru" typeface="Raavi"/>
+        <a:font script="Cans" typeface="Euphemia"/>
+        <a:font script="Cher" typeface="Plantagenet Cherokee"/>
+        <a:font script="Yiii" typeface="Microsoft Yi Baiti"/>
+        <a:font script="Tibt" typeface="Microsoft Himalaya"/>
+        <a:font script="Thaa" typeface="MV Boli"/>
+        <a:font script="Deva" typeface="Mangal"/>
+        <a:font script="Telu" typeface="Gautami"/>
+        <a:font script="Taml" typeface="Latha"/>
+        <a:font script="Syrc" typeface="Estrangelo Edessa"/>
+        <a:font script="Orya" typeface="Kalinga"/>
+        <a:font script="Mlym" typeface="Kartika"/>
+        <a:font script="Laoo" typeface="DokChampa"/>
+        <a:font script="Sinh" typeface="Iskoola Pota"/>
+        <a:font script="Mong" typeface="Mongolian Baiti"/>
+        <a:font script="Viet" typeface="Arial"/>
+        <a:font script="Uigh" typeface="Microsoft Uighur"/>
+        <a:font script="Geor" typeface="Sylfaen"/>
+        <a:font script="Armn" typeface="Arial"/>
+        <a:font script="Bugi" typeface="Leelawadee UI"/>
+        <a:font script="Bopo" typeface="Microsoft JhengHei"/>
+        <a:font script="Java" typeface="Javanese Text"/>
+        <a:font script="Lisu" typeface="Segoe UI"/>
+        <a:font script="Mymr" typeface="Myanmar Text"/>
+        <a:font script="Nkoo" typeface="Ebrima"/>
+        <a:font script="Olck" typeface="Nirmala UI"/>
+        <a:font script="Osma" typeface="Ebrima"/>
+        <a:font script="Phag" typeface="Phagspa"/>
+        <a:font script="Syrn" typeface="Estrangelo Edessa"/>
+        <a:font script="Syrj" typeface="Estrangelo Edessa"/>
+        <a:font script="Syre" typeface="Estrangelo Edessa"/>
+        <a:font script="Sora" typeface="Nirmala UI"/>
+        <a:font script="Tale" typeface="Microsoft Tai Le"/>
+        <a:font script="Talu" typeface="Microsoft New Tai Lue"/>
+        <a:font script="Tfng" typeface="Ebrima"/>
+      </a:minorFont>
+    </a:fontScheme>
+    <a:fmtScheme name="Office">
+      <a:fillStyleLst>
+        <a:solidFill>
+          <a:schemeClr val="phClr"/>
+        </a:solidFill>
+        <a:gradFill rotWithShape="1">
+          <a:gsLst>
+            <a:gs pos="0">
+              <a:schemeClr val="phClr">
+                <a:lumMod val="110000"/>
+                <a:satMod val="105000"/>
+                <a:tint val="67000"/>
+              </a:schemeClr>
+            </a:gs>
+            <a:gs pos="50000">
+              <a:schemeClr val="phClr">
+                <a:lumMod val="105000"/>
+                <a:satMod val="103000"/>
+                <a:tint val="73000"/>
+              </a:schemeClr>
+            </a:gs>
+            <a:gs pos="100000">
+              <a:schemeClr val="phClr">
+                <a:lumMod val="105000"/>
+                <a:satMod val="109000"/>
+                <a:tint val="81000"/>
+              </a:schemeClr>
+            </a:gs>
+          </a:gsLst>
+          <a:lin ang="5400000" scaled="0"/>
+        </a:gradFill>
+        <a:gradFill rotWithShape="1">
+          <a:gsLst>
+            <a:gs pos="0">
+              <a:schemeClr val="phClr">
+                <a:satMod val="103000"/>
+                <a:lumMod val="102000"/>
+                <a:tint val="94000"/>
+              </a:schemeClr>
+            </a:gs>
+            <a:gs pos="50000">
+              <a:schemeClr val="phClr">
+                <a:satMod val="110000"/>
+                <a:lumMod val="100000"/>
+                <a:shade val="100000"/>
+              </a:schemeClr>
+            </a:gs>
+            <a:gs pos="100000">
+              <a:schemeClr val="phClr">
+                <a:lumMod val="99000"/>
+                <a:satMod val="120000"/>
+                <a:shade val="78000"/>
+              </a:schemeClr>
+            </a:gs>
+          </a:gsLst>
+          <a:lin ang="5400000" scaled="0"/>
+        </a:gradFill>
+      </a:fillStyleLst>
+      <a:lnStyleLst>
+        <a:ln w="6350" cap="flat" cmpd="sng" algn="ctr">
+          <a:solidFill>
+            <a:schemeClr val="phClr"/>
+          </a:solidFill>
+          <a:prstDash val="solid"/>
+          <a:miter lim="800000"/>
+        </a:ln>
+        <a:ln w="12700" cap="flat" cmpd="sng" algn="ctr">
+          <a:solidFill>
+            <a:schemeClr val="phClr"/>
+          </a:solidFill>
+          <a:prstDash val="solid"/>
+          <a:miter lim="800000"/>
+        </a:ln>
+        <a:ln w="19050" cap="flat" cmpd="sng" algn="ctr">
+          <a:solidFill>
+            <a:schemeClr val="phClr"/>
+          </a:solidFill>
+          <a:prstDash val="solid"/>
+          <a:miter lim="800000"/>
+        </a:ln>
+      </a:lnStyleLst>
+      <a:effectStyleLst>
+        <a:effectStyle>
+          <a:effectLst/>
+        </a:effectStyle>
+        <a:effectStyle>
+          <a:effectLst/>
+        </a:effectStyle>
+        <a:effectStyle>
+          <a:effectLst>
+            <a:outerShdw blurRad="57150" dist="19050" dir="5400000" algn="ctr" rotWithShape="0">
+              <a:srgbClr val="000000">
+                <a:alpha val="63000"/>
+              </a:srgbClr>
+            </a:outerShdw>
+          </a:effectLst>
+        </a:effectStyle>
+      </a:effectStyleLst>
+      <a:bgFillStyleLst>
+        <a:solidFill>
+          <a:schemeClr val="phClr"/>
+        </a:solidFill>
+        <a:solidFill>
+          <a:schemeClr val="phClr">
+            <a:tint val="95000"/>
+            <a:satMod val="170000"/>
+          </a:schemeClr>
+        </a:solidFill>
+        <a:gradFill rotWithShape="1">
+          <a:gsLst>
+            <a:gs pos="0">
+              <a:schemeClr val="phClr">
+                <a:tint val="93000"/>
+                <a:satMod val="150000"/>
+                <a:shade val="98000"/>
+                <a:lumMod val="102000"/>
+              </a:schemeClr>
+            </a:gs>
+            <a:gs pos="50000">
+              <a:schemeClr val="phClr">
+                <a:tint val="98000"/>
+                <a:satMod val="130000"/>
+                <a:shade val="90000"/>
+                <a:lumMod val="103000"/>
+              </a:schemeClr>
+            </a:gs>
+            <a:gs pos="100000">
+              <a:schemeClr val="phClr">
+                <a:shade val="63000"/>
+                <a:satMod val="120000"/>
+              </a:schemeClr>
+            </a:gs>
+          </a:gsLst>
+          <a:lin ang="5400000" scaled="0"/>
+        </a:gradFill>
+      </a:bgFillStyleLst>
+    </a:fmtScheme>
+  </a:themeElements>
+  <a:objectDefaults/>
+  <a:extraClrSchemeLst/>
+  <a:extLst>
+    <a:ext uri="{05A4C25C-085E-4340-85A3-A5531E510DB2}">
+      <thm15:themeFamily xmlns:thm15="http://schemas.microsoft.com/office/thememl/2012/main" name="Office Theme" id="{62F939B6-93AF-4DB8-9C6B-D6C7DFDC589F}" vid="{4A3C46E8-61CC-4603-A589-7422A47A8E4A}"/>
+    </a:ext>
+  </a:extLst>
+</a:theme>
 </file>
</xml_diff>

<commit_message>
powerpoint and rmd work + data files into folder dataset
</commit_message>
<xml_diff>
--- a/Beers_and_Breweries.pptx
+++ b/Beers_and_Breweries.pptx
@@ -5,7 +5,7 @@
     <p:sldMasterId id="2147483648" r:id="rId1"/>
   </p:sldMasterIdLst>
   <p:notesMasterIdLst>
-    <p:notesMasterId r:id="rId23"/>
+    <p:notesMasterId r:id="rId25"/>
   </p:notesMasterIdLst>
   <p:sldIdLst>
     <p:sldId id="256" r:id="rId2"/>
@@ -13,22 +13,24 @@
     <p:sldId id="268" r:id="rId4"/>
     <p:sldId id="269" r:id="rId5"/>
     <p:sldId id="265" r:id="rId6"/>
-    <p:sldId id="258" r:id="rId7"/>
-    <p:sldId id="260" r:id="rId8"/>
-    <p:sldId id="272" r:id="rId9"/>
-    <p:sldId id="266" r:id="rId10"/>
-    <p:sldId id="271" r:id="rId11"/>
-    <p:sldId id="259" r:id="rId12"/>
-    <p:sldId id="273" r:id="rId13"/>
-    <p:sldId id="274" r:id="rId14"/>
-    <p:sldId id="263" r:id="rId15"/>
-    <p:sldId id="264" r:id="rId16"/>
-    <p:sldId id="275" r:id="rId17"/>
-    <p:sldId id="261" r:id="rId18"/>
-    <p:sldId id="262" r:id="rId19"/>
-    <p:sldId id="276" r:id="rId20"/>
-    <p:sldId id="278" r:id="rId21"/>
-    <p:sldId id="277" r:id="rId22"/>
+    <p:sldId id="260" r:id="rId7"/>
+    <p:sldId id="272" r:id="rId8"/>
+    <p:sldId id="266" r:id="rId9"/>
+    <p:sldId id="271" r:id="rId10"/>
+    <p:sldId id="273" r:id="rId11"/>
+    <p:sldId id="274" r:id="rId12"/>
+    <p:sldId id="263" r:id="rId13"/>
+    <p:sldId id="264" r:id="rId14"/>
+    <p:sldId id="275" r:id="rId15"/>
+    <p:sldId id="261" r:id="rId16"/>
+    <p:sldId id="262" r:id="rId17"/>
+    <p:sldId id="276" r:id="rId18"/>
+    <p:sldId id="279" r:id="rId19"/>
+    <p:sldId id="280" r:id="rId20"/>
+    <p:sldId id="281" r:id="rId21"/>
+    <p:sldId id="282" r:id="rId22"/>
+    <p:sldId id="283" r:id="rId23"/>
+    <p:sldId id="277" r:id="rId24"/>
   </p:sldIdLst>
   <p:sldSz cx="12192000" cy="6858000"/>
   <p:notesSz cx="6858000" cy="9144000"/>
@@ -217,7 +219,7 @@
           <a:p>
             <a:fld id="{99C1D520-A1CA-4161-B5D5-FF1CB1424987}" type="datetimeFigureOut">
               <a:rPr lang="en-US" smtClean="0"/>
-              <a:t>2/23/2021</a:t>
+              <a:t>3/7/2021</a:t>
             </a:fld>
             <a:endParaRPr lang="en-US"/>
           </a:p>
@@ -620,7 +622,22 @@
           <a:p>
             <a:r>
               <a:rPr lang="en-US" dirty="0"/>
-              <a:t>New Mexico has the minimum IBU median and West Virginia has the max median IBU.  </a:t>
+              <a:t>Maybe this is not a surprise since there are 40+ breweries in CO.</a:t>
+            </a:r>
+          </a:p>
+          <a:p>
+            <a:endParaRPr lang="en-US" dirty="0"/>
+          </a:p>
+          <a:p>
+            <a:r>
+              <a:rPr lang="en-US" dirty="0"/>
+              <a:t>Colorado has an unusually high number of breweries, and as such there is more opportunity to see a variety of ABV’s. </a:t>
+            </a:r>
+          </a:p>
+          <a:p>
+            <a:r>
+              <a:rPr lang="en-US" dirty="0"/>
+              <a:t>Oregon is where hops are grown, and very hoppy beers are popular there. </a:t>
             </a:r>
           </a:p>
         </p:txBody>
@@ -642,7 +659,7 @@
           <a:p>
             <a:fld id="{501499A2-1326-4FB0-82A2-456B0524BFAF}" type="slidenum">
               <a:rPr lang="en-US" smtClean="0"/>
-              <a:t>13</a:t>
+              <a:t>12</a:t>
             </a:fld>
             <a:endParaRPr lang="en-US"/>
           </a:p>
@@ -651,7 +668,7 @@
     </p:spTree>
     <p:extLst>
       <p:ext uri="{BB962C8B-B14F-4D97-AF65-F5344CB8AC3E}">
-        <p14:creationId xmlns:p14="http://schemas.microsoft.com/office/powerpoint/2010/main" val="329350997"/>
+        <p14:creationId xmlns:p14="http://schemas.microsoft.com/office/powerpoint/2010/main" val="3853197354"/>
       </p:ext>
     </p:extLst>
   </p:cSld>
@@ -707,11 +724,8 @@
           <a:p>
             <a:r>
               <a:rPr lang="en-US" dirty="0"/>
-              <a:t>Maybe this is not a surprise since there are 40+ breweries in CO</a:t>
-            </a:r>
-          </a:p>
-          <a:p>
-            <a:endParaRPr lang="en-US" dirty="0"/>
+              <a:t>The IBU distribution is right-skewed which could indicate that more bitter beer is less popular and thus sold less. </a:t>
+            </a:r>
           </a:p>
         </p:txBody>
       </p:sp>
@@ -732,7 +746,7 @@
           <a:p>
             <a:fld id="{501499A2-1326-4FB0-82A2-456B0524BFAF}" type="slidenum">
               <a:rPr lang="en-US" smtClean="0"/>
-              <a:t>14</a:t>
+              <a:t>13</a:t>
             </a:fld>
             <a:endParaRPr lang="en-US"/>
           </a:p>
@@ -741,7 +755,7 @@
     </p:spTree>
     <p:extLst>
       <p:ext uri="{BB962C8B-B14F-4D97-AF65-F5344CB8AC3E}">
-        <p14:creationId xmlns:p14="http://schemas.microsoft.com/office/powerpoint/2010/main" val="3853197354"/>
+        <p14:creationId xmlns:p14="http://schemas.microsoft.com/office/powerpoint/2010/main" val="3815663650"/>
       </p:ext>
     </p:extLst>
   </p:cSld>
@@ -797,7 +811,13 @@
           <a:p>
             <a:r>
               <a:rPr lang="en-US" dirty="0"/>
-              <a:t>Most of the beer is located around the lower IBU which could indicate that more bitter beer is less popular and thus sold less. </a:t>
+              <a:t>The ABV distribution is slightly right skewed. ABV can only ever be positive which might explain the skew.</a:t>
+            </a:r>
+          </a:p>
+          <a:p>
+            <a:r>
+              <a:rPr lang="en-US" dirty="0"/>
+              <a:t>It seems that most popular beers will have around 5% ABV.</a:t>
             </a:r>
           </a:p>
         </p:txBody>
@@ -819,7 +839,7 @@
           <a:p>
             <a:fld id="{501499A2-1326-4FB0-82A2-456B0524BFAF}" type="slidenum">
               <a:rPr lang="en-US" smtClean="0"/>
-              <a:t>15</a:t>
+              <a:t>14</a:t>
             </a:fld>
             <a:endParaRPr lang="en-US"/>
           </a:p>
@@ -828,7 +848,7 @@
     </p:spTree>
     <p:extLst>
       <p:ext uri="{BB962C8B-B14F-4D97-AF65-F5344CB8AC3E}">
-        <p14:creationId xmlns:p14="http://schemas.microsoft.com/office/powerpoint/2010/main" val="3815663650"/>
+        <p14:creationId xmlns:p14="http://schemas.microsoft.com/office/powerpoint/2010/main" val="15604416"/>
       </p:ext>
     </p:extLst>
   </p:cSld>
@@ -884,7 +904,7 @@
           <a:p>
             <a:r>
               <a:rPr lang="en-US" dirty="0"/>
-              <a:t>It seems that most popular beers will have around 5% ABV so that is the peak we see in the middle. </a:t>
+              <a:t>Minimum ABV is 0.027, the maximum ABV is 0.128. The minimum being 2.7 suggests no non-alcoholic beer is present in our dataset and that the lowest ABV is like a Raddler or a VERY weak session ale. The highest ABV is consistent with Barley wines, Imperial Stouts, or other High gravity beers. The inter-quartile range for the mean 50% of beers ranges from .050 to .0670 suggesting most craft beers have a predictable ABV. </a:t>
             </a:r>
           </a:p>
         </p:txBody>
@@ -906,7 +926,7 @@
           <a:p>
             <a:fld id="{501499A2-1326-4FB0-82A2-456B0524BFAF}" type="slidenum">
               <a:rPr lang="en-US" smtClean="0"/>
-              <a:t>16</a:t>
+              <a:t>15</a:t>
             </a:fld>
             <a:endParaRPr lang="en-US"/>
           </a:p>
@@ -915,7 +935,7 @@
     </p:spTree>
     <p:extLst>
       <p:ext uri="{BB962C8B-B14F-4D97-AF65-F5344CB8AC3E}">
-        <p14:creationId xmlns:p14="http://schemas.microsoft.com/office/powerpoint/2010/main" val="15604416"/>
+        <p14:creationId xmlns:p14="http://schemas.microsoft.com/office/powerpoint/2010/main" val="3712324901"/>
       </p:ext>
     </p:extLst>
   </p:cSld>
@@ -971,7 +991,13 @@
           <a:p>
             <a:r>
               <a:rPr lang="en-US" dirty="0"/>
-              <a:t>Maybe we can mention min and max? maybe median/mean</a:t>
+              <a:t>As can be seen, here are the scatter plots for IBU vs ABV, colorized by state with an ordinary least square's regression line. </a:t>
+            </a:r>
+          </a:p>
+          <a:p>
+            <a:r>
+              <a:rPr lang="en-US" dirty="0"/>
+              <a:t>These plots suggest visually that there is indeed a linear relationship between IBU and ABV and that there are some outliers at the very high and low ABV values. </a:t>
             </a:r>
           </a:p>
         </p:txBody>
@@ -993,7 +1019,7 @@
           <a:p>
             <a:fld id="{501499A2-1326-4FB0-82A2-456B0524BFAF}" type="slidenum">
               <a:rPr lang="en-US" smtClean="0"/>
-              <a:t>17</a:t>
+              <a:t>16</a:t>
             </a:fld>
             <a:endParaRPr lang="en-US"/>
           </a:p>
@@ -1002,7 +1028,7 @@
     </p:spTree>
     <p:extLst>
       <p:ext uri="{BB962C8B-B14F-4D97-AF65-F5344CB8AC3E}">
-        <p14:creationId xmlns:p14="http://schemas.microsoft.com/office/powerpoint/2010/main" val="3712324901"/>
+        <p14:creationId xmlns:p14="http://schemas.microsoft.com/office/powerpoint/2010/main" val="1904811706"/>
       </p:ext>
     </p:extLst>
   </p:cSld>
@@ -1056,7 +1082,10 @@
           <a:bodyPr/>
           <a:lstStyle/>
           <a:p>
-            <a:endParaRPr lang="en-US" dirty="0"/>
+            <a:r>
+              <a:rPr lang="en-US" dirty="0"/>
+              <a:t>This is the same plot as the slide before except not colorized and fitted with a linear model line. </a:t>
+            </a:r>
           </a:p>
         </p:txBody>
       </p:sp>
@@ -1077,7 +1106,7 @@
           <a:p>
             <a:fld id="{501499A2-1326-4FB0-82A2-456B0524BFAF}" type="slidenum">
               <a:rPr lang="en-US" smtClean="0"/>
-              <a:t>18</a:t>
+              <a:t>17</a:t>
             </a:fld>
             <a:endParaRPr lang="en-US"/>
           </a:p>
@@ -1086,7 +1115,7 @@
     </p:spTree>
     <p:extLst>
       <p:ext uri="{BB962C8B-B14F-4D97-AF65-F5344CB8AC3E}">
-        <p14:creationId xmlns:p14="http://schemas.microsoft.com/office/powerpoint/2010/main" val="1904811706"/>
+        <p14:creationId xmlns:p14="http://schemas.microsoft.com/office/powerpoint/2010/main" val="900710725"/>
       </p:ext>
     </p:extLst>
   </p:cSld>
@@ -1142,16 +1171,13 @@
           <a:p>
             <a:r>
               <a:rPr lang="en-US" dirty="0"/>
-              <a:t>You might be wondering, “Why did they choose to impute the missing IBU by style?” It seemed to make the most sense as two different beers in the same style family will share an IBU or ABV close to the others in them. </a:t>
-            </a:r>
-          </a:p>
-          <a:p>
-            <a:endParaRPr lang="en-US" dirty="0"/>
-          </a:p>
-          <a:p>
-            <a:r>
-              <a:rPr lang="en-US" dirty="0"/>
-              <a:t>Thank you for your time and we are open to questions.</a:t>
+              <a:t>As you can see both distributions are right skewed, and for a set ABV value IPA’s are more right skewed. </a:t>
+            </a:r>
+          </a:p>
+          <a:p>
+            <a:r>
+              <a:rPr lang="en-US" dirty="0"/>
+              <a:t>It is possible that discerning IPA drinkers might drink fewer beers or pay more for their beer and as such require a higher ABV to get the same buzz.</a:t>
             </a:r>
           </a:p>
         </p:txBody>
@@ -1173,7 +1199,7 @@
           <a:p>
             <a:fld id="{501499A2-1326-4FB0-82A2-456B0524BFAF}" type="slidenum">
               <a:rPr lang="en-US" smtClean="0"/>
-              <a:t>20</a:t>
+              <a:t>18</a:t>
             </a:fld>
             <a:endParaRPr lang="en-US"/>
           </a:p>
@@ -1182,7 +1208,7 @@
     </p:spTree>
     <p:extLst>
       <p:ext uri="{BB962C8B-B14F-4D97-AF65-F5344CB8AC3E}">
-        <p14:creationId xmlns:p14="http://schemas.microsoft.com/office/powerpoint/2010/main" val="402198552"/>
+        <p14:creationId xmlns:p14="http://schemas.microsoft.com/office/powerpoint/2010/main" val="3757662064"/>
       </p:ext>
     </p:extLst>
   </p:cSld>
@@ -1236,7 +1262,193 @@
           <a:bodyPr/>
           <a:lstStyle/>
           <a:p>
+            <a:r>
+              <a:rPr lang="en-US" dirty="0"/>
+              <a:t>As you can see the red line shows the trend for IPA and the blue shows the trend for Other ale. </a:t>
+            </a:r>
+          </a:p>
+          <a:p>
             <a:endParaRPr lang="en-US" dirty="0"/>
+          </a:p>
+          <a:p>
+            <a:r>
+              <a:rPr lang="en-US" dirty="0"/>
+              <a:t>IPAs are generally hoppier  for the same ABV  when compared to Other Ales. This is likely because IPAs use a lot of hops in the brewing process.</a:t>
+            </a:r>
+          </a:p>
+        </p:txBody>
+      </p:sp>
+      <p:sp>
+        <p:nvSpPr>
+          <p:cNvPr id="4" name="Slide Number Placeholder 3"/>
+          <p:cNvSpPr>
+            <a:spLocks noGrp="1"/>
+          </p:cNvSpPr>
+          <p:nvPr>
+            <p:ph type="sldNum" sz="quarter" idx="5"/>
+          </p:nvPr>
+        </p:nvSpPr>
+        <p:spPr/>
+        <p:txBody>
+          <a:bodyPr/>
+          <a:lstStyle/>
+          <a:p>
+            <a:fld id="{501499A2-1326-4FB0-82A2-456B0524BFAF}" type="slidenum">
+              <a:rPr lang="en-US" smtClean="0"/>
+              <a:t>19</a:t>
+            </a:fld>
+            <a:endParaRPr lang="en-US"/>
+          </a:p>
+        </p:txBody>
+      </p:sp>
+    </p:spTree>
+    <p:extLst>
+      <p:ext uri="{BB962C8B-B14F-4D97-AF65-F5344CB8AC3E}">
+        <p14:creationId xmlns:p14="http://schemas.microsoft.com/office/powerpoint/2010/main" val="2289104831"/>
+      </p:ext>
+    </p:extLst>
+  </p:cSld>
+  <p:clrMapOvr>
+    <a:masterClrMapping/>
+  </p:clrMapOvr>
+</p:notes>
+</file>
+
+<file path=ppt/notesSlides/notesSlide18.xml><?xml version="1.0" encoding="utf-8"?>
+<p:notes xmlns:a="http://schemas.openxmlformats.org/drawingml/2006/main" xmlns:r="http://schemas.openxmlformats.org/officeDocument/2006/relationships" xmlns:p="http://schemas.openxmlformats.org/presentationml/2006/main">
+  <p:cSld>
+    <p:spTree>
+      <p:nvGrpSpPr>
+        <p:cNvPr id="1" name=""/>
+        <p:cNvGrpSpPr/>
+        <p:nvPr/>
+      </p:nvGrpSpPr>
+      <p:grpSpPr>
+        <a:xfrm>
+          <a:off x="0" y="0"/>
+          <a:ext cx="0" cy="0"/>
+          <a:chOff x="0" y="0"/>
+          <a:chExt cx="0" cy="0"/>
+        </a:xfrm>
+      </p:grpSpPr>
+      <p:sp>
+        <p:nvSpPr>
+          <p:cNvPr id="2" name="Slide Image Placeholder 1"/>
+          <p:cNvSpPr>
+            <a:spLocks noGrp="1" noRot="1" noChangeAspect="1"/>
+          </p:cNvSpPr>
+          <p:nvPr>
+            <p:ph type="sldImg"/>
+          </p:nvPr>
+        </p:nvSpPr>
+        <p:spPr/>
+      </p:sp>
+      <p:sp>
+        <p:nvSpPr>
+          <p:cNvPr id="3" name="Notes Placeholder 2"/>
+          <p:cNvSpPr>
+            <a:spLocks noGrp="1"/>
+          </p:cNvSpPr>
+          <p:nvPr>
+            <p:ph type="body" idx="1"/>
+          </p:nvPr>
+        </p:nvSpPr>
+        <p:spPr/>
+        <p:txBody>
+          <a:bodyPr/>
+          <a:lstStyle/>
+          <a:p>
+            <a:r>
+              <a:rPr lang="en-US" dirty="0"/>
+              <a:t>Our successful classification of IPAs vs Other Ales reinforces the notions that the relationship between IBU and ABV are different between IPA’s and Other Ales. The reasons for this might include the aforementioned slides. </a:t>
+            </a:r>
+          </a:p>
+        </p:txBody>
+      </p:sp>
+      <p:sp>
+        <p:nvSpPr>
+          <p:cNvPr id="4" name="Slide Number Placeholder 3"/>
+          <p:cNvSpPr>
+            <a:spLocks noGrp="1"/>
+          </p:cNvSpPr>
+          <p:nvPr>
+            <p:ph type="sldNum" sz="quarter" idx="5"/>
+          </p:nvPr>
+        </p:nvSpPr>
+        <p:spPr/>
+        <p:txBody>
+          <a:bodyPr/>
+          <a:lstStyle/>
+          <a:p>
+            <a:fld id="{501499A2-1326-4FB0-82A2-456B0524BFAF}" type="slidenum">
+              <a:rPr lang="en-US" smtClean="0"/>
+              <a:t>20</a:t>
+            </a:fld>
+            <a:endParaRPr lang="en-US"/>
+          </a:p>
+        </p:txBody>
+      </p:sp>
+    </p:spTree>
+    <p:extLst>
+      <p:ext uri="{BB962C8B-B14F-4D97-AF65-F5344CB8AC3E}">
+        <p14:creationId xmlns:p14="http://schemas.microsoft.com/office/powerpoint/2010/main" val="3693712081"/>
+      </p:ext>
+    </p:extLst>
+  </p:cSld>
+  <p:clrMapOvr>
+    <a:masterClrMapping/>
+  </p:clrMapOvr>
+</p:notes>
+</file>
+
+<file path=ppt/notesSlides/notesSlide19.xml><?xml version="1.0" encoding="utf-8"?>
+<p:notes xmlns:a="http://schemas.openxmlformats.org/drawingml/2006/main" xmlns:r="http://schemas.openxmlformats.org/officeDocument/2006/relationships" xmlns:p="http://schemas.openxmlformats.org/presentationml/2006/main">
+  <p:cSld>
+    <p:spTree>
+      <p:nvGrpSpPr>
+        <p:cNvPr id="1" name=""/>
+        <p:cNvGrpSpPr/>
+        <p:nvPr/>
+      </p:nvGrpSpPr>
+      <p:grpSpPr>
+        <a:xfrm>
+          <a:off x="0" y="0"/>
+          <a:ext cx="0" cy="0"/>
+          <a:chOff x="0" y="0"/>
+          <a:chExt cx="0" cy="0"/>
+        </a:xfrm>
+      </p:grpSpPr>
+      <p:sp>
+        <p:nvSpPr>
+          <p:cNvPr id="2" name="Slide Image Placeholder 1"/>
+          <p:cNvSpPr>
+            <a:spLocks noGrp="1" noRot="1" noChangeAspect="1"/>
+          </p:cNvSpPr>
+          <p:nvPr>
+            <p:ph type="sldImg"/>
+          </p:nvPr>
+        </p:nvSpPr>
+        <p:spPr/>
+      </p:sp>
+      <p:sp>
+        <p:nvSpPr>
+          <p:cNvPr id="3" name="Notes Placeholder 2"/>
+          <p:cNvSpPr>
+            <a:spLocks noGrp="1"/>
+          </p:cNvSpPr>
+          <p:nvPr>
+            <p:ph type="body" idx="1"/>
+          </p:nvPr>
+        </p:nvSpPr>
+        <p:spPr/>
+        <p:txBody>
+          <a:bodyPr/>
+          <a:lstStyle/>
+          <a:p>
+            <a:r>
+              <a:rPr lang="en-US" dirty="0"/>
+              <a:t>Note that ratios between 12- and 16-ounce ales are different for each state highlighting potentially different preferences by state. </a:t>
+            </a:r>
           </a:p>
         </p:txBody>
       </p:sp>
@@ -1266,7 +1478,7 @@
     </p:spTree>
     <p:extLst>
       <p:ext uri="{BB962C8B-B14F-4D97-AF65-F5344CB8AC3E}">
-        <p14:creationId xmlns:p14="http://schemas.microsoft.com/office/powerpoint/2010/main" val="1010454502"/>
+        <p14:creationId xmlns:p14="http://schemas.microsoft.com/office/powerpoint/2010/main" val="2507742313"/>
       </p:ext>
     </p:extLst>
   </p:cSld>
@@ -1354,6 +1566,195 @@
     <p:extLst>
       <p:ext uri="{BB962C8B-B14F-4D97-AF65-F5344CB8AC3E}">
         <p14:creationId xmlns:p14="http://schemas.microsoft.com/office/powerpoint/2010/main" val="63313948"/>
+      </p:ext>
+    </p:extLst>
+  </p:cSld>
+  <p:clrMapOvr>
+    <a:masterClrMapping/>
+  </p:clrMapOvr>
+</p:notes>
+</file>
+
+<file path=ppt/notesSlides/notesSlide20.xml><?xml version="1.0" encoding="utf-8"?>
+<p:notes xmlns:a="http://schemas.openxmlformats.org/drawingml/2006/main" xmlns:r="http://schemas.openxmlformats.org/officeDocument/2006/relationships" xmlns:p="http://schemas.openxmlformats.org/presentationml/2006/main">
+  <p:cSld>
+    <p:spTree>
+      <p:nvGrpSpPr>
+        <p:cNvPr id="1" name=""/>
+        <p:cNvGrpSpPr/>
+        <p:nvPr/>
+      </p:nvGrpSpPr>
+      <p:grpSpPr>
+        <a:xfrm>
+          <a:off x="0" y="0"/>
+          <a:ext cx="0" cy="0"/>
+          <a:chOff x="0" y="0"/>
+          <a:chExt cx="0" cy="0"/>
+        </a:xfrm>
+      </p:grpSpPr>
+      <p:sp>
+        <p:nvSpPr>
+          <p:cNvPr id="2" name="Slide Image Placeholder 1"/>
+          <p:cNvSpPr>
+            <a:spLocks noGrp="1" noRot="1" noChangeAspect="1"/>
+          </p:cNvSpPr>
+          <p:nvPr>
+            <p:ph type="sldImg"/>
+          </p:nvPr>
+        </p:nvSpPr>
+        <p:spPr/>
+      </p:sp>
+      <p:sp>
+        <p:nvSpPr>
+          <p:cNvPr id="3" name="Notes Placeholder 2"/>
+          <p:cNvSpPr>
+            <a:spLocks noGrp="1"/>
+          </p:cNvSpPr>
+          <p:nvPr>
+            <p:ph type="body" idx="1"/>
+          </p:nvPr>
+        </p:nvSpPr>
+        <p:spPr/>
+        <p:txBody>
+          <a:bodyPr/>
+          <a:lstStyle/>
+          <a:p>
+            <a:r>
+              <a:rPr lang="en-US" dirty="0"/>
+              <a:t>This suggests that when considering what size a beer should be sold in, it could be important to consider what state that beer is going to be brewed in. </a:t>
+            </a:r>
+          </a:p>
+          <a:p>
+            <a:endParaRPr lang="en-US" dirty="0"/>
+          </a:p>
+          <a:p>
+            <a:r>
+              <a:rPr lang="en-US" dirty="0"/>
+              <a:t>This helps align sales with the laws and preferences of that state. For example, Indiana has a high prevalence of 16 ounce ales, whereas Colorado or Texas both lean towards 12 ounce ales. It would be preferable to brew and sell 16 ounce beers in states like Indiana (or other states that have more 16 ounce ales) and 12 ounce beers in Colorado (or other states that have more 12 ounce ales).</a:t>
+            </a:r>
+          </a:p>
+          <a:p>
+            <a:endParaRPr lang="en-US" dirty="0"/>
+          </a:p>
+          <a:p>
+            <a:r>
+              <a:rPr lang="en-US" dirty="0"/>
+              <a:t>The reason for this association may be due to a variety of reasons including income, weather, local diet, and social norms for beer drinkers.</a:t>
+            </a:r>
+          </a:p>
+        </p:txBody>
+      </p:sp>
+      <p:sp>
+        <p:nvSpPr>
+          <p:cNvPr id="4" name="Slide Number Placeholder 3"/>
+          <p:cNvSpPr>
+            <a:spLocks noGrp="1"/>
+          </p:cNvSpPr>
+          <p:nvPr>
+            <p:ph type="sldNum" sz="quarter" idx="5"/>
+          </p:nvPr>
+        </p:nvSpPr>
+        <p:spPr/>
+        <p:txBody>
+          <a:bodyPr/>
+          <a:lstStyle/>
+          <a:p>
+            <a:fld id="{501499A2-1326-4FB0-82A2-456B0524BFAF}" type="slidenum">
+              <a:rPr lang="en-US" smtClean="0"/>
+              <a:t>22</a:t>
+            </a:fld>
+            <a:endParaRPr lang="en-US"/>
+          </a:p>
+        </p:txBody>
+      </p:sp>
+    </p:spTree>
+    <p:extLst>
+      <p:ext uri="{BB962C8B-B14F-4D97-AF65-F5344CB8AC3E}">
+        <p14:creationId xmlns:p14="http://schemas.microsoft.com/office/powerpoint/2010/main" val="3585949879"/>
+      </p:ext>
+    </p:extLst>
+  </p:cSld>
+  <p:clrMapOvr>
+    <a:masterClrMapping/>
+  </p:clrMapOvr>
+</p:notes>
+</file>
+
+<file path=ppt/notesSlides/notesSlide21.xml><?xml version="1.0" encoding="utf-8"?>
+<p:notes xmlns:a="http://schemas.openxmlformats.org/drawingml/2006/main" xmlns:r="http://schemas.openxmlformats.org/officeDocument/2006/relationships" xmlns:p="http://schemas.openxmlformats.org/presentationml/2006/main">
+  <p:cSld>
+    <p:spTree>
+      <p:nvGrpSpPr>
+        <p:cNvPr id="1" name=""/>
+        <p:cNvGrpSpPr/>
+        <p:nvPr/>
+      </p:nvGrpSpPr>
+      <p:grpSpPr>
+        <a:xfrm>
+          <a:off x="0" y="0"/>
+          <a:ext cx="0" cy="0"/>
+          <a:chOff x="0" y="0"/>
+          <a:chExt cx="0" cy="0"/>
+        </a:xfrm>
+      </p:grpSpPr>
+      <p:sp>
+        <p:nvSpPr>
+          <p:cNvPr id="2" name="Slide Image Placeholder 1"/>
+          <p:cNvSpPr>
+            <a:spLocks noGrp="1" noRot="1" noChangeAspect="1"/>
+          </p:cNvSpPr>
+          <p:nvPr>
+            <p:ph type="sldImg"/>
+          </p:nvPr>
+        </p:nvSpPr>
+        <p:spPr/>
+      </p:sp>
+      <p:sp>
+        <p:nvSpPr>
+          <p:cNvPr id="3" name="Notes Placeholder 2"/>
+          <p:cNvSpPr>
+            <a:spLocks noGrp="1"/>
+          </p:cNvSpPr>
+          <p:nvPr>
+            <p:ph type="body" idx="1"/>
+          </p:nvPr>
+        </p:nvSpPr>
+        <p:spPr/>
+        <p:txBody>
+          <a:bodyPr/>
+          <a:lstStyle/>
+          <a:p>
+            <a:endParaRPr lang="en-US" dirty="0"/>
+          </a:p>
+        </p:txBody>
+      </p:sp>
+      <p:sp>
+        <p:nvSpPr>
+          <p:cNvPr id="4" name="Slide Number Placeholder 3"/>
+          <p:cNvSpPr>
+            <a:spLocks noGrp="1"/>
+          </p:cNvSpPr>
+          <p:nvPr>
+            <p:ph type="sldNum" sz="quarter" idx="5"/>
+          </p:nvPr>
+        </p:nvSpPr>
+        <p:spPr/>
+        <p:txBody>
+          <a:bodyPr/>
+          <a:lstStyle/>
+          <a:p>
+            <a:fld id="{501499A2-1326-4FB0-82A2-456B0524BFAF}" type="slidenum">
+              <a:rPr lang="en-US" smtClean="0"/>
+              <a:t>23</a:t>
+            </a:fld>
+            <a:endParaRPr lang="en-US"/>
+          </a:p>
+        </p:txBody>
+      </p:sp>
+    </p:spTree>
+    <p:extLst>
+      <p:ext uri="{BB962C8B-B14F-4D97-AF65-F5344CB8AC3E}">
+        <p14:creationId xmlns:p14="http://schemas.microsoft.com/office/powerpoint/2010/main" val="1010454502"/>
       </p:ext>
     </p:extLst>
   </p:cSld>
@@ -1508,6 +1909,24 @@
               <a:t>The pie chart shows the number of unique breweries  in each state in a counterclockwise/alphabetic fashion. Starting from the 0 line and going CCW we can follow alphabetically and see that the chart goes from Arkansas to Wyoming. </a:t>
             </a:r>
           </a:p>
+          <a:p>
+            <a:endParaRPr lang="en-US" dirty="0"/>
+          </a:p>
+          <a:p>
+            <a:r>
+              <a:rPr lang="en-US" dirty="0"/>
+              <a:t>Potential reasons:</a:t>
+            </a:r>
+          </a:p>
+          <a:p>
+            <a:r>
+              <a:rPr lang="en-US" dirty="0"/>
+              <a:t>This is most likely due to factors such as state population,  state demographics and  availability of  materials. </a:t>
+            </a:r>
+          </a:p>
+          <a:p>
+            <a:endParaRPr lang="en-US" dirty="0"/>
+          </a:p>
         </p:txBody>
       </p:sp>
       <p:sp>
@@ -1592,7 +2011,16 @@
           <a:p>
             <a:r>
               <a:rPr lang="en-US" dirty="0"/>
-              <a:t>47 breweries in Colorado, 39 in California and 11 in Arizona</a:t>
+              <a:t>The left plot shows the percentage of missing values by attribute. The right plot gives a picture of the percentage of missing vs available data. The bars at the farthest right show the percentage size( from bottom to top) of 1) the available data, 2) the largest missing data attribute, 3) the next largest missing data</a:t>
+            </a:r>
+          </a:p>
+          <a:p>
+            <a:br>
+              <a:rPr lang="en-US" dirty="0"/>
+            </a:br>
+            <a:r>
+              <a:rPr lang="en-US" dirty="0"/>
+              <a:t>So here that would be, a large portion of the data is available. Next, IBU is missing a lot of data. Following that ABV, then Style and finally at the smallest is the 2 missing brewery ID’s. </a:t>
             </a:r>
           </a:p>
         </p:txBody>
@@ -1623,7 +2051,7 @@
     </p:spTree>
     <p:extLst>
       <p:ext uri="{BB962C8B-B14F-4D97-AF65-F5344CB8AC3E}">
-        <p14:creationId xmlns:p14="http://schemas.microsoft.com/office/powerpoint/2010/main" val="2118883328"/>
+        <p14:creationId xmlns:p14="http://schemas.microsoft.com/office/powerpoint/2010/main" val="474708762"/>
       </p:ext>
     </p:extLst>
   </p:cSld>
@@ -1679,16 +2107,93 @@
           <a:p>
             <a:r>
               <a:rPr lang="en-US" dirty="0"/>
-              <a:t>The left plot shows the percentage of missing values by attribute. The right plot gives a picture of the percentage of missing vs available data. The bars at the farthest right show the percentage size( from bottom to top) of 1) the available data, 2) the largest missing data attribute, 3) the next largest missing data</a:t>
-            </a:r>
-          </a:p>
-          <a:p>
-            <a:br>
-              <a:rPr lang="en-US" dirty="0"/>
-            </a:br>
-            <a:r>
-              <a:rPr lang="en-US" dirty="0"/>
-              <a:t>So here that would be, a large portion of the data is available. Next, IBU is missing a lot of data. Following that ABV, then Style and finally at the smallest is the 2 missing brewery ID’s. </a:t>
+              <a:t>Self explanatory slide.</a:t>
+            </a:r>
+          </a:p>
+          <a:p>
+            <a:r>
+              <a:rPr lang="en-US" dirty="0"/>
+              <a:t>Most ABVs were found through research, and some IBUs along with them</a:t>
+            </a:r>
+          </a:p>
+          <a:p>
+            <a:endParaRPr lang="en-US" dirty="0"/>
+          </a:p>
+          <a:p>
+            <a:r>
+              <a:rPr lang="en-US" dirty="0"/>
+              <a:t>We can talk about how imputing on both statistics can be detrimental to the data.</a:t>
+            </a:r>
+          </a:p>
+          <a:p>
+            <a:pPr marL="0" marR="0" lvl="0" indent="0" algn="l" defTabSz="914400" rtl="0" eaLnBrk="1" fontAlgn="auto" latinLnBrk="0" hangingPunct="1">
+              <a:lnSpc>
+                <a:spcPct val="100000"/>
+              </a:lnSpc>
+              <a:spcBef>
+                <a:spcPts val="0"/>
+              </a:spcBef>
+              <a:spcAft>
+                <a:spcPts val="0"/>
+              </a:spcAft>
+              <a:buClrTx/>
+              <a:buSzTx/>
+              <a:buFontTx/>
+              <a:buNone/>
+              <a:tabLst/>
+              <a:defRPr/>
+            </a:pPr>
+            <a:r>
+              <a:rPr lang="en-US" b="1" i="0" dirty="0">
+                <a:solidFill>
+                  <a:srgbClr val="A2B525"/>
+                </a:solidFill>
+                <a:effectLst/>
+                <a:latin typeface="Source Sans Pro" panose="020B0503030403020204" pitchFamily="34" charset="0"/>
+              </a:rPr>
+              <a:t>Problem #1: Mean imputation does not preserve the relationships among variables.</a:t>
+            </a:r>
+          </a:p>
+          <a:p>
+            <a:pPr marL="0" marR="0" lvl="0" indent="0" algn="l" defTabSz="914400" rtl="0" eaLnBrk="1" fontAlgn="auto" latinLnBrk="0" hangingPunct="1">
+              <a:lnSpc>
+                <a:spcPct val="100000"/>
+              </a:lnSpc>
+              <a:spcBef>
+                <a:spcPts val="0"/>
+              </a:spcBef>
+              <a:spcAft>
+                <a:spcPts val="0"/>
+              </a:spcAft>
+              <a:buClrTx/>
+              <a:buSzTx/>
+              <a:buFontTx/>
+              <a:buNone/>
+              <a:tabLst/>
+              <a:defRPr/>
+            </a:pPr>
+            <a:r>
+              <a:rPr lang="en-US" b="1" i="0" dirty="0">
+                <a:solidFill>
+                  <a:srgbClr val="A2B525"/>
+                </a:solidFill>
+                <a:effectLst/>
+                <a:latin typeface="Source Sans Pro" panose="020B0503030403020204" pitchFamily="34" charset="0"/>
+              </a:rPr>
+              <a:t>Problem #2: Mean Imputation Leads to An Underestimate of Standard Errors</a:t>
+            </a:r>
+            <a:endParaRPr lang="en-US" dirty="0"/>
+          </a:p>
+          <a:p>
+            <a:r>
+              <a:rPr lang="en-US" dirty="0"/>
+              <a:t>Source: https://www.theanalysisfactor.com/mean-imputation/ - although this is about mean imputation, I think the effects still apply.</a:t>
+            </a:r>
+          </a:p>
+          <a:p>
+            <a:r>
+              <a:rPr lang="en-US" dirty="0"/>
+              <a:t>I think the essential point is that any kind of imputation will bias the standard error because the model is not aware that we added these values in(that has its own error). If it was aware then the error could be added automatically but since it isn’t, it’s kind of biased. </a:t>
             </a:r>
           </a:p>
         </p:txBody>
@@ -1719,7 +2224,7 @@
     </p:spTree>
     <p:extLst>
       <p:ext uri="{BB962C8B-B14F-4D97-AF65-F5344CB8AC3E}">
-        <p14:creationId xmlns:p14="http://schemas.microsoft.com/office/powerpoint/2010/main" val="474708762"/>
+        <p14:creationId xmlns:p14="http://schemas.microsoft.com/office/powerpoint/2010/main" val="3740150068"/>
       </p:ext>
     </p:extLst>
   </p:cSld>
@@ -1773,96 +2278,7 @@
           <a:bodyPr/>
           <a:lstStyle/>
           <a:p>
-            <a:r>
-              <a:rPr lang="en-US" dirty="0"/>
-              <a:t>Self explanatory slide.</a:t>
-            </a:r>
-          </a:p>
-          <a:p>
-            <a:r>
-              <a:rPr lang="en-US" dirty="0"/>
-              <a:t>Most ABVs were found through research, and some IBUs along with them</a:t>
-            </a:r>
-          </a:p>
-          <a:p>
             <a:endParaRPr lang="en-US" dirty="0"/>
-          </a:p>
-          <a:p>
-            <a:r>
-              <a:rPr lang="en-US" dirty="0"/>
-              <a:t>We can talk about how imputing on both statistics can be detrimental to the data.</a:t>
-            </a:r>
-          </a:p>
-          <a:p>
-            <a:pPr marL="0" marR="0" lvl="0" indent="0" algn="l" defTabSz="914400" rtl="0" eaLnBrk="1" fontAlgn="auto" latinLnBrk="0" hangingPunct="1">
-              <a:lnSpc>
-                <a:spcPct val="100000"/>
-              </a:lnSpc>
-              <a:spcBef>
-                <a:spcPts val="0"/>
-              </a:spcBef>
-              <a:spcAft>
-                <a:spcPts val="0"/>
-              </a:spcAft>
-              <a:buClrTx/>
-              <a:buSzTx/>
-              <a:buFontTx/>
-              <a:buNone/>
-              <a:tabLst/>
-              <a:defRPr/>
-            </a:pPr>
-            <a:r>
-              <a:rPr lang="en-US" b="1" i="0" dirty="0">
-                <a:solidFill>
-                  <a:srgbClr val="A2B525"/>
-                </a:solidFill>
-                <a:effectLst/>
-                <a:latin typeface="Source Sans Pro" panose="020B0503030403020204" pitchFamily="34" charset="0"/>
-              </a:rPr>
-              <a:t>Problem #1: Mean imputation does not preserve the relationships among variables.</a:t>
-            </a:r>
-          </a:p>
-          <a:p>
-            <a:pPr marL="0" marR="0" lvl="0" indent="0" algn="l" defTabSz="914400" rtl="0" eaLnBrk="1" fontAlgn="auto" latinLnBrk="0" hangingPunct="1">
-              <a:lnSpc>
-                <a:spcPct val="100000"/>
-              </a:lnSpc>
-              <a:spcBef>
-                <a:spcPts val="0"/>
-              </a:spcBef>
-              <a:spcAft>
-                <a:spcPts val="0"/>
-              </a:spcAft>
-              <a:buClrTx/>
-              <a:buSzTx/>
-              <a:buFontTx/>
-              <a:buNone/>
-              <a:tabLst/>
-              <a:defRPr/>
-            </a:pPr>
-            <a:r>
-              <a:rPr lang="en-US" b="1" i="0" dirty="0">
-                <a:solidFill>
-                  <a:srgbClr val="A2B525"/>
-                </a:solidFill>
-                <a:effectLst/>
-                <a:latin typeface="Source Sans Pro" panose="020B0503030403020204" pitchFamily="34" charset="0"/>
-              </a:rPr>
-              <a:t>Problem #2: Mean Imputation Leads to An Underestimate of Standard Errors</a:t>
-            </a:r>
-            <a:endParaRPr lang="en-US" dirty="0"/>
-          </a:p>
-          <a:p>
-            <a:r>
-              <a:rPr lang="en-US" dirty="0"/>
-              <a:t>Source: https://www.theanalysisfactor.com/mean-imputation/ - although this is about mean imputation, I think the effects still apply.</a:t>
-            </a:r>
-          </a:p>
-          <a:p>
-            <a:r>
-              <a:rPr lang="en-US" dirty="0"/>
-              <a:t>I think the essential point is that any kind of imputation will bias the standard error because the model is not aware that we added these values in(that has its own error). If it was aware then the error could be added automatically but since it isn’t, it’s kind of biased. </a:t>
-            </a:r>
           </a:p>
         </p:txBody>
       </p:sp>
@@ -1892,7 +2308,7 @@
     </p:spTree>
     <p:extLst>
       <p:ext uri="{BB962C8B-B14F-4D97-AF65-F5344CB8AC3E}">
-        <p14:creationId xmlns:p14="http://schemas.microsoft.com/office/powerpoint/2010/main" val="3740150068"/>
+        <p14:creationId xmlns:p14="http://schemas.microsoft.com/office/powerpoint/2010/main" val="2290954208"/>
       </p:ext>
     </p:extLst>
   </p:cSld>
@@ -1946,6 +2362,38 @@
           <a:bodyPr/>
           <a:lstStyle/>
           <a:p>
+            <a:r>
+              <a:rPr lang="en-US" dirty="0"/>
+              <a:t>Kentucky has the highest median ABV. Utah has the lowest ABV per state (state law mandates 4.0% for most beers)</a:t>
+            </a:r>
+          </a:p>
+          <a:p>
+            <a:endParaRPr lang="en-US" dirty="0"/>
+          </a:p>
+          <a:p>
+            <a:pPr marL="0" marR="0" lvl="0" indent="0" algn="l" defTabSz="914400" rtl="0" eaLnBrk="1" fontAlgn="auto" latinLnBrk="0" hangingPunct="1">
+              <a:lnSpc>
+                <a:spcPct val="100000"/>
+              </a:lnSpc>
+              <a:spcBef>
+                <a:spcPts val="0"/>
+              </a:spcBef>
+              <a:spcAft>
+                <a:spcPts val="0"/>
+              </a:spcAft>
+              <a:buClrTx/>
+              <a:buSzTx/>
+              <a:buFontTx/>
+              <a:buNone/>
+              <a:tabLst/>
+              <a:defRPr/>
+            </a:pPr>
+            <a:r>
+              <a:rPr lang="en-US" dirty="0"/>
+              <a:t>This is likely due to a variety of reasons such as local laws, climate, demographics, local diet, income per capita, etc.</a:t>
+            </a:r>
+          </a:p>
+          <a:p>
             <a:endParaRPr lang="en-US" dirty="0"/>
           </a:p>
         </p:txBody>
@@ -1967,7 +2415,7 @@
           <a:p>
             <a:fld id="{501499A2-1326-4FB0-82A2-456B0524BFAF}" type="slidenum">
               <a:rPr lang="en-US" smtClean="0"/>
-              <a:t>9</a:t>
+              <a:t>10</a:t>
             </a:fld>
             <a:endParaRPr lang="en-US"/>
           </a:p>
@@ -1976,7 +2424,7 @@
     </p:spTree>
     <p:extLst>
       <p:ext uri="{BB962C8B-B14F-4D97-AF65-F5344CB8AC3E}">
-        <p14:creationId xmlns:p14="http://schemas.microsoft.com/office/powerpoint/2010/main" val="2290954208"/>
+        <p14:creationId xmlns:p14="http://schemas.microsoft.com/office/powerpoint/2010/main" val="1043697821"/>
       </p:ext>
     </p:extLst>
   </p:cSld>
@@ -2032,8 +2480,20 @@
           <a:p>
             <a:r>
               <a:rPr lang="en-US" dirty="0"/>
-              <a:t>Kentucky has the highest median abv, Utah has the lowest.</a:t>
-            </a:r>
+              <a:t>As you can see, West Virginia has the highest median IBU and New Hampshire has the lowest median IBU per state.</a:t>
+            </a:r>
+          </a:p>
+          <a:p>
+            <a:endParaRPr lang="en-US" dirty="0"/>
+          </a:p>
+          <a:p>
+            <a:r>
+              <a:rPr lang="en-US" dirty="0"/>
+              <a:t>Again, this is likely due to a variety of reasons such as local laws, climate, demographics, local diet, income per capita, etc.</a:t>
+            </a:r>
+          </a:p>
+          <a:p>
+            <a:endParaRPr lang="en-US" dirty="0"/>
           </a:p>
         </p:txBody>
       </p:sp>
@@ -2054,7 +2514,7 @@
           <a:p>
             <a:fld id="{501499A2-1326-4FB0-82A2-456B0524BFAF}" type="slidenum">
               <a:rPr lang="en-US" smtClean="0"/>
-              <a:t>12</a:t>
+              <a:t>11</a:t>
             </a:fld>
             <a:endParaRPr lang="en-US"/>
           </a:p>
@@ -2063,7 +2523,7 @@
     </p:spTree>
     <p:extLst>
       <p:ext uri="{BB962C8B-B14F-4D97-AF65-F5344CB8AC3E}">
-        <p14:creationId xmlns:p14="http://schemas.microsoft.com/office/powerpoint/2010/main" val="1043697821"/>
+        <p14:creationId xmlns:p14="http://schemas.microsoft.com/office/powerpoint/2010/main" val="329350997"/>
       </p:ext>
     </p:extLst>
   </p:cSld>
@@ -2220,7 +2680,7 @@
           <a:p>
             <a:fld id="{428E7421-5055-4702-868C-964BE14A0920}" type="datetimeFigureOut">
               <a:rPr lang="en-US" smtClean="0"/>
-              <a:t>2/23/2021</a:t>
+              <a:t>3/7/2021</a:t>
             </a:fld>
             <a:endParaRPr lang="en-US"/>
           </a:p>
@@ -2418,7 +2878,7 @@
           <a:p>
             <a:fld id="{428E7421-5055-4702-868C-964BE14A0920}" type="datetimeFigureOut">
               <a:rPr lang="en-US" smtClean="0"/>
-              <a:t>2/23/2021</a:t>
+              <a:t>3/7/2021</a:t>
             </a:fld>
             <a:endParaRPr lang="en-US"/>
           </a:p>
@@ -2626,7 +3086,7 @@
           <a:p>
             <a:fld id="{428E7421-5055-4702-868C-964BE14A0920}" type="datetimeFigureOut">
               <a:rPr lang="en-US" smtClean="0"/>
-              <a:t>2/23/2021</a:t>
+              <a:t>3/7/2021</a:t>
             </a:fld>
             <a:endParaRPr lang="en-US"/>
           </a:p>
@@ -2824,7 +3284,7 @@
           <a:p>
             <a:fld id="{428E7421-5055-4702-868C-964BE14A0920}" type="datetimeFigureOut">
               <a:rPr lang="en-US" smtClean="0"/>
-              <a:t>2/23/2021</a:t>
+              <a:t>3/7/2021</a:t>
             </a:fld>
             <a:endParaRPr lang="en-US"/>
           </a:p>
@@ -3099,7 +3559,7 @@
           <a:p>
             <a:fld id="{428E7421-5055-4702-868C-964BE14A0920}" type="datetimeFigureOut">
               <a:rPr lang="en-US" smtClean="0"/>
-              <a:t>2/23/2021</a:t>
+              <a:t>3/7/2021</a:t>
             </a:fld>
             <a:endParaRPr lang="en-US"/>
           </a:p>
@@ -3364,7 +3824,7 @@
           <a:p>
             <a:fld id="{428E7421-5055-4702-868C-964BE14A0920}" type="datetimeFigureOut">
               <a:rPr lang="en-US" smtClean="0"/>
-              <a:t>2/23/2021</a:t>
+              <a:t>3/7/2021</a:t>
             </a:fld>
             <a:endParaRPr lang="en-US"/>
           </a:p>
@@ -3776,7 +4236,7 @@
           <a:p>
             <a:fld id="{428E7421-5055-4702-868C-964BE14A0920}" type="datetimeFigureOut">
               <a:rPr lang="en-US" smtClean="0"/>
-              <a:t>2/23/2021</a:t>
+              <a:t>3/7/2021</a:t>
             </a:fld>
             <a:endParaRPr lang="en-US"/>
           </a:p>
@@ -3917,7 +4377,7 @@
           <a:p>
             <a:fld id="{428E7421-5055-4702-868C-964BE14A0920}" type="datetimeFigureOut">
               <a:rPr lang="en-US" smtClean="0"/>
-              <a:t>2/23/2021</a:t>
+              <a:t>3/7/2021</a:t>
             </a:fld>
             <a:endParaRPr lang="en-US"/>
           </a:p>
@@ -4030,7 +4490,7 @@
           <a:p>
             <a:fld id="{428E7421-5055-4702-868C-964BE14A0920}" type="datetimeFigureOut">
               <a:rPr lang="en-US" smtClean="0"/>
-              <a:t>2/23/2021</a:t>
+              <a:t>3/7/2021</a:t>
             </a:fld>
             <a:endParaRPr lang="en-US"/>
           </a:p>
@@ -4341,7 +4801,7 @@
           <a:p>
             <a:fld id="{428E7421-5055-4702-868C-964BE14A0920}" type="datetimeFigureOut">
               <a:rPr lang="en-US" smtClean="0"/>
-              <a:t>2/23/2021</a:t>
+              <a:t>3/7/2021</a:t>
             </a:fld>
             <a:endParaRPr lang="en-US"/>
           </a:p>
@@ -4629,7 +5089,7 @@
           <a:p>
             <a:fld id="{428E7421-5055-4702-868C-964BE14A0920}" type="datetimeFigureOut">
               <a:rPr lang="en-US" smtClean="0"/>
-              <a:t>2/23/2021</a:t>
+              <a:t>3/7/2021</a:t>
             </a:fld>
             <a:endParaRPr lang="en-US"/>
           </a:p>
@@ -4870,7 +5330,7 @@
           <a:p>
             <a:fld id="{428E7421-5055-4702-868C-964BE14A0920}" type="datetimeFigureOut">
               <a:rPr lang="en-US" smtClean="0"/>
-              <a:t>2/23/2021</a:t>
+              <a:t>3/7/2021</a:t>
             </a:fld>
             <a:endParaRPr lang="en-US"/>
           </a:p>
@@ -5393,7 +5853,7 @@
           <p:cNvPr id="2" name="Title 1">
             <a:extLst>
               <a:ext uri="{FF2B5EF4-FFF2-40B4-BE49-F238E27FC236}">
-                <a16:creationId xmlns:a16="http://schemas.microsoft.com/office/drawing/2014/main" id="{97E01514-23C4-BB46-82C6-B8B4857D3625}"/>
+                <a16:creationId xmlns:a16="http://schemas.microsoft.com/office/drawing/2014/main" id="{33CE4418-39BC-8C41-86AB-4B606F648865}"/>
               </a:ext>
             </a:extLst>
           </p:cNvPr>
@@ -5411,17 +5871,17 @@
           <a:p>
             <a:r>
               <a:rPr lang="en-US" dirty="0"/>
-              <a:t>Missing Data: IBU Imputation </a:t>
+              <a:t>Median ABV by State</a:t>
             </a:r>
           </a:p>
         </p:txBody>
       </p:sp>
       <p:pic>
         <p:nvPicPr>
-          <p:cNvPr id="4" name="Content Placeholder 3">
-            <a:extLst>
-              <a:ext uri="{FF2B5EF4-FFF2-40B4-BE49-F238E27FC236}">
-                <a16:creationId xmlns:a16="http://schemas.microsoft.com/office/drawing/2014/main" id="{6CE8CEF7-59D6-9B43-A414-FF6B13FF099A}"/>
+          <p:cNvPr id="7" name="Content Placeholder 6" descr="Chart, bar chart&#10;&#10;Description automatically generated">
+            <a:extLst>
+              <a:ext uri="{FF2B5EF4-FFF2-40B4-BE49-F238E27FC236}">
+                <a16:creationId xmlns:a16="http://schemas.microsoft.com/office/drawing/2014/main" id="{F6B83784-9DC2-4902-8DA3-7F07A229F54F}"/>
               </a:ext>
             </a:extLst>
           </p:cNvPr>
@@ -5432,168 +5892,28 @@
             <p:ph idx="1"/>
           </p:nvPr>
         </p:nvPicPr>
-        <p:blipFill>
-          <a:blip r:embed="rId2"/>
-          <a:stretch>
-            <a:fillRect/>
-          </a:stretch>
+        <p:blipFill rotWithShape="1">
+          <a:blip r:embed="rId3">
+            <a:extLst>
+              <a:ext uri="{28A0092B-C50C-407E-A947-70E740481C1C}">
+                <a14:useLocalDpi xmlns:a14="http://schemas.microsoft.com/office/drawing/2010/main" val="0"/>
+              </a:ext>
+            </a:extLst>
+          </a:blip>
+          <a:srcRect t="450" r="186"/>
+          <a:stretch/>
         </p:blipFill>
         <p:spPr>
           <a:xfrm>
-            <a:off x="6032524" y="4506760"/>
-            <a:ext cx="4983948" cy="1986115"/>
+            <a:off x="1397690" y="1498851"/>
+            <a:ext cx="9396620" cy="5232917"/>
           </a:xfrm>
-          <a:prstGeom prst="rect">
-            <a:avLst/>
-          </a:prstGeom>
         </p:spPr>
       </p:pic>
-      <p:pic>
-        <p:nvPicPr>
-          <p:cNvPr id="5" name="Picture 4">
-            <a:extLst>
-              <a:ext uri="{FF2B5EF4-FFF2-40B4-BE49-F238E27FC236}">
-                <a16:creationId xmlns:a16="http://schemas.microsoft.com/office/drawing/2014/main" id="{2C4381EC-D1A5-B440-A7EE-D7A0D7096518}"/>
-              </a:ext>
-            </a:extLst>
-          </p:cNvPr>
-          <p:cNvPicPr>
-            <a:picLocks noChangeAspect="1"/>
-          </p:cNvPicPr>
-          <p:nvPr/>
-        </p:nvPicPr>
-        <p:blipFill>
-          <a:blip r:embed="rId3"/>
-          <a:stretch>
-            <a:fillRect/>
-          </a:stretch>
-        </p:blipFill>
-        <p:spPr>
-          <a:xfrm>
-            <a:off x="6032524" y="1942728"/>
-            <a:ext cx="4974336" cy="1803196"/>
-          </a:xfrm>
-          <a:prstGeom prst="rect">
-            <a:avLst/>
-          </a:prstGeom>
-        </p:spPr>
-      </p:pic>
-      <p:sp>
-        <p:nvSpPr>
-          <p:cNvPr id="6" name="TextBox 5">
-            <a:extLst>
-              <a:ext uri="{FF2B5EF4-FFF2-40B4-BE49-F238E27FC236}">
-                <a16:creationId xmlns:a16="http://schemas.microsoft.com/office/drawing/2014/main" id="{8E93F844-83AD-F147-852E-791EB246F713}"/>
-              </a:ext>
-            </a:extLst>
-          </p:cNvPr>
-          <p:cNvSpPr txBox="1"/>
-          <p:nvPr/>
-        </p:nvSpPr>
-        <p:spPr>
-          <a:xfrm>
-            <a:off x="7187889" y="1573396"/>
-            <a:ext cx="2159117" cy="369332"/>
-          </a:xfrm>
-          <a:prstGeom prst="rect">
-            <a:avLst/>
-          </a:prstGeom>
-          <a:noFill/>
-        </p:spPr>
-        <p:txBody>
-          <a:bodyPr wrap="none" rtlCol="0">
-            <a:spAutoFit/>
-          </a:bodyPr>
-          <a:lstStyle/>
-          <a:p>
-            <a:r>
-              <a:rPr lang="en-US" dirty="0"/>
-              <a:t>Before IBU Imputation</a:t>
-            </a:r>
-          </a:p>
-        </p:txBody>
-      </p:sp>
-      <p:sp>
-        <p:nvSpPr>
-          <p:cNvPr id="7" name="TextBox 6">
-            <a:extLst>
-              <a:ext uri="{FF2B5EF4-FFF2-40B4-BE49-F238E27FC236}">
-                <a16:creationId xmlns:a16="http://schemas.microsoft.com/office/drawing/2014/main" id="{98915DF3-7D6A-DC44-A756-02648D666FB3}"/>
-              </a:ext>
-            </a:extLst>
-          </p:cNvPr>
-          <p:cNvSpPr txBox="1"/>
-          <p:nvPr/>
-        </p:nvSpPr>
-        <p:spPr>
-          <a:xfrm>
-            <a:off x="6975647" y="4112469"/>
-            <a:ext cx="2091214" cy="646331"/>
-          </a:xfrm>
-          <a:prstGeom prst="rect">
-            <a:avLst/>
-          </a:prstGeom>
-          <a:noFill/>
-        </p:spPr>
-        <p:txBody>
-          <a:bodyPr wrap="none" rtlCol="0">
-            <a:spAutoFit/>
-          </a:bodyPr>
-          <a:lstStyle/>
-          <a:p>
-            <a:r>
-              <a:rPr lang="en-US" dirty="0"/>
-              <a:t>After IBU Imputation</a:t>
-            </a:r>
-          </a:p>
-          <a:p>
-            <a:endParaRPr lang="en-US" dirty="0"/>
-          </a:p>
-        </p:txBody>
-      </p:sp>
-      <p:sp>
-        <p:nvSpPr>
-          <p:cNvPr id="14" name="TextBox 13">
-            <a:extLst>
-              <a:ext uri="{FF2B5EF4-FFF2-40B4-BE49-F238E27FC236}">
-                <a16:creationId xmlns:a16="http://schemas.microsoft.com/office/drawing/2014/main" id="{D7A6B74F-B316-4643-BB2C-5F43B5DCE9BE}"/>
-              </a:ext>
-            </a:extLst>
-          </p:cNvPr>
-          <p:cNvSpPr txBox="1"/>
-          <p:nvPr/>
-        </p:nvSpPr>
-        <p:spPr>
-          <a:xfrm>
-            <a:off x="969579" y="2120462"/>
-            <a:ext cx="4139018" cy="369332"/>
-          </a:xfrm>
-          <a:prstGeom prst="rect">
-            <a:avLst/>
-          </a:prstGeom>
-          <a:noFill/>
-        </p:spPr>
-        <p:txBody>
-          <a:bodyPr wrap="square" rtlCol="0">
-            <a:spAutoFit/>
-          </a:bodyPr>
-          <a:lstStyle/>
-          <a:p>
-            <a:pPr marL="285750" indent="-285750">
-              <a:buFont typeface="Arial" panose="020B0604020202020204" pitchFamily="34" charset="0"/>
-              <a:buChar char="•"/>
-            </a:pPr>
-            <a:r>
-              <a:rPr lang="en-US" dirty="0"/>
-              <a:t>Impute via the median IBU per style… </a:t>
-            </a:r>
-          </a:p>
-        </p:txBody>
-      </p:sp>
     </p:spTree>
     <p:extLst>
       <p:ext uri="{BB962C8B-B14F-4D97-AF65-F5344CB8AC3E}">
-        <p14:creationId xmlns:p14="http://schemas.microsoft.com/office/powerpoint/2010/main" val="3419396976"/>
+        <p14:creationId xmlns:p14="http://schemas.microsoft.com/office/powerpoint/2010/main" val="382088822"/>
       </p:ext>
     </p:extLst>
   </p:cSld>
@@ -5625,7 +5945,7 @@
           <p:cNvPr id="2" name="Title 1">
             <a:extLst>
               <a:ext uri="{FF2B5EF4-FFF2-40B4-BE49-F238E27FC236}">
-                <a16:creationId xmlns:a16="http://schemas.microsoft.com/office/drawing/2014/main" id="{466EE486-8B40-43E7-AD7F-C70CDA376330}"/>
+                <a16:creationId xmlns:a16="http://schemas.microsoft.com/office/drawing/2014/main" id="{9E0F04AD-A2D8-0B4E-B07B-494AB3A47290}"/>
               </a:ext>
             </a:extLst>
           </p:cNvPr>
@@ -5643,17 +5963,17 @@
           <a:p>
             <a:r>
               <a:rPr lang="en-US" dirty="0"/>
-              <a:t>Missing Values after cleanup</a:t>
+              <a:t>Median IBU by State</a:t>
             </a:r>
           </a:p>
         </p:txBody>
       </p:sp>
       <p:pic>
         <p:nvPicPr>
-          <p:cNvPr id="4" name="Content Placeholder 3">
-            <a:extLst>
-              <a:ext uri="{FF2B5EF4-FFF2-40B4-BE49-F238E27FC236}">
-                <a16:creationId xmlns:a16="http://schemas.microsoft.com/office/drawing/2014/main" id="{CC101543-36ED-654C-A541-599745F89DBC}"/>
+          <p:cNvPr id="7" name="Content Placeholder 6" descr="Chart, histogram&#10;&#10;Description automatically generated">
+            <a:extLst>
+              <a:ext uri="{FF2B5EF4-FFF2-40B4-BE49-F238E27FC236}">
+                <a16:creationId xmlns:a16="http://schemas.microsoft.com/office/drawing/2014/main" id="{2A93BF9F-E082-4A82-8FD6-BC0C76BC82A0}"/>
               </a:ext>
             </a:extLst>
           </p:cNvPr>
@@ -5664,26 +5984,28 @@
             <p:ph idx="1"/>
           </p:nvPr>
         </p:nvPicPr>
-        <p:blipFill>
-          <a:blip r:embed="rId2"/>
-          <a:stretch>
-            <a:fillRect/>
-          </a:stretch>
+        <p:blipFill rotWithShape="1">
+          <a:blip r:embed="rId3">
+            <a:extLst>
+              <a:ext uri="{28A0092B-C50C-407E-A947-70E740481C1C}">
+                <a14:useLocalDpi xmlns:a14="http://schemas.microsoft.com/office/drawing/2010/main" val="0"/>
+              </a:ext>
+            </a:extLst>
+          </a:blip>
+          <a:srcRect t="598"/>
+          <a:stretch/>
         </p:blipFill>
         <p:spPr>
           <a:xfrm>
-            <a:off x="1838632" y="1764826"/>
-            <a:ext cx="7165351" cy="4943079"/>
+            <a:off x="1386840" y="1394459"/>
+            <a:ext cx="9418320" cy="5228699"/>
           </a:xfrm>
-          <a:prstGeom prst="rect">
-            <a:avLst/>
-          </a:prstGeom>
         </p:spPr>
       </p:pic>
     </p:spTree>
     <p:extLst>
       <p:ext uri="{BB962C8B-B14F-4D97-AF65-F5344CB8AC3E}">
-        <p14:creationId xmlns:p14="http://schemas.microsoft.com/office/powerpoint/2010/main" val="1897455597"/>
+        <p14:creationId xmlns:p14="http://schemas.microsoft.com/office/powerpoint/2010/main" val="350394267"/>
       </p:ext>
     </p:extLst>
   </p:cSld>
@@ -5715,7 +6037,7 @@
           <p:cNvPr id="2" name="Title 1">
             <a:extLst>
               <a:ext uri="{FF2B5EF4-FFF2-40B4-BE49-F238E27FC236}">
-                <a16:creationId xmlns:a16="http://schemas.microsoft.com/office/drawing/2014/main" id="{33CE4418-39BC-8C41-86AB-4B606F648865}"/>
+                <a16:creationId xmlns:a16="http://schemas.microsoft.com/office/drawing/2014/main" id="{B6D01AB8-B1B3-4F8E-9FD6-A2EBA7EA7354}"/>
               </a:ext>
             </a:extLst>
           </p:cNvPr>
@@ -5733,52 +6055,49 @@
           <a:p>
             <a:r>
               <a:rPr lang="en-US" dirty="0"/>
-              <a:t>Median ABV by State</a:t>
-            </a:r>
-          </a:p>
-        </p:txBody>
-      </p:sp>
-      <p:pic>
-        <p:nvPicPr>
-          <p:cNvPr id="4" name="Content Placeholder 3">
-            <a:extLst>
-              <a:ext uri="{FF2B5EF4-FFF2-40B4-BE49-F238E27FC236}">
-                <a16:creationId xmlns:a16="http://schemas.microsoft.com/office/drawing/2014/main" id="{17E374AB-35EE-CE4A-A9DB-3C336305B377}"/>
-              </a:ext>
-            </a:extLst>
-          </p:cNvPr>
-          <p:cNvPicPr>
-            <a:picLocks noGrp="1" noChangeAspect="1"/>
-          </p:cNvPicPr>
+              <a:t>Which states have the max ABV/IBU?</a:t>
+            </a:r>
+          </a:p>
+        </p:txBody>
+      </p:sp>
+      <p:sp>
+        <p:nvSpPr>
+          <p:cNvPr id="3" name="Content Placeholder 2">
+            <a:extLst>
+              <a:ext uri="{FF2B5EF4-FFF2-40B4-BE49-F238E27FC236}">
+                <a16:creationId xmlns:a16="http://schemas.microsoft.com/office/drawing/2014/main" id="{F2E896DE-B666-4839-9B6D-894845485AB2}"/>
+              </a:ext>
+            </a:extLst>
+          </p:cNvPr>
+          <p:cNvSpPr>
+            <a:spLocks noGrp="1"/>
+          </p:cNvSpPr>
           <p:nvPr>
             <p:ph idx="1"/>
           </p:nvPr>
-        </p:nvPicPr>
-        <p:blipFill rotWithShape="1">
-          <a:blip r:embed="rId3">
-            <a:extLst>
-              <a:ext uri="{28A0092B-C50C-407E-A947-70E740481C1C}">
-                <a14:useLocalDpi xmlns:a14="http://schemas.microsoft.com/office/drawing/2010/main" val="0"/>
-              </a:ext>
-            </a:extLst>
-          </a:blip>
-          <a:srcRect t="3005"/>
-          <a:stretch/>
-        </p:blipFill>
-        <p:spPr>
-          <a:xfrm>
-            <a:off x="533257" y="1326515"/>
-            <a:ext cx="9570208" cy="5166360"/>
-          </a:xfrm>
-          <a:prstGeom prst="rect">
-            <a:avLst/>
-          </a:prstGeom>
-        </p:spPr>
-      </p:pic>
+        </p:nvSpPr>
+        <p:spPr/>
+        <p:txBody>
+          <a:bodyPr/>
+          <a:lstStyle/>
+          <a:p>
+            <a:r>
+              <a:rPr lang="en-US" dirty="0"/>
+              <a:t>Colorado has the max ABV at 0.128. </a:t>
+            </a:r>
+          </a:p>
+          <a:p>
+            <a:r>
+              <a:rPr lang="en-US" dirty="0"/>
+              <a:t>Oregon has the most IBU at 138. </a:t>
+            </a:r>
+          </a:p>
+        </p:txBody>
+      </p:sp>
     </p:spTree>
     <p:extLst>
       <p:ext uri="{BB962C8B-B14F-4D97-AF65-F5344CB8AC3E}">
-        <p14:creationId xmlns:p14="http://schemas.microsoft.com/office/powerpoint/2010/main" val="382088822"/>
+        <p14:creationId xmlns:p14="http://schemas.microsoft.com/office/powerpoint/2010/main" val="1029887200"/>
       </p:ext>
     </p:extLst>
   </p:cSld>
@@ -5810,7 +6129,7 @@
           <p:cNvPr id="2" name="Title 1">
             <a:extLst>
               <a:ext uri="{FF2B5EF4-FFF2-40B4-BE49-F238E27FC236}">
-                <a16:creationId xmlns:a16="http://schemas.microsoft.com/office/drawing/2014/main" id="{9E0F04AD-A2D8-0B4E-B07B-494AB3A47290}"/>
+                <a16:creationId xmlns:a16="http://schemas.microsoft.com/office/drawing/2014/main" id="{2D2EB4D7-13FF-43AB-B3F6-5B856AA918AD}"/>
               </a:ext>
             </a:extLst>
           </p:cNvPr>
@@ -5828,7 +6147,7 @@
           <a:p>
             <a:r>
               <a:rPr lang="en-US" dirty="0"/>
-              <a:t>Median IBU by State</a:t>
+              <a:t>IBU Distribution</a:t>
             </a:r>
           </a:p>
         </p:txBody>
@@ -5838,7 +6157,7 @@
           <p:cNvPr id="4" name="Content Placeholder 3">
             <a:extLst>
               <a:ext uri="{FF2B5EF4-FFF2-40B4-BE49-F238E27FC236}">
-                <a16:creationId xmlns:a16="http://schemas.microsoft.com/office/drawing/2014/main" id="{394B2497-FC47-624A-A068-E992BB6B611B}"/>
+                <a16:creationId xmlns:a16="http://schemas.microsoft.com/office/drawing/2014/main" id="{48345F0B-F5C2-164B-8CF1-7176BC8C3815}"/>
               </a:ext>
             </a:extLst>
           </p:cNvPr>
@@ -5849,15 +6168,21 @@
             <p:ph idx="1"/>
           </p:nvPr>
         </p:nvPicPr>
-        <p:blipFill rotWithShape="1">
-          <a:blip r:embed="rId3"/>
-          <a:srcRect t="1962" b="-1"/>
+        <p:blipFill>
+          <a:blip r:embed="rId3">
+            <a:extLst>
+              <a:ext uri="{28A0092B-C50C-407E-A947-70E740481C1C}">
+                <a14:useLocalDpi xmlns:a14="http://schemas.microsoft.com/office/drawing/2010/main" val="0"/>
+              </a:ext>
+            </a:extLst>
+          </a:blip>
+          <a:srcRect/>
           <a:stretch/>
         </p:blipFill>
         <p:spPr>
           <a:xfrm>
-            <a:off x="702637" y="1315801"/>
-            <a:ext cx="10245213" cy="5284972"/>
+            <a:off x="1135547" y="1414486"/>
+            <a:ext cx="9920905" cy="5230368"/>
           </a:xfrm>
           <a:prstGeom prst="rect">
             <a:avLst/>
@@ -5867,7 +6192,7 @@
     </p:spTree>
     <p:extLst>
       <p:ext uri="{BB962C8B-B14F-4D97-AF65-F5344CB8AC3E}">
-        <p14:creationId xmlns:p14="http://schemas.microsoft.com/office/powerpoint/2010/main" val="350394267"/>
+        <p14:creationId xmlns:p14="http://schemas.microsoft.com/office/powerpoint/2010/main" val="4066272242"/>
       </p:ext>
     </p:extLst>
   </p:cSld>
@@ -5899,7 +6224,7 @@
           <p:cNvPr id="2" name="Title 1">
             <a:extLst>
               <a:ext uri="{FF2B5EF4-FFF2-40B4-BE49-F238E27FC236}">
-                <a16:creationId xmlns:a16="http://schemas.microsoft.com/office/drawing/2014/main" id="{B6D01AB8-B1B3-4F8E-9FD6-A2EBA7EA7354}"/>
+                <a16:creationId xmlns:a16="http://schemas.microsoft.com/office/drawing/2014/main" id="{934F8AFD-0E51-8947-816A-69CAC02FD866}"/>
               </a:ext>
             </a:extLst>
           </p:cNvPr>
@@ -5917,49 +6242,50 @@
           <a:p>
             <a:r>
               <a:rPr lang="en-US" dirty="0"/>
-              <a:t>Max ABV/IBU</a:t>
-            </a:r>
-          </a:p>
-        </p:txBody>
-      </p:sp>
-      <p:sp>
-        <p:nvSpPr>
-          <p:cNvPr id="3" name="Content Placeholder 2">
-            <a:extLst>
-              <a:ext uri="{FF2B5EF4-FFF2-40B4-BE49-F238E27FC236}">
-                <a16:creationId xmlns:a16="http://schemas.microsoft.com/office/drawing/2014/main" id="{F2E896DE-B666-4839-9B6D-894845485AB2}"/>
-              </a:ext>
-            </a:extLst>
-          </p:cNvPr>
-          <p:cNvSpPr>
-            <a:spLocks noGrp="1"/>
-          </p:cNvSpPr>
+              <a:t>ABV Distribution</a:t>
+            </a:r>
+          </a:p>
+        </p:txBody>
+      </p:sp>
+      <p:pic>
+        <p:nvPicPr>
+          <p:cNvPr id="6" name="Content Placeholder 5" descr="Chart, histogram&#10;&#10;Description automatically generated">
+            <a:extLst>
+              <a:ext uri="{FF2B5EF4-FFF2-40B4-BE49-F238E27FC236}">
+                <a16:creationId xmlns:a16="http://schemas.microsoft.com/office/drawing/2014/main" id="{36453E16-22EE-444B-8383-037E38A94E9F}"/>
+              </a:ext>
+            </a:extLst>
+          </p:cNvPr>
+          <p:cNvPicPr>
+            <a:picLocks noGrp="1" noChangeAspect="1"/>
+          </p:cNvPicPr>
           <p:nvPr>
             <p:ph idx="1"/>
           </p:nvPr>
-        </p:nvSpPr>
-        <p:spPr/>
-        <p:txBody>
-          <a:bodyPr/>
-          <a:lstStyle/>
-          <a:p>
-            <a:r>
-              <a:rPr lang="en-US" dirty="0"/>
-              <a:t>Which state has the maximum alcoholic (ABV) beer? Colorado has the max ABV at 0.128. </a:t>
-            </a:r>
-          </a:p>
-          <a:p>
-            <a:r>
-              <a:rPr lang="en-US" dirty="0"/>
-              <a:t>Which state has the most bitter (IBU) beer? Oregon has the most IBU at 138. </a:t>
-            </a:r>
-          </a:p>
-        </p:txBody>
-      </p:sp>
+        </p:nvPicPr>
+        <p:blipFill>
+          <a:blip r:embed="rId3">
+            <a:extLst>
+              <a:ext uri="{28A0092B-C50C-407E-A947-70E740481C1C}">
+                <a14:useLocalDpi xmlns:a14="http://schemas.microsoft.com/office/drawing/2010/main" val="0"/>
+              </a:ext>
+            </a:extLst>
+          </a:blip>
+          <a:stretch>
+            <a:fillRect/>
+          </a:stretch>
+        </p:blipFill>
+        <p:spPr>
+          <a:xfrm>
+            <a:off x="1399459" y="1262507"/>
+            <a:ext cx="9393082" cy="5230368"/>
+          </a:xfrm>
+        </p:spPr>
+      </p:pic>
     </p:spTree>
     <p:extLst>
       <p:ext uri="{BB962C8B-B14F-4D97-AF65-F5344CB8AC3E}">
-        <p14:creationId xmlns:p14="http://schemas.microsoft.com/office/powerpoint/2010/main" val="1029887200"/>
+        <p14:creationId xmlns:p14="http://schemas.microsoft.com/office/powerpoint/2010/main" val="3029225674"/>
       </p:ext>
     </p:extLst>
   </p:cSld>
@@ -5991,7 +6317,7 @@
           <p:cNvPr id="2" name="Title 1">
             <a:extLst>
               <a:ext uri="{FF2B5EF4-FFF2-40B4-BE49-F238E27FC236}">
-                <a16:creationId xmlns:a16="http://schemas.microsoft.com/office/drawing/2014/main" id="{2D2EB4D7-13FF-43AB-B3F6-5B856AA918AD}"/>
+                <a16:creationId xmlns:a16="http://schemas.microsoft.com/office/drawing/2014/main" id="{8EB76B49-8973-41C3-AD28-11C10B9953D8}"/>
               </a:ext>
             </a:extLst>
           </p:cNvPr>
@@ -6009,37 +6335,34 @@
           <a:p>
             <a:r>
               <a:rPr lang="en-US" dirty="0"/>
-              <a:t>IBU Distribution</a:t>
+              <a:t>Summary Statistics</a:t>
             </a:r>
           </a:p>
         </p:txBody>
       </p:sp>
       <p:pic>
         <p:nvPicPr>
-          <p:cNvPr id="4" name="Content Placeholder 3">
-            <a:extLst>
-              <a:ext uri="{FF2B5EF4-FFF2-40B4-BE49-F238E27FC236}">
-                <a16:creationId xmlns:a16="http://schemas.microsoft.com/office/drawing/2014/main" id="{48345F0B-F5C2-164B-8CF1-7176BC8C3815}"/>
+          <p:cNvPr id="4" name="Picture 3">
+            <a:extLst>
+              <a:ext uri="{FF2B5EF4-FFF2-40B4-BE49-F238E27FC236}">
+                <a16:creationId xmlns:a16="http://schemas.microsoft.com/office/drawing/2014/main" id="{703E909D-AE5B-F34F-B265-FEDBBDCD5F5C}"/>
               </a:ext>
             </a:extLst>
           </p:cNvPr>
           <p:cNvPicPr>
-            <a:picLocks noGrp="1" noChangeAspect="1"/>
+            <a:picLocks noChangeAspect="1"/>
           </p:cNvPicPr>
-          <p:nvPr>
-            <p:ph idx="1"/>
-          </p:nvPr>
+          <p:nvPr/>
         </p:nvPicPr>
-        <p:blipFill>
+        <p:blipFill rotWithShape="1">
           <a:blip r:embed="rId3"/>
-          <a:stretch>
-            <a:fillRect/>
-          </a:stretch>
+          <a:srcRect b="1710"/>
+          <a:stretch/>
         </p:blipFill>
         <p:spPr>
           <a:xfrm>
-            <a:off x="838200" y="1883117"/>
-            <a:ext cx="10515600" cy="4236353"/>
+            <a:off x="707921" y="1690689"/>
+            <a:ext cx="11002297" cy="4476648"/>
           </a:xfrm>
           <a:prstGeom prst="rect">
             <a:avLst/>
@@ -6049,7 +6372,7 @@
     </p:spTree>
     <p:extLst>
       <p:ext uri="{BB962C8B-B14F-4D97-AF65-F5344CB8AC3E}">
-        <p14:creationId xmlns:p14="http://schemas.microsoft.com/office/powerpoint/2010/main" val="4066272242"/>
+        <p14:creationId xmlns:p14="http://schemas.microsoft.com/office/powerpoint/2010/main" val="4143373113"/>
       </p:ext>
     </p:extLst>
   </p:cSld>
@@ -6081,7 +6404,7 @@
           <p:cNvPr id="2" name="Title 1">
             <a:extLst>
               <a:ext uri="{FF2B5EF4-FFF2-40B4-BE49-F238E27FC236}">
-                <a16:creationId xmlns:a16="http://schemas.microsoft.com/office/drawing/2014/main" id="{934F8AFD-0E51-8947-816A-69CAC02FD866}"/>
+                <a16:creationId xmlns:a16="http://schemas.microsoft.com/office/drawing/2014/main" id="{8CD8555A-4C37-4C1F-AD36-CBE650EE6107}"/>
               </a:ext>
             </a:extLst>
           </p:cNvPr>
@@ -6099,49 +6422,26 @@
           <a:p>
             <a:r>
               <a:rPr lang="en-US" dirty="0"/>
-              <a:t>ABV Distribution</a:t>
-            </a:r>
-          </a:p>
-        </p:txBody>
-      </p:sp>
-      <p:sp>
-        <p:nvSpPr>
-          <p:cNvPr id="3" name="Content Placeholder 2">
-            <a:extLst>
-              <a:ext uri="{FF2B5EF4-FFF2-40B4-BE49-F238E27FC236}">
-                <a16:creationId xmlns:a16="http://schemas.microsoft.com/office/drawing/2014/main" id="{F5E40B02-D9EF-BD4F-A6A7-995691C768D1}"/>
-              </a:ext>
-            </a:extLst>
-          </p:cNvPr>
-          <p:cNvSpPr>
-            <a:spLocks noGrp="1"/>
-          </p:cNvSpPr>
-          <p:nvPr>
-            <p:ph idx="1"/>
-          </p:nvPr>
-        </p:nvSpPr>
-        <p:spPr/>
-        <p:txBody>
-          <a:bodyPr/>
-          <a:lstStyle/>
-          <a:p>
-            <a:endParaRPr lang="en-US" dirty="0"/>
+              <a:t>ABV vs IBU Relationship</a:t>
+            </a:r>
           </a:p>
         </p:txBody>
       </p:sp>
       <p:pic>
         <p:nvPicPr>
-          <p:cNvPr id="4" name="Picture 3">
-            <a:extLst>
-              <a:ext uri="{FF2B5EF4-FFF2-40B4-BE49-F238E27FC236}">
-                <a16:creationId xmlns:a16="http://schemas.microsoft.com/office/drawing/2014/main" id="{9FFEC1CB-8B1D-F94D-96B8-AD08E3A32624}"/>
+          <p:cNvPr id="4" name="Content Placeholder 3">
+            <a:extLst>
+              <a:ext uri="{FF2B5EF4-FFF2-40B4-BE49-F238E27FC236}">
+                <a16:creationId xmlns:a16="http://schemas.microsoft.com/office/drawing/2014/main" id="{F62AADDC-3545-3A4F-865F-ECACDB169A9D}"/>
               </a:ext>
             </a:extLst>
           </p:cNvPr>
           <p:cNvPicPr>
-            <a:picLocks noChangeAspect="1"/>
+            <a:picLocks noGrp="1" noChangeAspect="1"/>
           </p:cNvPicPr>
-          <p:nvPr/>
+          <p:nvPr>
+            <p:ph idx="1"/>
+          </p:nvPr>
         </p:nvPicPr>
         <p:blipFill>
           <a:blip r:embed="rId3"/>
@@ -6151,8 +6451,8 @@
         </p:blipFill>
         <p:spPr>
           <a:xfrm>
-            <a:off x="0" y="1324355"/>
-            <a:ext cx="12192000" cy="5168520"/>
+            <a:off x="2191512" y="1262507"/>
+            <a:ext cx="7808976" cy="5230368"/>
           </a:xfrm>
           <a:prstGeom prst="rect">
             <a:avLst/>
@@ -6162,7 +6462,7 @@
     </p:spTree>
     <p:extLst>
       <p:ext uri="{BB962C8B-B14F-4D97-AF65-F5344CB8AC3E}">
-        <p14:creationId xmlns:p14="http://schemas.microsoft.com/office/powerpoint/2010/main" val="3029225674"/>
+        <p14:creationId xmlns:p14="http://schemas.microsoft.com/office/powerpoint/2010/main" val="3218705793"/>
       </p:ext>
     </p:extLst>
   </p:cSld>
@@ -6194,7 +6494,7 @@
           <p:cNvPr id="2" name="Title 1">
             <a:extLst>
               <a:ext uri="{FF2B5EF4-FFF2-40B4-BE49-F238E27FC236}">
-                <a16:creationId xmlns:a16="http://schemas.microsoft.com/office/drawing/2014/main" id="{8EB76B49-8973-41C3-AD28-11C10B9953D8}"/>
+                <a16:creationId xmlns:a16="http://schemas.microsoft.com/office/drawing/2014/main" id="{32A4D165-26FE-F14F-9BB9-F8919F5225DA}"/>
               </a:ext>
             </a:extLst>
           </p:cNvPr>
@@ -6212,35 +6512,42 @@
           <a:p>
             <a:r>
               <a:rPr lang="en-US" dirty="0"/>
-              <a:t>Summary Statistics</a:t>
+              <a:t>ABV vs IBU Relationship</a:t>
             </a:r>
           </a:p>
         </p:txBody>
       </p:sp>
       <p:pic>
         <p:nvPicPr>
-          <p:cNvPr id="4" name="Picture 3">
-            <a:extLst>
-              <a:ext uri="{FF2B5EF4-FFF2-40B4-BE49-F238E27FC236}">
-                <a16:creationId xmlns:a16="http://schemas.microsoft.com/office/drawing/2014/main" id="{703E909D-AE5B-F34F-B265-FEDBBDCD5F5C}"/>
+          <p:cNvPr id="4" name="Content Placeholder 3">
+            <a:extLst>
+              <a:ext uri="{FF2B5EF4-FFF2-40B4-BE49-F238E27FC236}">
+                <a16:creationId xmlns:a16="http://schemas.microsoft.com/office/drawing/2014/main" id="{933AC731-58B8-7942-AA2C-009B5D15A2D9}"/>
               </a:ext>
             </a:extLst>
           </p:cNvPr>
           <p:cNvPicPr>
-            <a:picLocks noChangeAspect="1"/>
+            <a:picLocks noGrp="1" noChangeAspect="1"/>
           </p:cNvPicPr>
-          <p:nvPr/>
+          <p:nvPr>
+            <p:ph idx="1"/>
+          </p:nvPr>
         </p:nvPicPr>
         <p:blipFill>
-          <a:blip r:embed="rId3"/>
-          <a:stretch>
-            <a:fillRect/>
-          </a:stretch>
+          <a:blip r:embed="rId3">
+            <a:extLst>
+              <a:ext uri="{28A0092B-C50C-407E-A947-70E740481C1C}">
+                <a14:useLocalDpi xmlns:a14="http://schemas.microsoft.com/office/drawing/2010/main" val="0"/>
+              </a:ext>
+            </a:extLst>
+          </a:blip>
+          <a:srcRect/>
+          <a:stretch/>
         </p:blipFill>
         <p:spPr>
           <a:xfrm>
-            <a:off x="707921" y="1690688"/>
-            <a:ext cx="11002297" cy="4554533"/>
+            <a:off x="1126550" y="1262507"/>
+            <a:ext cx="9938900" cy="5230368"/>
           </a:xfrm>
           <a:prstGeom prst="rect">
             <a:avLst/>
@@ -6250,7 +6557,7 @@
     </p:spTree>
     <p:extLst>
       <p:ext uri="{BB962C8B-B14F-4D97-AF65-F5344CB8AC3E}">
-        <p14:creationId xmlns:p14="http://schemas.microsoft.com/office/powerpoint/2010/main" val="4143373113"/>
+        <p14:creationId xmlns:p14="http://schemas.microsoft.com/office/powerpoint/2010/main" val="288991935"/>
       </p:ext>
     </p:extLst>
   </p:cSld>
@@ -6282,7 +6589,7 @@
           <p:cNvPr id="2" name="Title 1">
             <a:extLst>
               <a:ext uri="{FF2B5EF4-FFF2-40B4-BE49-F238E27FC236}">
-                <a16:creationId xmlns:a16="http://schemas.microsoft.com/office/drawing/2014/main" id="{8CD8555A-4C37-4C1F-AD36-CBE650EE6107}"/>
+                <a16:creationId xmlns:a16="http://schemas.microsoft.com/office/drawing/2014/main" id="{F0903F04-E8E9-4816-8035-DDC55DE2ABCC}"/>
               </a:ext>
             </a:extLst>
           </p:cNvPr>
@@ -6300,17 +6607,17 @@
           <a:p>
             <a:r>
               <a:rPr lang="en-US" dirty="0"/>
-              <a:t>ABV vs IBU Relationship</a:t>
+              <a:t>What about IPA’s vs Other Ales?</a:t>
             </a:r>
           </a:p>
         </p:txBody>
       </p:sp>
       <p:pic>
         <p:nvPicPr>
-          <p:cNvPr id="4" name="Content Placeholder 3">
-            <a:extLst>
-              <a:ext uri="{FF2B5EF4-FFF2-40B4-BE49-F238E27FC236}">
-                <a16:creationId xmlns:a16="http://schemas.microsoft.com/office/drawing/2014/main" id="{F62AADDC-3545-3A4F-865F-ECACDB169A9D}"/>
+          <p:cNvPr id="9" name="Content Placeholder 8">
+            <a:extLst>
+              <a:ext uri="{FF2B5EF4-FFF2-40B4-BE49-F238E27FC236}">
+                <a16:creationId xmlns:a16="http://schemas.microsoft.com/office/drawing/2014/main" id="{8E12D92B-FFC3-4D74-B906-840BDA75A5DC}"/>
               </a:ext>
             </a:extLst>
           </p:cNvPr>
@@ -6322,25 +6629,27 @@
           </p:nvPr>
         </p:nvPicPr>
         <p:blipFill>
-          <a:blip r:embed="rId3"/>
-          <a:stretch>
-            <a:fillRect/>
-          </a:stretch>
+          <a:blip r:embed="rId3">
+            <a:extLst>
+              <a:ext uri="{28A0092B-C50C-407E-A947-70E740481C1C}">
+                <a14:useLocalDpi xmlns:a14="http://schemas.microsoft.com/office/drawing/2010/main" val="0"/>
+              </a:ext>
+            </a:extLst>
+          </a:blip>
+          <a:srcRect/>
+          <a:stretch/>
         </p:blipFill>
         <p:spPr>
           <a:xfrm>
-            <a:off x="2296510" y="1403160"/>
-            <a:ext cx="7598980" cy="5089715"/>
+            <a:off x="1127150" y="1387741"/>
+            <a:ext cx="9937699" cy="5214595"/>
           </a:xfrm>
-          <a:prstGeom prst="rect">
-            <a:avLst/>
-          </a:prstGeom>
         </p:spPr>
       </p:pic>
     </p:spTree>
     <p:extLst>
       <p:ext uri="{BB962C8B-B14F-4D97-AF65-F5344CB8AC3E}">
-        <p14:creationId xmlns:p14="http://schemas.microsoft.com/office/powerpoint/2010/main" val="3218705793"/>
+        <p14:creationId xmlns:p14="http://schemas.microsoft.com/office/powerpoint/2010/main" val="3688509213"/>
       </p:ext>
     </p:extLst>
   </p:cSld>
@@ -6372,7 +6681,7 @@
           <p:cNvPr id="2" name="Title 1">
             <a:extLst>
               <a:ext uri="{FF2B5EF4-FFF2-40B4-BE49-F238E27FC236}">
-                <a16:creationId xmlns:a16="http://schemas.microsoft.com/office/drawing/2014/main" id="{32A4D165-26FE-F14F-9BB9-F8919F5225DA}"/>
+                <a16:creationId xmlns:a16="http://schemas.microsoft.com/office/drawing/2014/main" id="{F0903F04-E8E9-4816-8035-DDC55DE2ABCC}"/>
               </a:ext>
             </a:extLst>
           </p:cNvPr>
@@ -6389,18 +6698,19 @@
           <a:lstStyle/>
           <a:p>
             <a:r>
-              <a:rPr lang="en-US" dirty="0"/>
-              <a:t>ABV vs IBU Relationship</a:t>
-            </a:r>
+              <a:rPr lang="en-US"/>
+              <a:t>What about IPA’s vs Other Ales?</a:t>
+            </a:r>
+            <a:endParaRPr lang="en-US" dirty="0"/>
           </a:p>
         </p:txBody>
       </p:sp>
       <p:pic>
         <p:nvPicPr>
-          <p:cNvPr id="4" name="Content Placeholder 3">
-            <a:extLst>
-              <a:ext uri="{FF2B5EF4-FFF2-40B4-BE49-F238E27FC236}">
-                <a16:creationId xmlns:a16="http://schemas.microsoft.com/office/drawing/2014/main" id="{933AC731-58B8-7942-AA2C-009B5D15A2D9}"/>
+          <p:cNvPr id="9" name="Content Placeholder 8">
+            <a:extLst>
+              <a:ext uri="{FF2B5EF4-FFF2-40B4-BE49-F238E27FC236}">
+                <a16:creationId xmlns:a16="http://schemas.microsoft.com/office/drawing/2014/main" id="{8E12D92B-FFC3-4D74-B906-840BDA75A5DC}"/>
               </a:ext>
             </a:extLst>
           </p:cNvPr>
@@ -6411,26 +6721,28 @@
             <p:ph idx="1"/>
           </p:nvPr>
         </p:nvPicPr>
-        <p:blipFill>
-          <a:blip r:embed="rId2"/>
-          <a:stretch>
-            <a:fillRect/>
-          </a:stretch>
+        <p:blipFill rotWithShape="1">
+          <a:blip r:embed="rId3">
+            <a:extLst>
+              <a:ext uri="{28A0092B-C50C-407E-A947-70E740481C1C}">
+                <a14:useLocalDpi xmlns:a14="http://schemas.microsoft.com/office/drawing/2010/main" val="0"/>
+              </a:ext>
+            </a:extLst>
+          </a:blip>
+          <a:srcRect l="466" t="580" b="-1"/>
+          <a:stretch/>
         </p:blipFill>
         <p:spPr>
           <a:xfrm>
-            <a:off x="2579371" y="1365788"/>
-            <a:ext cx="7033257" cy="4613685"/>
+            <a:off x="1137767" y="1396968"/>
+            <a:ext cx="9916466" cy="5230368"/>
           </a:xfrm>
-          <a:prstGeom prst="rect">
-            <a:avLst/>
-          </a:prstGeom>
         </p:spPr>
       </p:pic>
     </p:spTree>
     <p:extLst>
       <p:ext uri="{BB962C8B-B14F-4D97-AF65-F5344CB8AC3E}">
-        <p14:creationId xmlns:p14="http://schemas.microsoft.com/office/powerpoint/2010/main" val="288991935"/>
+        <p14:creationId xmlns:p14="http://schemas.microsoft.com/office/powerpoint/2010/main" val="1966048146"/>
       </p:ext>
     </p:extLst>
   </p:cSld>
@@ -6595,7 +6907,7 @@
           <p:cNvPr id="2" name="Title 1">
             <a:extLst>
               <a:ext uri="{FF2B5EF4-FFF2-40B4-BE49-F238E27FC236}">
-                <a16:creationId xmlns:a16="http://schemas.microsoft.com/office/drawing/2014/main" id="{E457A67E-7FA6-4751-AB9F-31EB6DC09A1B}"/>
+                <a16:creationId xmlns:a16="http://schemas.microsoft.com/office/drawing/2014/main" id="{E978B4E9-F367-41C8-AAF5-106C6A8C5D51}"/>
               </a:ext>
             </a:extLst>
           </p:cNvPr>
@@ -6611,10 +6923,9 @@
           <a:bodyPr/>
           <a:lstStyle/>
           <a:p>
-            <a:pPr algn="ctr"/>
-            <a:r>
-              <a:rPr lang="en-US" dirty="0"/>
-              <a:t>Any Questions?</a:t>
+            <a:r>
+              <a:rPr lang="en-US" dirty="0"/>
+              <a:t> Classification of ‘IPA’s’ vs ‘Other Ales’</a:t>
             </a:r>
           </a:p>
         </p:txBody>
@@ -6624,7 +6935,7 @@
           <p:cNvPr id="3" name="Content Placeholder 2">
             <a:extLst>
               <a:ext uri="{FF2B5EF4-FFF2-40B4-BE49-F238E27FC236}">
-                <a16:creationId xmlns:a16="http://schemas.microsoft.com/office/drawing/2014/main" id="{B45B3E7F-4F4F-4F9B-8D20-7906ABCA6118}"/>
+                <a16:creationId xmlns:a16="http://schemas.microsoft.com/office/drawing/2014/main" id="{798483FF-C869-42A0-A7E4-F1E130AE890A}"/>
               </a:ext>
             </a:extLst>
           </p:cNvPr>
@@ -6637,22 +6948,38 @@
         </p:nvSpPr>
         <p:spPr/>
         <p:txBody>
-          <a:bodyPr>
-            <a:normAutofit/>
-          </a:bodyPr>
-          <a:lstStyle/>
-          <a:p>
-            <a:pPr marL="0" indent="0" algn="ctr">
-              <a:buNone/>
-            </a:pPr>
-            <a:endParaRPr lang="en-US" sz="4000" dirty="0"/>
+          <a:bodyPr/>
+          <a:lstStyle/>
+          <a:p>
+            <a:r>
+              <a:rPr lang="en-US" dirty="0"/>
+              <a:t>We classified ‘IPA’s’ vs ‘Other Ales’ by IBU and ABV</a:t>
+            </a:r>
+          </a:p>
+          <a:p>
+            <a:r>
+              <a:rPr lang="en-US" dirty="0"/>
+              <a:t>We used a nonparametric model(kNN with k = 6) </a:t>
+            </a:r>
+          </a:p>
+          <a:p>
+            <a:r>
+              <a:rPr lang="en-US" dirty="0"/>
+              <a:t>Classification accuracy was 89% (P-value &lt; 2e-16)</a:t>
+            </a:r>
+          </a:p>
+          <a:p>
+            <a:r>
+              <a:rPr lang="en-US" dirty="0"/>
+              <a:t>We can be 95% confident that the true accuracy for our model is between [0.8537, 0.9355]</a:t>
+            </a:r>
           </a:p>
         </p:txBody>
       </p:sp>
     </p:spTree>
     <p:extLst>
       <p:ext uri="{BB962C8B-B14F-4D97-AF65-F5344CB8AC3E}">
-        <p14:creationId xmlns:p14="http://schemas.microsoft.com/office/powerpoint/2010/main" val="1341946735"/>
+        <p14:creationId xmlns:p14="http://schemas.microsoft.com/office/powerpoint/2010/main" val="2322191418"/>
       </p:ext>
     </p:extLst>
   </p:cSld>
@@ -6679,11 +7006,179 @@
           <a:chExt cx="0" cy="0"/>
         </a:xfrm>
       </p:grpSpPr>
+      <p:pic>
+        <p:nvPicPr>
+          <p:cNvPr id="5" name="Content Placeholder 4" descr="Calendar&#10;&#10;Description automatically generated">
+            <a:extLst>
+              <a:ext uri="{FF2B5EF4-FFF2-40B4-BE49-F238E27FC236}">
+                <a16:creationId xmlns:a16="http://schemas.microsoft.com/office/drawing/2014/main" id="{53AD954E-8689-499A-80B0-A8D6CBF632D8}"/>
+              </a:ext>
+            </a:extLst>
+          </p:cNvPr>
+          <p:cNvPicPr>
+            <a:picLocks noGrp="1" noChangeAspect="1"/>
+          </p:cNvPicPr>
+          <p:nvPr>
+            <p:ph idx="1"/>
+          </p:nvPr>
+        </p:nvPicPr>
+        <p:blipFill rotWithShape="1">
+          <a:blip r:embed="rId3">
+            <a:extLst>
+              <a:ext uri="{28A0092B-C50C-407E-A947-70E740481C1C}">
+                <a14:useLocalDpi xmlns:a14="http://schemas.microsoft.com/office/drawing/2010/main" val="0"/>
+              </a:ext>
+            </a:extLst>
+          </a:blip>
+          <a:srcRect r="829" b="486"/>
+          <a:stretch/>
+        </p:blipFill>
+        <p:spPr>
+          <a:xfrm>
+            <a:off x="725714" y="124942"/>
+            <a:ext cx="10740571" cy="6608116"/>
+          </a:xfrm>
+        </p:spPr>
+      </p:pic>
+    </p:spTree>
+    <p:extLst>
+      <p:ext uri="{BB962C8B-B14F-4D97-AF65-F5344CB8AC3E}">
+        <p14:creationId xmlns:p14="http://schemas.microsoft.com/office/powerpoint/2010/main" val="1523408636"/>
+      </p:ext>
+    </p:extLst>
+  </p:cSld>
+  <p:clrMapOvr>
+    <a:masterClrMapping/>
+  </p:clrMapOvr>
+</p:sld>
+</file>
+
+<file path=ppt/slides/slide22.xml><?xml version="1.0" encoding="utf-8"?>
+<p:sld xmlns:a="http://schemas.openxmlformats.org/drawingml/2006/main" xmlns:r="http://schemas.openxmlformats.org/officeDocument/2006/relationships" xmlns:p="http://schemas.openxmlformats.org/presentationml/2006/main">
+  <p:cSld>
+    <p:spTree>
+      <p:nvGrpSpPr>
+        <p:cNvPr id="1" name=""/>
+        <p:cNvGrpSpPr/>
+        <p:nvPr/>
+      </p:nvGrpSpPr>
+      <p:grpSpPr>
+        <a:xfrm>
+          <a:off x="0" y="0"/>
+          <a:ext cx="0" cy="0"/>
+          <a:chOff x="0" y="0"/>
+          <a:chExt cx="0" cy="0"/>
+        </a:xfrm>
+      </p:grpSpPr>
       <p:sp>
         <p:nvSpPr>
           <p:cNvPr id="2" name="Title 1">
             <a:extLst>
               <a:ext uri="{FF2B5EF4-FFF2-40B4-BE49-F238E27FC236}">
+                <a16:creationId xmlns:a16="http://schemas.microsoft.com/office/drawing/2014/main" id="{E978B4E9-F367-41C8-AAF5-106C6A8C5D51}"/>
+              </a:ext>
+            </a:extLst>
+          </p:cNvPr>
+          <p:cNvSpPr>
+            <a:spLocks noGrp="1"/>
+          </p:cNvSpPr>
+          <p:nvPr>
+            <p:ph type="title"/>
+          </p:nvPr>
+        </p:nvSpPr>
+        <p:spPr/>
+        <p:txBody>
+          <a:bodyPr/>
+          <a:lstStyle/>
+          <a:p>
+            <a:r>
+              <a:rPr lang="en-US" dirty="0"/>
+              <a:t> Classification of Ounces vs State</a:t>
+            </a:r>
+          </a:p>
+        </p:txBody>
+      </p:sp>
+      <p:sp>
+        <p:nvSpPr>
+          <p:cNvPr id="3" name="Content Placeholder 2">
+            <a:extLst>
+              <a:ext uri="{FF2B5EF4-FFF2-40B4-BE49-F238E27FC236}">
+                <a16:creationId xmlns:a16="http://schemas.microsoft.com/office/drawing/2014/main" id="{798483FF-C869-42A0-A7E4-F1E130AE890A}"/>
+              </a:ext>
+            </a:extLst>
+          </p:cNvPr>
+          <p:cNvSpPr>
+            <a:spLocks noGrp="1"/>
+          </p:cNvSpPr>
+          <p:nvPr>
+            <p:ph idx="1"/>
+          </p:nvPr>
+        </p:nvSpPr>
+        <p:spPr/>
+        <p:txBody>
+          <a:bodyPr/>
+          <a:lstStyle/>
+          <a:p>
+            <a:r>
+              <a:rPr lang="en-US" dirty="0"/>
+              <a:t>We classified Ounces vs State by IBU and ABV</a:t>
+            </a:r>
+          </a:p>
+          <a:p>
+            <a:r>
+              <a:rPr lang="en-US" dirty="0"/>
+              <a:t>We used a nonparametric model(kNN with k = 8) </a:t>
+            </a:r>
+          </a:p>
+          <a:p>
+            <a:r>
+              <a:rPr lang="en-US" dirty="0"/>
+              <a:t>Classification accuracy was 71.4 % (P-value &lt; 2e-16)</a:t>
+            </a:r>
+          </a:p>
+          <a:p>
+            <a:r>
+              <a:rPr lang="en-US" dirty="0"/>
+              <a:t>We can be 95% confident that the true accuracy for our model is between [0.8537, 0.9355]</a:t>
+            </a:r>
+          </a:p>
+        </p:txBody>
+      </p:sp>
+    </p:spTree>
+    <p:extLst>
+      <p:ext uri="{BB962C8B-B14F-4D97-AF65-F5344CB8AC3E}">
+        <p14:creationId xmlns:p14="http://schemas.microsoft.com/office/powerpoint/2010/main" val="3628741535"/>
+      </p:ext>
+    </p:extLst>
+  </p:cSld>
+  <p:clrMapOvr>
+    <a:masterClrMapping/>
+  </p:clrMapOvr>
+</p:sld>
+</file>
+
+<file path=ppt/slides/slide23.xml><?xml version="1.0" encoding="utf-8"?>
+<p:sld xmlns:a="http://schemas.openxmlformats.org/drawingml/2006/main" xmlns:r="http://schemas.openxmlformats.org/officeDocument/2006/relationships" xmlns:p="http://schemas.openxmlformats.org/presentationml/2006/main">
+  <p:cSld>
+    <p:spTree>
+      <p:nvGrpSpPr>
+        <p:cNvPr id="1" name=""/>
+        <p:cNvGrpSpPr/>
+        <p:nvPr/>
+      </p:nvGrpSpPr>
+      <p:grpSpPr>
+        <a:xfrm>
+          <a:off x="0" y="0"/>
+          <a:ext cx="0" cy="0"/>
+          <a:chOff x="0" y="0"/>
+          <a:chExt cx="0" cy="0"/>
+        </a:xfrm>
+      </p:grpSpPr>
+      <p:sp>
+        <p:nvSpPr>
+          <p:cNvPr id="2" name="Title 1">
+            <a:extLst>
+              <a:ext uri="{FF2B5EF4-FFF2-40B4-BE49-F238E27FC236}">
                 <a16:creationId xmlns:a16="http://schemas.microsoft.com/office/drawing/2014/main" id="{E031AA78-DEA9-6A40-ACAD-B576347B8854}"/>
               </a:ext>
             </a:extLst>
@@ -6702,7 +7197,7 @@
           <a:p>
             <a:r>
               <a:rPr lang="en-US" dirty="0"/>
-              <a:t>Appendix:</a:t>
+              <a:t>Appendix: ABV vs IBU Relationship</a:t>
             </a:r>
           </a:p>
         </p:txBody>
@@ -6735,7 +7230,7 @@
           <a:p>
             <a:r>
               <a:rPr lang="en-US" sz="2000" dirty="0"/>
-              <a:t>1. Residuals after fitting Multiple Linear Regression, Linear-Linear: IBU vs ABV model</a:t>
+              <a:t>Residuals after fitting Multiple Linear Regression, Linear-Linear: IBU vs ABV model</a:t>
             </a:r>
           </a:p>
           <a:p>
@@ -6770,7 +7265,7 @@
         </p:blipFill>
         <p:spPr>
           <a:xfrm>
-            <a:off x="838200" y="2351466"/>
+            <a:off x="2955563" y="2385756"/>
             <a:ext cx="6280873" cy="3848396"/>
           </a:xfrm>
           <a:prstGeom prst="rect">
@@ -7087,6 +7582,47 @@
           </a:prstGeom>
         </p:spPr>
       </p:pic>
+      <p:sp>
+        <p:nvSpPr>
+          <p:cNvPr id="3" name="TextBox 2">
+            <a:extLst>
+              <a:ext uri="{FF2B5EF4-FFF2-40B4-BE49-F238E27FC236}">
+                <a16:creationId xmlns:a16="http://schemas.microsoft.com/office/drawing/2014/main" id="{79CA7A34-0D50-43C2-B6D5-2AADBB883766}"/>
+              </a:ext>
+            </a:extLst>
+          </p:cNvPr>
+          <p:cNvSpPr txBox="1"/>
+          <p:nvPr/>
+        </p:nvSpPr>
+        <p:spPr>
+          <a:xfrm>
+            <a:off x="9708204" y="3445450"/>
+            <a:ext cx="2256817" cy="646331"/>
+          </a:xfrm>
+          <a:prstGeom prst="rect">
+            <a:avLst/>
+          </a:prstGeom>
+          <a:noFill/>
+        </p:spPr>
+        <p:txBody>
+          <a:bodyPr wrap="square" rtlCol="0">
+            <a:spAutoFit/>
+          </a:bodyPr>
+          <a:lstStyle/>
+          <a:p>
+            <a:r>
+              <a:rPr lang="en-US" dirty="0"/>
+              <a:t>Max =CO</a:t>
+            </a:r>
+          </a:p>
+          <a:p>
+            <a:r>
+              <a:rPr lang="en-US" dirty="0"/>
+              <a:t>Min = ND</a:t>
+            </a:r>
+          </a:p>
+        </p:txBody>
+      </p:sp>
     </p:spTree>
     <p:extLst>
       <p:ext uri="{BB962C8B-B14F-4D97-AF65-F5344CB8AC3E}">
@@ -7122,7 +7658,7 @@
           <p:cNvPr id="2" name="Title 1">
             <a:extLst>
               <a:ext uri="{FF2B5EF4-FFF2-40B4-BE49-F238E27FC236}">
-                <a16:creationId xmlns:a16="http://schemas.microsoft.com/office/drawing/2014/main" id="{D644DA93-9B9B-4AA4-A13C-4C5BB31E1DBF}"/>
+                <a16:creationId xmlns:a16="http://schemas.microsoft.com/office/drawing/2014/main" id="{A65C208F-259B-4CE8-9BC4-776DC3944C19}"/>
               </a:ext>
             </a:extLst>
           </p:cNvPr>
@@ -7140,7 +7676,7 @@
           <a:p>
             <a:r>
               <a:rPr lang="en-US" dirty="0"/>
-              <a:t>Breweries in each state continued...</a:t>
+              <a:t>Missing Values </a:t>
             </a:r>
           </a:p>
         </p:txBody>
@@ -7150,7 +7686,7 @@
           <p:cNvPr id="4" name="Content Placeholder 3">
             <a:extLst>
               <a:ext uri="{FF2B5EF4-FFF2-40B4-BE49-F238E27FC236}">
-                <a16:creationId xmlns:a16="http://schemas.microsoft.com/office/drawing/2014/main" id="{4C126A93-9C68-AE47-B0FA-8ADE48AA98E9}"/>
+                <a16:creationId xmlns:a16="http://schemas.microsoft.com/office/drawing/2014/main" id="{31D3B1F3-61E5-0B46-8F47-B2202DEA4C0E}"/>
               </a:ext>
             </a:extLst>
           </p:cNvPr>
@@ -7161,76 +7697,15 @@
             <p:ph idx="1"/>
           </p:nvPr>
         </p:nvPicPr>
-        <p:blipFill>
+        <p:blipFill rotWithShape="1">
           <a:blip r:embed="rId3"/>
-          <a:stretch>
-            <a:fillRect/>
-          </a:stretch>
+          <a:srcRect t="4447"/>
+          <a:stretch/>
         </p:blipFill>
         <p:spPr>
           <a:xfrm>
-            <a:off x="1271890" y="1516028"/>
-            <a:ext cx="4387214" cy="4351338"/>
-          </a:xfrm>
-          <a:prstGeom prst="rect">
-            <a:avLst/>
-          </a:prstGeom>
-        </p:spPr>
-      </p:pic>
-      <p:pic>
-        <p:nvPicPr>
-          <p:cNvPr id="5" name="Picture 4">
-            <a:extLst>
-              <a:ext uri="{FF2B5EF4-FFF2-40B4-BE49-F238E27FC236}">
-                <a16:creationId xmlns:a16="http://schemas.microsoft.com/office/drawing/2014/main" id="{D9DDF4B2-87FA-D949-8D40-CC5ACE7E3D7C}"/>
-              </a:ext>
-            </a:extLst>
-          </p:cNvPr>
-          <p:cNvPicPr>
-            <a:picLocks noChangeAspect="1"/>
-          </p:cNvPicPr>
-          <p:nvPr/>
-        </p:nvPicPr>
-        <p:blipFill>
-          <a:blip r:embed="rId4"/>
-          <a:stretch>
-            <a:fillRect/>
-          </a:stretch>
-        </p:blipFill>
-        <p:spPr>
-          <a:xfrm>
-            <a:off x="5583965" y="1516028"/>
-            <a:ext cx="4411984" cy="4351338"/>
-          </a:xfrm>
-          <a:prstGeom prst="rect">
-            <a:avLst/>
-          </a:prstGeom>
-        </p:spPr>
-      </p:pic>
-      <p:pic>
-        <p:nvPicPr>
-          <p:cNvPr id="6" name="Picture 5">
-            <a:extLst>
-              <a:ext uri="{FF2B5EF4-FFF2-40B4-BE49-F238E27FC236}">
-                <a16:creationId xmlns:a16="http://schemas.microsoft.com/office/drawing/2014/main" id="{82AE0360-BB5F-0A45-A681-F65DD02F1F48}"/>
-              </a:ext>
-            </a:extLst>
-          </p:cNvPr>
-          <p:cNvPicPr>
-            <a:picLocks noChangeAspect="1"/>
-          </p:cNvPicPr>
-          <p:nvPr/>
-        </p:nvPicPr>
-        <p:blipFill>
-          <a:blip r:embed="rId5"/>
-          <a:stretch>
-            <a:fillRect/>
-          </a:stretch>
-        </p:blipFill>
-        <p:spPr>
-          <a:xfrm>
-            <a:off x="5508826" y="5867366"/>
-            <a:ext cx="4411983" cy="296175"/>
+            <a:off x="1809136" y="1690688"/>
+            <a:ext cx="7623340" cy="4574766"/>
           </a:xfrm>
           <a:prstGeom prst="rect">
             <a:avLst/>
@@ -7240,7 +7715,7 @@
     </p:spTree>
     <p:extLst>
       <p:ext uri="{BB962C8B-B14F-4D97-AF65-F5344CB8AC3E}">
-        <p14:creationId xmlns:p14="http://schemas.microsoft.com/office/powerpoint/2010/main" val="3286426957"/>
+        <p14:creationId xmlns:p14="http://schemas.microsoft.com/office/powerpoint/2010/main" val="1123778611"/>
       </p:ext>
     </p:extLst>
   </p:cSld>
@@ -7272,7 +7747,7 @@
           <p:cNvPr id="2" name="Title 1">
             <a:extLst>
               <a:ext uri="{FF2B5EF4-FFF2-40B4-BE49-F238E27FC236}">
-                <a16:creationId xmlns:a16="http://schemas.microsoft.com/office/drawing/2014/main" id="{A65C208F-259B-4CE8-9BC4-776DC3944C19}"/>
+                <a16:creationId xmlns:a16="http://schemas.microsoft.com/office/drawing/2014/main" id="{505798CA-8928-E940-B7E5-33D3A7E05222}"/>
               </a:ext>
             </a:extLst>
           </p:cNvPr>
@@ -7290,47 +7765,55 @@
           <a:p>
             <a:r>
               <a:rPr lang="en-US" dirty="0"/>
-              <a:t>Missing Values </a:t>
-            </a:r>
-          </a:p>
-        </p:txBody>
-      </p:sp>
-      <p:pic>
-        <p:nvPicPr>
-          <p:cNvPr id="4" name="Content Placeholder 3">
-            <a:extLst>
-              <a:ext uri="{FF2B5EF4-FFF2-40B4-BE49-F238E27FC236}">
-                <a16:creationId xmlns:a16="http://schemas.microsoft.com/office/drawing/2014/main" id="{31D3B1F3-61E5-0B46-8F47-B2202DEA4C0E}"/>
-              </a:ext>
-            </a:extLst>
-          </p:cNvPr>
-          <p:cNvPicPr>
-            <a:picLocks noGrp="1" noChangeAspect="1"/>
-          </p:cNvPicPr>
+              <a:t>Missing Data: Strategy</a:t>
+            </a:r>
+          </a:p>
+        </p:txBody>
+      </p:sp>
+      <p:sp>
+        <p:nvSpPr>
+          <p:cNvPr id="3" name="Content Placeholder 2">
+            <a:extLst>
+              <a:ext uri="{FF2B5EF4-FFF2-40B4-BE49-F238E27FC236}">
+                <a16:creationId xmlns:a16="http://schemas.microsoft.com/office/drawing/2014/main" id="{14AA9F38-3DD3-0742-BD18-CCCCA0E94C38}"/>
+              </a:ext>
+            </a:extLst>
+          </p:cNvPr>
+          <p:cNvSpPr>
+            <a:spLocks noGrp="1"/>
+          </p:cNvSpPr>
           <p:nvPr>
             <p:ph idx="1"/>
           </p:nvPr>
-        </p:nvPicPr>
-        <p:blipFill>
-          <a:blip r:embed="rId3"/>
-          <a:stretch>
-            <a:fillRect/>
-          </a:stretch>
-        </p:blipFill>
-        <p:spPr>
-          <a:xfrm>
-            <a:off x="1809136" y="1477795"/>
-            <a:ext cx="7623340" cy="4787659"/>
-          </a:xfrm>
-          <a:prstGeom prst="rect">
-            <a:avLst/>
-          </a:prstGeom>
-        </p:spPr>
-      </p:pic>
+        </p:nvSpPr>
+        <p:spPr/>
+        <p:txBody>
+          <a:bodyPr/>
+          <a:lstStyle/>
+          <a:p>
+            <a:r>
+              <a:rPr lang="en-US" dirty="0"/>
+              <a:t>Hand enter all data missing IBU and ABV</a:t>
+            </a:r>
+          </a:p>
+          <a:p>
+            <a:r>
+              <a:rPr lang="en-US" dirty="0"/>
+              <a:t>Drop entries missing both IBU and ABV with no data online </a:t>
+            </a:r>
+          </a:p>
+          <a:p>
+            <a:r>
+              <a:rPr lang="en-US" dirty="0"/>
+              <a:t>Impute IBU based on Median IBU by style for entries that ONLY lack IBU data. </a:t>
+            </a:r>
+          </a:p>
+        </p:txBody>
+      </p:sp>
     </p:spTree>
     <p:extLst>
       <p:ext uri="{BB962C8B-B14F-4D97-AF65-F5344CB8AC3E}">
-        <p14:creationId xmlns:p14="http://schemas.microsoft.com/office/powerpoint/2010/main" val="1123778611"/>
+        <p14:creationId xmlns:p14="http://schemas.microsoft.com/office/powerpoint/2010/main" val="2686119804"/>
       </p:ext>
     </p:extLst>
   </p:cSld>
@@ -7362,7 +7845,7 @@
           <p:cNvPr id="2" name="Title 1">
             <a:extLst>
               <a:ext uri="{FF2B5EF4-FFF2-40B4-BE49-F238E27FC236}">
-                <a16:creationId xmlns:a16="http://schemas.microsoft.com/office/drawing/2014/main" id="{505798CA-8928-E940-B7E5-33D3A7E05222}"/>
+                <a16:creationId xmlns:a16="http://schemas.microsoft.com/office/drawing/2014/main" id="{6BFE0BAC-2DF6-2B45-B347-BB2D7CF6A8DC}"/>
               </a:ext>
             </a:extLst>
           </p:cNvPr>
@@ -7380,7 +7863,7 @@
           <a:p>
             <a:r>
               <a:rPr lang="en-US" dirty="0"/>
-              <a:t>Missing Data: Strategy</a:t>
+              <a:t>Missing Data: Hand Entry</a:t>
             </a:r>
           </a:p>
         </p:txBody>
@@ -7390,7 +7873,7 @@
           <p:cNvPr id="3" name="Content Placeholder 2">
             <a:extLst>
               <a:ext uri="{FF2B5EF4-FFF2-40B4-BE49-F238E27FC236}">
-                <a16:creationId xmlns:a16="http://schemas.microsoft.com/office/drawing/2014/main" id="{14AA9F38-3DD3-0742-BD18-CCCCA0E94C38}"/>
+                <a16:creationId xmlns:a16="http://schemas.microsoft.com/office/drawing/2014/main" id="{D04AFAB5-0330-E341-BDA1-14A3CA7380FF}"/>
               </a:ext>
             </a:extLst>
           </p:cNvPr>
@@ -7401,34 +7884,119 @@
             <p:ph idx="1"/>
           </p:nvPr>
         </p:nvSpPr>
-        <p:spPr/>
-        <p:txBody>
-          <a:bodyPr/>
-          <a:lstStyle/>
-          <a:p>
-            <a:r>
-              <a:rPr lang="en-US" dirty="0"/>
-              <a:t>Hand enter all data missing IBU and ABV</a:t>
-            </a:r>
-          </a:p>
-          <a:p>
-            <a:r>
-              <a:rPr lang="en-US" dirty="0"/>
-              <a:t>Drop entries missing both IBU and ABV with no data online </a:t>
-            </a:r>
-          </a:p>
-          <a:p>
-            <a:r>
-              <a:rPr lang="en-US" dirty="0"/>
-              <a:t>Impute IBU based on Median IBU by style for entries that ONLY lack IBU data. </a:t>
-            </a:r>
+        <p:spPr>
+          <a:xfrm>
+            <a:off x="838200" y="1710231"/>
+            <a:ext cx="10515600" cy="4351338"/>
+          </a:xfrm>
+        </p:spPr>
+        <p:txBody>
+          <a:bodyPr>
+            <a:normAutofit fontScale="70000" lnSpcReduction="20000"/>
+          </a:bodyPr>
+          <a:lstStyle/>
+          <a:p>
+            <a:pPr marL="0" indent="0">
+              <a:buNone/>
+            </a:pPr>
+            <a:r>
+              <a:rPr lang="en-US" dirty="0"/>
+              <a:t>No data was found and thus entries with missing data are dropped for: </a:t>
+            </a:r>
+          </a:p>
+          <a:p>
+            <a:r>
+              <a:rPr lang="en-US" dirty="0"/>
+              <a:t>Cedar Creek - Special Release is ambiguous, missing ABV/IBU/Style it does not solve the QOI.</a:t>
+            </a:r>
+          </a:p>
+          <a:p>
+            <a:r>
+              <a:rPr lang="en-US" dirty="0"/>
+              <a:t>Oskar Blues Brewery - The </a:t>
+            </a:r>
+            <a:r>
+              <a:rPr lang="en-US" dirty="0" err="1"/>
+              <a:t>Crowler</a:t>
+            </a:r>
+            <a:r>
+              <a:rPr lang="en-US" dirty="0"/>
+              <a:t> is not an actual beer but a type of can.</a:t>
+            </a:r>
+          </a:p>
+          <a:p>
+            <a:r>
+              <a:rPr lang="en-US" dirty="0"/>
+              <a:t>Oskar Blues Brewery - </a:t>
+            </a:r>
+            <a:r>
+              <a:rPr lang="en-US" dirty="0" err="1"/>
+              <a:t>Can’d</a:t>
+            </a:r>
+            <a:r>
+              <a:rPr lang="en-US" dirty="0"/>
+              <a:t> aid foundation is a relief effort that sends water so it does not fit in the dataset.</a:t>
+            </a:r>
+          </a:p>
+          <a:p>
+            <a:r>
+              <a:rPr lang="en-US" dirty="0"/>
+              <a:t>Beer ID 2364, Royal Lager of Weston Brewing has no ABV/IBU.</a:t>
+            </a:r>
+          </a:p>
+          <a:p>
+            <a:r>
+              <a:rPr lang="en-US" dirty="0"/>
+              <a:t>Beer ID 2322,  Fort Pitt Brewing Company Fort Pitt Ale.</a:t>
+            </a:r>
+          </a:p>
+          <a:p>
+            <a:r>
+              <a:rPr lang="en-US" dirty="0"/>
+              <a:t>Beer ID 1750, Oskar Blues Brewery Birth IPA.</a:t>
+            </a:r>
+          </a:p>
+          <a:p>
+            <a:r>
+              <a:rPr lang="en-US" dirty="0"/>
+              <a:t>Beer ID 710, no data.</a:t>
+            </a:r>
+          </a:p>
+          <a:p>
+            <a:r>
+              <a:rPr lang="en-US" dirty="0"/>
+              <a:t>Beer ID 273, </a:t>
+            </a:r>
+            <a:r>
+              <a:rPr lang="en-US" dirty="0" err="1"/>
+              <a:t>MillKing</a:t>
+            </a:r>
+            <a:r>
+              <a:rPr lang="en-US" dirty="0"/>
+              <a:t> It Productions AXL Pale Ale, out of business no info.</a:t>
+            </a:r>
+          </a:p>
+          <a:p>
+            <a:r>
+              <a:rPr lang="en-US" dirty="0"/>
+              <a:t>Beer ID 1095, no data.</a:t>
+            </a:r>
+          </a:p>
+          <a:p>
+            <a:r>
+              <a:rPr lang="en-US" dirty="0"/>
+              <a:t>Beer ID 963, no data.</a:t>
+            </a:r>
+          </a:p>
+          <a:p>
+            <a:endParaRPr lang="en-US" dirty="0"/>
           </a:p>
         </p:txBody>
       </p:sp>
     </p:spTree>
     <p:extLst>
       <p:ext uri="{BB962C8B-B14F-4D97-AF65-F5344CB8AC3E}">
-        <p14:creationId xmlns:p14="http://schemas.microsoft.com/office/powerpoint/2010/main" val="2686119804"/>
+        <p14:creationId xmlns:p14="http://schemas.microsoft.com/office/powerpoint/2010/main" val="550357753"/>
       </p:ext>
     </p:extLst>
   </p:cSld>
@@ -7460,7 +8028,7 @@
           <p:cNvPr id="2" name="Title 1">
             <a:extLst>
               <a:ext uri="{FF2B5EF4-FFF2-40B4-BE49-F238E27FC236}">
-                <a16:creationId xmlns:a16="http://schemas.microsoft.com/office/drawing/2014/main" id="{6BFE0BAC-2DF6-2B45-B347-BB2D7CF6A8DC}"/>
+                <a16:creationId xmlns:a16="http://schemas.microsoft.com/office/drawing/2014/main" id="{97E01514-23C4-BB46-82C6-B8B4857D3625}"/>
               </a:ext>
             </a:extLst>
           </p:cNvPr>
@@ -7478,140 +8046,189 @@
           <a:p>
             <a:r>
               <a:rPr lang="en-US" dirty="0"/>
-              <a:t>Missing Data: Hand Entry</a:t>
-            </a:r>
-          </a:p>
-        </p:txBody>
-      </p:sp>
-      <p:sp>
-        <p:nvSpPr>
-          <p:cNvPr id="3" name="Content Placeholder 2">
-            <a:extLst>
-              <a:ext uri="{FF2B5EF4-FFF2-40B4-BE49-F238E27FC236}">
-                <a16:creationId xmlns:a16="http://schemas.microsoft.com/office/drawing/2014/main" id="{D04AFAB5-0330-E341-BDA1-14A3CA7380FF}"/>
-              </a:ext>
-            </a:extLst>
-          </p:cNvPr>
-          <p:cNvSpPr>
-            <a:spLocks noGrp="1"/>
-          </p:cNvSpPr>
+              <a:t>Missing Data: IBU Imputation </a:t>
+            </a:r>
+          </a:p>
+        </p:txBody>
+      </p:sp>
+      <p:pic>
+        <p:nvPicPr>
+          <p:cNvPr id="4" name="Content Placeholder 3">
+            <a:extLst>
+              <a:ext uri="{FF2B5EF4-FFF2-40B4-BE49-F238E27FC236}">
+                <a16:creationId xmlns:a16="http://schemas.microsoft.com/office/drawing/2014/main" id="{6CE8CEF7-59D6-9B43-A414-FF6B13FF099A}"/>
+              </a:ext>
+            </a:extLst>
+          </p:cNvPr>
+          <p:cNvPicPr>
+            <a:picLocks noGrp="1" noChangeAspect="1"/>
+          </p:cNvPicPr>
           <p:nvPr>
             <p:ph idx="1"/>
           </p:nvPr>
-        </p:nvSpPr>
+        </p:nvPicPr>
+        <p:blipFill>
+          <a:blip r:embed="rId2"/>
+          <a:stretch>
+            <a:fillRect/>
+          </a:stretch>
+        </p:blipFill>
         <p:spPr>
           <a:xfrm>
-            <a:off x="838200" y="1710231"/>
-            <a:ext cx="10515600" cy="4351338"/>
+            <a:off x="6032524" y="4506760"/>
+            <a:ext cx="4983948" cy="1986115"/>
           </a:xfrm>
+          <a:prstGeom prst="rect">
+            <a:avLst/>
+          </a:prstGeom>
         </p:spPr>
-        <p:txBody>
-          <a:bodyPr>
-            <a:normAutofit fontScale="70000" lnSpcReduction="20000"/>
+      </p:pic>
+      <p:pic>
+        <p:nvPicPr>
+          <p:cNvPr id="5" name="Picture 4">
+            <a:extLst>
+              <a:ext uri="{FF2B5EF4-FFF2-40B4-BE49-F238E27FC236}">
+                <a16:creationId xmlns:a16="http://schemas.microsoft.com/office/drawing/2014/main" id="{2C4381EC-D1A5-B440-A7EE-D7A0D7096518}"/>
+              </a:ext>
+            </a:extLst>
+          </p:cNvPr>
+          <p:cNvPicPr>
+            <a:picLocks noChangeAspect="1"/>
+          </p:cNvPicPr>
+          <p:nvPr/>
+        </p:nvPicPr>
+        <p:blipFill>
+          <a:blip r:embed="rId3"/>
+          <a:stretch>
+            <a:fillRect/>
+          </a:stretch>
+        </p:blipFill>
+        <p:spPr>
+          <a:xfrm>
+            <a:off x="6032524" y="1942728"/>
+            <a:ext cx="4974336" cy="1803196"/>
+          </a:xfrm>
+          <a:prstGeom prst="rect">
+            <a:avLst/>
+          </a:prstGeom>
+        </p:spPr>
+      </p:pic>
+      <p:sp>
+        <p:nvSpPr>
+          <p:cNvPr id="6" name="TextBox 5">
+            <a:extLst>
+              <a:ext uri="{FF2B5EF4-FFF2-40B4-BE49-F238E27FC236}">
+                <a16:creationId xmlns:a16="http://schemas.microsoft.com/office/drawing/2014/main" id="{8E93F844-83AD-F147-852E-791EB246F713}"/>
+              </a:ext>
+            </a:extLst>
+          </p:cNvPr>
+          <p:cNvSpPr txBox="1"/>
+          <p:nvPr/>
+        </p:nvSpPr>
+        <p:spPr>
+          <a:xfrm>
+            <a:off x="7187889" y="1573396"/>
+            <a:ext cx="2159117" cy="369332"/>
+          </a:xfrm>
+          <a:prstGeom prst="rect">
+            <a:avLst/>
+          </a:prstGeom>
+          <a:noFill/>
+        </p:spPr>
+        <p:txBody>
+          <a:bodyPr wrap="none" rtlCol="0">
+            <a:spAutoFit/>
           </a:bodyPr>
           <a:lstStyle/>
           <a:p>
-            <a:pPr marL="0" indent="0">
-              <a:buNone/>
+            <a:r>
+              <a:rPr lang="en-US" dirty="0"/>
+              <a:t>Before IBU Imputation</a:t>
+            </a:r>
+          </a:p>
+        </p:txBody>
+      </p:sp>
+      <p:sp>
+        <p:nvSpPr>
+          <p:cNvPr id="7" name="TextBox 6">
+            <a:extLst>
+              <a:ext uri="{FF2B5EF4-FFF2-40B4-BE49-F238E27FC236}">
+                <a16:creationId xmlns:a16="http://schemas.microsoft.com/office/drawing/2014/main" id="{98915DF3-7D6A-DC44-A756-02648D666FB3}"/>
+              </a:ext>
+            </a:extLst>
+          </p:cNvPr>
+          <p:cNvSpPr txBox="1"/>
+          <p:nvPr/>
+        </p:nvSpPr>
+        <p:spPr>
+          <a:xfrm>
+            <a:off x="6975647" y="4112469"/>
+            <a:ext cx="2091214" cy="646331"/>
+          </a:xfrm>
+          <a:prstGeom prst="rect">
+            <a:avLst/>
+          </a:prstGeom>
+          <a:noFill/>
+        </p:spPr>
+        <p:txBody>
+          <a:bodyPr wrap="none" rtlCol="0">
+            <a:spAutoFit/>
+          </a:bodyPr>
+          <a:lstStyle/>
+          <a:p>
+            <a:r>
+              <a:rPr lang="en-US" dirty="0"/>
+              <a:t>After IBU Imputation</a:t>
+            </a:r>
+          </a:p>
+          <a:p>
+            <a:endParaRPr lang="en-US" dirty="0"/>
+          </a:p>
+        </p:txBody>
+      </p:sp>
+      <p:sp>
+        <p:nvSpPr>
+          <p:cNvPr id="14" name="TextBox 13">
+            <a:extLst>
+              <a:ext uri="{FF2B5EF4-FFF2-40B4-BE49-F238E27FC236}">
+                <a16:creationId xmlns:a16="http://schemas.microsoft.com/office/drawing/2014/main" id="{D7A6B74F-B316-4643-BB2C-5F43B5DCE9BE}"/>
+              </a:ext>
+            </a:extLst>
+          </p:cNvPr>
+          <p:cNvSpPr txBox="1"/>
+          <p:nvPr/>
+        </p:nvSpPr>
+        <p:spPr>
+          <a:xfrm>
+            <a:off x="969579" y="2120462"/>
+            <a:ext cx="4139018" cy="369332"/>
+          </a:xfrm>
+          <a:prstGeom prst="rect">
+            <a:avLst/>
+          </a:prstGeom>
+          <a:noFill/>
+        </p:spPr>
+        <p:txBody>
+          <a:bodyPr wrap="square" rtlCol="0">
+            <a:spAutoFit/>
+          </a:bodyPr>
+          <a:lstStyle/>
+          <a:p>
+            <a:pPr marL="285750" indent="-285750">
+              <a:buFont typeface="Arial" panose="020B0604020202020204" pitchFamily="34" charset="0"/>
+              <a:buChar char="•"/>
             </a:pPr>
             <a:r>
               <a:rPr lang="en-US" dirty="0"/>
-              <a:t>No data was found and thus entries with missing data are dropped for: </a:t>
-            </a:r>
-          </a:p>
-          <a:p>
-            <a:r>
-              <a:rPr lang="en-US" dirty="0"/>
-              <a:t>Cedar Creek - Special Release is ambiguous, missing ABV/IBU/Style it does not solve the QOI.</a:t>
-            </a:r>
-          </a:p>
-          <a:p>
-            <a:r>
-              <a:rPr lang="en-US" dirty="0"/>
-              <a:t>Oskar Blues Brewery - The </a:t>
-            </a:r>
-            <a:r>
-              <a:rPr lang="en-US" dirty="0" err="1"/>
-              <a:t>Crowler</a:t>
-            </a:r>
-            <a:r>
-              <a:rPr lang="en-US" dirty="0"/>
-              <a:t> is not an actual beer but a type of can.</a:t>
-            </a:r>
-          </a:p>
-          <a:p>
-            <a:r>
-              <a:rPr lang="en-US" dirty="0"/>
-              <a:t>Oskar Blues Brewery - </a:t>
-            </a:r>
-            <a:r>
-              <a:rPr lang="en-US" dirty="0" err="1"/>
-              <a:t>Can’d</a:t>
-            </a:r>
-            <a:r>
-              <a:rPr lang="en-US" dirty="0"/>
-              <a:t> aid foundation is a relief effort that sends water so it does not fit in the dataset.</a:t>
-            </a:r>
-          </a:p>
-          <a:p>
-            <a:r>
-              <a:rPr lang="en-US" dirty="0"/>
-              <a:t>Beer ID 2364, Royal Lager of Weston Brewing has no ABV/IBU.</a:t>
-            </a:r>
-          </a:p>
-          <a:p>
-            <a:r>
-              <a:rPr lang="en-US" dirty="0"/>
-              <a:t>Beer ID 2322,  Fort Pitt Brewing Company Fort Pitt Ale.</a:t>
-            </a:r>
-          </a:p>
-          <a:p>
-            <a:r>
-              <a:rPr lang="en-US" dirty="0"/>
-              <a:t>Beer ID 1750, Oskar Blues Brewery Birth IPA.</a:t>
-            </a:r>
-          </a:p>
-          <a:p>
-            <a:r>
-              <a:rPr lang="en-US" dirty="0"/>
-              <a:t>Beer ID 710, no data.</a:t>
-            </a:r>
-          </a:p>
-          <a:p>
-            <a:r>
-              <a:rPr lang="en-US" dirty="0"/>
-              <a:t>Beer ID 273, </a:t>
-            </a:r>
-            <a:r>
-              <a:rPr lang="en-US" dirty="0" err="1"/>
-              <a:t>MillKing</a:t>
-            </a:r>
-            <a:r>
-              <a:rPr lang="en-US" dirty="0"/>
-              <a:t> It Productions AXL Pale Ale, out of business no info.</a:t>
-            </a:r>
-          </a:p>
-          <a:p>
-            <a:r>
-              <a:rPr lang="en-US" dirty="0"/>
-              <a:t>Beer ID 1095, no data.</a:t>
-            </a:r>
-          </a:p>
-          <a:p>
-            <a:r>
-              <a:rPr lang="en-US" dirty="0"/>
-              <a:t>Beer ID 963, no data.</a:t>
-            </a:r>
-          </a:p>
-          <a:p>
-            <a:endParaRPr lang="en-US" dirty="0"/>
+              <a:t>Impute via the median IBU per style… </a:t>
+            </a:r>
           </a:p>
         </p:txBody>
       </p:sp>
     </p:spTree>
     <p:extLst>
       <p:ext uri="{BB962C8B-B14F-4D97-AF65-F5344CB8AC3E}">
-        <p14:creationId xmlns:p14="http://schemas.microsoft.com/office/powerpoint/2010/main" val="550357753"/>
+        <p14:creationId xmlns:p14="http://schemas.microsoft.com/office/powerpoint/2010/main" val="3419396976"/>
       </p:ext>
     </p:extLst>
   </p:cSld>

</xml_diff>

<commit_message>
fix: updated git url
</commit_message>
<xml_diff>
--- a/Beers_and_Breweries.pptx
+++ b/Beers_and_Breweries.pptx
@@ -5,32 +5,29 @@
     <p:sldMasterId id="2147483648" r:id="rId1"/>
   </p:sldMasterIdLst>
   <p:notesMasterIdLst>
-    <p:notesMasterId r:id="rId25"/>
+    <p:notesMasterId r:id="rId22"/>
   </p:notesMasterIdLst>
   <p:sldIdLst>
     <p:sldId id="256" r:id="rId2"/>
-    <p:sldId id="257" r:id="rId3"/>
-    <p:sldId id="268" r:id="rId4"/>
-    <p:sldId id="269" r:id="rId5"/>
-    <p:sldId id="265" r:id="rId6"/>
-    <p:sldId id="260" r:id="rId7"/>
-    <p:sldId id="272" r:id="rId8"/>
-    <p:sldId id="266" r:id="rId9"/>
-    <p:sldId id="271" r:id="rId10"/>
-    <p:sldId id="273" r:id="rId11"/>
-    <p:sldId id="274" r:id="rId12"/>
-    <p:sldId id="263" r:id="rId13"/>
-    <p:sldId id="264" r:id="rId14"/>
-    <p:sldId id="275" r:id="rId15"/>
-    <p:sldId id="261" r:id="rId16"/>
-    <p:sldId id="262" r:id="rId17"/>
-    <p:sldId id="276" r:id="rId18"/>
-    <p:sldId id="279" r:id="rId19"/>
-    <p:sldId id="280" r:id="rId20"/>
-    <p:sldId id="281" r:id="rId21"/>
-    <p:sldId id="282" r:id="rId22"/>
-    <p:sldId id="283" r:id="rId23"/>
-    <p:sldId id="277" r:id="rId24"/>
+    <p:sldId id="268" r:id="rId3"/>
+    <p:sldId id="269" r:id="rId4"/>
+    <p:sldId id="265" r:id="rId5"/>
+    <p:sldId id="260" r:id="rId6"/>
+    <p:sldId id="272" r:id="rId7"/>
+    <p:sldId id="271" r:id="rId8"/>
+    <p:sldId id="273" r:id="rId9"/>
+    <p:sldId id="274" r:id="rId10"/>
+    <p:sldId id="263" r:id="rId11"/>
+    <p:sldId id="264" r:id="rId12"/>
+    <p:sldId id="275" r:id="rId13"/>
+    <p:sldId id="261" r:id="rId14"/>
+    <p:sldId id="276" r:id="rId15"/>
+    <p:sldId id="279" r:id="rId16"/>
+    <p:sldId id="280" r:id="rId17"/>
+    <p:sldId id="281" r:id="rId18"/>
+    <p:sldId id="282" r:id="rId19"/>
+    <p:sldId id="283" r:id="rId20"/>
+    <p:sldId id="277" r:id="rId21"/>
   </p:sldIdLst>
   <p:sldSz cx="12192000" cy="6858000"/>
   <p:notesSz cx="6858000" cy="9144000"/>
@@ -219,7 +216,7 @@
           <a:p>
             <a:fld id="{99C1D520-A1CA-4161-B5D5-FF1CB1424987}" type="datetimeFigureOut">
               <a:rPr lang="en-US" smtClean="0"/>
-              <a:t>3/7/2021</a:t>
+              <a:t>3/7/21</a:t>
             </a:fld>
             <a:endParaRPr lang="en-US"/>
           </a:p>
@@ -659,7 +656,7 @@
           <a:p>
             <a:fld id="{501499A2-1326-4FB0-82A2-456B0524BFAF}" type="slidenum">
               <a:rPr lang="en-US" smtClean="0"/>
-              <a:t>12</a:t>
+              <a:t>10</a:t>
             </a:fld>
             <a:endParaRPr lang="en-US"/>
           </a:p>
@@ -724,7 +721,7 @@
           <a:p>
             <a:r>
               <a:rPr lang="en-US" dirty="0"/>
-              <a:t>The IBU distribution is right-skewed which could indicate that more bitter beer is less popular and thus sold less. </a:t>
+              <a:t>As you can see this distribution is right skewed. Bitter beer, although popular, is still not more popular than light beer which is not as hoppy. </a:t>
             </a:r>
           </a:p>
         </p:txBody>
@@ -746,7 +743,7 @@
           <a:p>
             <a:fld id="{501499A2-1326-4FB0-82A2-456B0524BFAF}" type="slidenum">
               <a:rPr lang="en-US" smtClean="0"/>
-              <a:t>13</a:t>
+              <a:t>11</a:t>
             </a:fld>
             <a:endParaRPr lang="en-US"/>
           </a:p>
@@ -839,7 +836,7 @@
           <a:p>
             <a:fld id="{501499A2-1326-4FB0-82A2-456B0524BFAF}" type="slidenum">
               <a:rPr lang="en-US" smtClean="0"/>
-              <a:t>14</a:t>
+              <a:t>12</a:t>
             </a:fld>
             <a:endParaRPr lang="en-US"/>
           </a:p>
@@ -926,7 +923,7 @@
           <a:p>
             <a:fld id="{501499A2-1326-4FB0-82A2-456B0524BFAF}" type="slidenum">
               <a:rPr lang="en-US" smtClean="0"/>
-              <a:t>15</a:t>
+              <a:t>13</a:t>
             </a:fld>
             <a:endParaRPr lang="en-US"/>
           </a:p>
@@ -991,13 +988,7 @@
           <a:p>
             <a:r>
               <a:rPr lang="en-US" dirty="0"/>
-              <a:t>As can be seen, here are the scatter plots for IBU vs ABV, colorized by state with an ordinary least square's regression line. </a:t>
-            </a:r>
-          </a:p>
-          <a:p>
-            <a:r>
-              <a:rPr lang="en-US" dirty="0"/>
-              <a:t>These plots suggest visually that there is indeed a linear relationship between IBU and ABV and that there are some outliers at the very high and low ABV values. </a:t>
+              <a:t>This is the same plot as the slide before except not colorized and fitted with a linear model line. </a:t>
             </a:r>
           </a:p>
         </p:txBody>
@@ -1019,7 +1010,7 @@
           <a:p>
             <a:fld id="{501499A2-1326-4FB0-82A2-456B0524BFAF}" type="slidenum">
               <a:rPr lang="en-US" smtClean="0"/>
-              <a:t>16</a:t>
+              <a:t>14</a:t>
             </a:fld>
             <a:endParaRPr lang="en-US"/>
           </a:p>
@@ -1028,7 +1019,7 @@
     </p:spTree>
     <p:extLst>
       <p:ext uri="{BB962C8B-B14F-4D97-AF65-F5344CB8AC3E}">
-        <p14:creationId xmlns:p14="http://schemas.microsoft.com/office/powerpoint/2010/main" val="1904811706"/>
+        <p14:creationId xmlns:p14="http://schemas.microsoft.com/office/powerpoint/2010/main" val="900710725"/>
       </p:ext>
     </p:extLst>
   </p:cSld>
@@ -1084,7 +1075,13 @@
           <a:p>
             <a:r>
               <a:rPr lang="en-US" dirty="0"/>
-              <a:t>This is the same plot as the slide before except not colorized and fitted with a linear model line. </a:t>
+              <a:t>As you can see both distributions are right skewed, and for a set ABV value IPA’s are more right skewed. </a:t>
+            </a:r>
+          </a:p>
+          <a:p>
+            <a:r>
+              <a:rPr lang="en-US" dirty="0"/>
+              <a:t>It is possible that discerning IPA drinkers might drink fewer beers or pay more for their beer and as such require a higher ABV to get the same buzz.</a:t>
             </a:r>
           </a:p>
         </p:txBody>
@@ -1106,7 +1103,7 @@
           <a:p>
             <a:fld id="{501499A2-1326-4FB0-82A2-456B0524BFAF}" type="slidenum">
               <a:rPr lang="en-US" smtClean="0"/>
-              <a:t>17</a:t>
+              <a:t>15</a:t>
             </a:fld>
             <a:endParaRPr lang="en-US"/>
           </a:p>
@@ -1115,7 +1112,7 @@
     </p:spTree>
     <p:extLst>
       <p:ext uri="{BB962C8B-B14F-4D97-AF65-F5344CB8AC3E}">
-        <p14:creationId xmlns:p14="http://schemas.microsoft.com/office/powerpoint/2010/main" val="900710725"/>
+        <p14:creationId xmlns:p14="http://schemas.microsoft.com/office/powerpoint/2010/main" val="3757662064"/>
       </p:ext>
     </p:extLst>
   </p:cSld>
@@ -1171,13 +1168,16 @@
           <a:p>
             <a:r>
               <a:rPr lang="en-US" dirty="0"/>
-              <a:t>As you can see both distributions are right skewed, and for a set ABV value IPA’s are more right skewed. </a:t>
-            </a:r>
+              <a:t>As you can see the red line shows the trend for IPA and the blue shows the trend for Other ale. </a:t>
+            </a:r>
+          </a:p>
+          <a:p>
+            <a:endParaRPr lang="en-US" dirty="0"/>
           </a:p>
           <a:p>
             <a:r>
               <a:rPr lang="en-US" dirty="0"/>
-              <a:t>It is possible that discerning IPA drinkers might drink fewer beers or pay more for their beer and as such require a higher ABV to get the same buzz.</a:t>
+              <a:t>IPAs are generally hoppier  for the same ABV  when compared to Other Ales. This is likely because IPAs use a lot of hops in the brewing process.</a:t>
             </a:r>
           </a:p>
         </p:txBody>
@@ -1199,7 +1199,7 @@
           <a:p>
             <a:fld id="{501499A2-1326-4FB0-82A2-456B0524BFAF}" type="slidenum">
               <a:rPr lang="en-US" smtClean="0"/>
-              <a:t>18</a:t>
+              <a:t>16</a:t>
             </a:fld>
             <a:endParaRPr lang="en-US"/>
           </a:p>
@@ -1208,7 +1208,7 @@
     </p:spTree>
     <p:extLst>
       <p:ext uri="{BB962C8B-B14F-4D97-AF65-F5344CB8AC3E}">
-        <p14:creationId xmlns:p14="http://schemas.microsoft.com/office/powerpoint/2010/main" val="3757662064"/>
+        <p14:creationId xmlns:p14="http://schemas.microsoft.com/office/powerpoint/2010/main" val="2289104831"/>
       </p:ext>
     </p:extLst>
   </p:cSld>
@@ -1264,16 +1264,7 @@
           <a:p>
             <a:r>
               <a:rPr lang="en-US" dirty="0"/>
-              <a:t>As you can see the red line shows the trend for IPA and the blue shows the trend for Other ale. </a:t>
-            </a:r>
-          </a:p>
-          <a:p>
-            <a:endParaRPr lang="en-US" dirty="0"/>
-          </a:p>
-          <a:p>
-            <a:r>
-              <a:rPr lang="en-US" dirty="0"/>
-              <a:t>IPAs are generally hoppier  for the same ABV  when compared to Other Ales. This is likely because IPAs use a lot of hops in the brewing process.</a:t>
+              <a:t>Our successful classification of IPAs vs Other Ales reinforces the notions that the relationship between IBU and ABV are different between IPA’s and Other Ales. The reasons for this might include the aforementioned slides. </a:t>
             </a:r>
           </a:p>
         </p:txBody>
@@ -1295,7 +1286,7 @@
           <a:p>
             <a:fld id="{501499A2-1326-4FB0-82A2-456B0524BFAF}" type="slidenum">
               <a:rPr lang="en-US" smtClean="0"/>
-              <a:t>19</a:t>
+              <a:t>17</a:t>
             </a:fld>
             <a:endParaRPr lang="en-US"/>
           </a:p>
@@ -1304,7 +1295,7 @@
     </p:spTree>
     <p:extLst>
       <p:ext uri="{BB962C8B-B14F-4D97-AF65-F5344CB8AC3E}">
-        <p14:creationId xmlns:p14="http://schemas.microsoft.com/office/powerpoint/2010/main" val="2289104831"/>
+        <p14:creationId xmlns:p14="http://schemas.microsoft.com/office/powerpoint/2010/main" val="3693712081"/>
       </p:ext>
     </p:extLst>
   </p:cSld>
@@ -1360,7 +1351,7 @@
           <a:p>
             <a:r>
               <a:rPr lang="en-US" dirty="0"/>
-              <a:t>Our successful classification of IPAs vs Other Ales reinforces the notions that the relationship between IBU and ABV are different between IPA’s and Other Ales. The reasons for this might include the aforementioned slides. </a:t>
+              <a:t>Note that ratios between 12- and 16-ounce ales are different for each state highlighting potentially different preferences by state. </a:t>
             </a:r>
           </a:p>
         </p:txBody>
@@ -1382,7 +1373,7 @@
           <a:p>
             <a:fld id="{501499A2-1326-4FB0-82A2-456B0524BFAF}" type="slidenum">
               <a:rPr lang="en-US" smtClean="0"/>
-              <a:t>20</a:t>
+              <a:t>18</a:t>
             </a:fld>
             <a:endParaRPr lang="en-US"/>
           </a:p>
@@ -1391,7 +1382,7 @@
     </p:spTree>
     <p:extLst>
       <p:ext uri="{BB962C8B-B14F-4D97-AF65-F5344CB8AC3E}">
-        <p14:creationId xmlns:p14="http://schemas.microsoft.com/office/powerpoint/2010/main" val="3693712081"/>
+        <p14:creationId xmlns:p14="http://schemas.microsoft.com/office/powerpoint/2010/main" val="2507742313"/>
       </p:ext>
     </p:extLst>
   </p:cSld>
@@ -1447,7 +1438,25 @@
           <a:p>
             <a:r>
               <a:rPr lang="en-US" dirty="0"/>
-              <a:t>Note that ratios between 12- and 16-ounce ales are different for each state highlighting potentially different preferences by state. </a:t>
+              <a:t>This suggests that when considering what size a beer should be sold in, it could be important to consider what state that beer is going to be brewed in. </a:t>
+            </a:r>
+          </a:p>
+          <a:p>
+            <a:endParaRPr lang="en-US" dirty="0"/>
+          </a:p>
+          <a:p>
+            <a:r>
+              <a:rPr lang="en-US" dirty="0"/>
+              <a:t>This helps align sales with the laws and preferences of that state. For example, Indiana has a high prevalence of 16 ounce ales, whereas Colorado or Texas both lean towards 12 ounce ales. It would be preferable to brew and sell 16 ounce beers in states like Indiana (or other states that have more 16 ounce ales) and 12 ounce beers in Colorado (or other states that have more 12 ounce ales).</a:t>
+            </a:r>
+          </a:p>
+          <a:p>
+            <a:endParaRPr lang="en-US" dirty="0"/>
+          </a:p>
+          <a:p>
+            <a:r>
+              <a:rPr lang="en-US" dirty="0"/>
+              <a:t>The reason for this association may be due to a variety of reasons including income, weather, local diet, and social norms for beer drinkers.</a:t>
             </a:r>
           </a:p>
         </p:txBody>
@@ -1469,7 +1478,7 @@
           <a:p>
             <a:fld id="{501499A2-1326-4FB0-82A2-456B0524BFAF}" type="slidenum">
               <a:rPr lang="en-US" smtClean="0"/>
-              <a:t>21</a:t>
+              <a:t>19</a:t>
             </a:fld>
             <a:endParaRPr lang="en-US"/>
           </a:p>
@@ -1478,7 +1487,7 @@
     </p:spTree>
     <p:extLst>
       <p:ext uri="{BB962C8B-B14F-4D97-AF65-F5344CB8AC3E}">
-        <p14:creationId xmlns:p14="http://schemas.microsoft.com/office/powerpoint/2010/main" val="2507742313"/>
+        <p14:creationId xmlns:p14="http://schemas.microsoft.com/office/powerpoint/2010/main" val="3585949879"/>
       </p:ext>
     </p:extLst>
   </p:cSld>
@@ -1532,10 +1541,38 @@
           <a:bodyPr/>
           <a:lstStyle/>
           <a:p>
+            <a:pPr marL="0" marR="0" lvl="0" indent="0" algn="l" defTabSz="914400" rtl="0" eaLnBrk="1" fontAlgn="auto" latinLnBrk="0" hangingPunct="1">
+              <a:lnSpc>
+                <a:spcPct val="100000"/>
+              </a:lnSpc>
+              <a:spcBef>
+                <a:spcPts val="0"/>
+              </a:spcBef>
+              <a:spcAft>
+                <a:spcPts val="0"/>
+              </a:spcAft>
+              <a:buClrTx/>
+              <a:buSzTx/>
+              <a:buFontTx/>
+              <a:buNone/>
+              <a:tabLst/>
+              <a:defRPr/>
+            </a:pPr>
             <a:r>
               <a:rPr lang="en-US" dirty="0"/>
-              <a:t>We want to investigate the relationship between ABV and IBU for several different beers and breweries. What kind of dataset do we have?</a:t>
-            </a:r>
+              <a:t>Our Goal is </a:t>
+            </a:r>
+            <a:r>
+              <a:rPr lang="en-US"/>
+              <a:t>to asses </a:t>
+            </a:r>
+            <a:r>
+              <a:rPr lang="en-US" dirty="0"/>
+              <a:t>existing relationships including IBU and ABV for Ales, across the united states</a:t>
+            </a:r>
+          </a:p>
+          <a:p>
+            <a:endParaRPr lang="en-US" dirty="0"/>
           </a:p>
         </p:txBody>
       </p:sp>
@@ -1556,7 +1593,7 @@
           <a:p>
             <a:fld id="{501499A2-1326-4FB0-82A2-456B0524BFAF}" type="slidenum">
               <a:rPr lang="en-US" smtClean="0"/>
-              <a:t>3</a:t>
+              <a:t>2</a:t>
             </a:fld>
             <a:endParaRPr lang="en-US"/>
           </a:p>
@@ -1619,28 +1656,7 @@
           <a:bodyPr/>
           <a:lstStyle/>
           <a:p>
-            <a:r>
-              <a:rPr lang="en-US" dirty="0"/>
-              <a:t>This suggests that when considering what size a beer should be sold in, it could be important to consider what state that beer is going to be brewed in. </a:t>
-            </a:r>
-          </a:p>
-          <a:p>
             <a:endParaRPr lang="en-US" dirty="0"/>
-          </a:p>
-          <a:p>
-            <a:r>
-              <a:rPr lang="en-US" dirty="0"/>
-              <a:t>This helps align sales with the laws and preferences of that state. For example, Indiana has a high prevalence of 16 ounce ales, whereas Colorado or Texas both lean towards 12 ounce ales. It would be preferable to brew and sell 16 ounce beers in states like Indiana (or other states that have more 16 ounce ales) and 12 ounce beers in Colorado (or other states that have more 12 ounce ales).</a:t>
-            </a:r>
-          </a:p>
-          <a:p>
-            <a:endParaRPr lang="en-US" dirty="0"/>
-          </a:p>
-          <a:p>
-            <a:r>
-              <a:rPr lang="en-US" dirty="0"/>
-              <a:t>The reason for this association may be due to a variety of reasons including income, weather, local diet, and social norms for beer drinkers.</a:t>
-            </a:r>
           </a:p>
         </p:txBody>
       </p:sp>
@@ -1661,91 +1677,7 @@
           <a:p>
             <a:fld id="{501499A2-1326-4FB0-82A2-456B0524BFAF}" type="slidenum">
               <a:rPr lang="en-US" smtClean="0"/>
-              <a:t>22</a:t>
-            </a:fld>
-            <a:endParaRPr lang="en-US"/>
-          </a:p>
-        </p:txBody>
-      </p:sp>
-    </p:spTree>
-    <p:extLst>
-      <p:ext uri="{BB962C8B-B14F-4D97-AF65-F5344CB8AC3E}">
-        <p14:creationId xmlns:p14="http://schemas.microsoft.com/office/powerpoint/2010/main" val="3585949879"/>
-      </p:ext>
-    </p:extLst>
-  </p:cSld>
-  <p:clrMapOvr>
-    <a:masterClrMapping/>
-  </p:clrMapOvr>
-</p:notes>
-</file>
-
-<file path=ppt/notesSlides/notesSlide21.xml><?xml version="1.0" encoding="utf-8"?>
-<p:notes xmlns:a="http://schemas.openxmlformats.org/drawingml/2006/main" xmlns:r="http://schemas.openxmlformats.org/officeDocument/2006/relationships" xmlns:p="http://schemas.openxmlformats.org/presentationml/2006/main">
-  <p:cSld>
-    <p:spTree>
-      <p:nvGrpSpPr>
-        <p:cNvPr id="1" name=""/>
-        <p:cNvGrpSpPr/>
-        <p:nvPr/>
-      </p:nvGrpSpPr>
-      <p:grpSpPr>
-        <a:xfrm>
-          <a:off x="0" y="0"/>
-          <a:ext cx="0" cy="0"/>
-          <a:chOff x="0" y="0"/>
-          <a:chExt cx="0" cy="0"/>
-        </a:xfrm>
-      </p:grpSpPr>
-      <p:sp>
-        <p:nvSpPr>
-          <p:cNvPr id="2" name="Slide Image Placeholder 1"/>
-          <p:cNvSpPr>
-            <a:spLocks noGrp="1" noRot="1" noChangeAspect="1"/>
-          </p:cNvSpPr>
-          <p:nvPr>
-            <p:ph type="sldImg"/>
-          </p:nvPr>
-        </p:nvSpPr>
-        <p:spPr/>
-      </p:sp>
-      <p:sp>
-        <p:nvSpPr>
-          <p:cNvPr id="3" name="Notes Placeholder 2"/>
-          <p:cNvSpPr>
-            <a:spLocks noGrp="1"/>
-          </p:cNvSpPr>
-          <p:nvPr>
-            <p:ph type="body" idx="1"/>
-          </p:nvPr>
-        </p:nvSpPr>
-        <p:spPr/>
-        <p:txBody>
-          <a:bodyPr/>
-          <a:lstStyle/>
-          <a:p>
-            <a:endParaRPr lang="en-US" dirty="0"/>
-          </a:p>
-        </p:txBody>
-      </p:sp>
-      <p:sp>
-        <p:nvSpPr>
-          <p:cNvPr id="4" name="Slide Number Placeholder 3"/>
-          <p:cNvSpPr>
-            <a:spLocks noGrp="1"/>
-          </p:cNvSpPr>
-          <p:nvPr>
-            <p:ph type="sldNum" sz="quarter" idx="5"/>
-          </p:nvPr>
-        </p:nvSpPr>
-        <p:spPr/>
-        <p:txBody>
-          <a:bodyPr/>
-          <a:lstStyle/>
-          <a:p>
-            <a:fld id="{501499A2-1326-4FB0-82A2-456B0524BFAF}" type="slidenum">
-              <a:rPr lang="en-US" smtClean="0"/>
-              <a:t>23</a:t>
+              <a:t>20</a:t>
             </a:fld>
             <a:endParaRPr lang="en-US"/>
           </a:p>
@@ -1841,7 +1773,7 @@
           <a:p>
             <a:fld id="{501499A2-1326-4FB0-82A2-456B0524BFAF}" type="slidenum">
               <a:rPr lang="en-US" smtClean="0"/>
-              <a:t>4</a:t>
+              <a:t>3</a:t>
             </a:fld>
             <a:endParaRPr lang="en-US"/>
           </a:p>
@@ -1946,7 +1878,7 @@
           <a:p>
             <a:fld id="{501499A2-1326-4FB0-82A2-456B0524BFAF}" type="slidenum">
               <a:rPr lang="en-US" smtClean="0"/>
-              <a:t>5</a:t>
+              <a:t>4</a:t>
             </a:fld>
             <a:endParaRPr lang="en-US"/>
           </a:p>
@@ -2042,7 +1974,7 @@
           <a:p>
             <a:fld id="{501499A2-1326-4FB0-82A2-456B0524BFAF}" type="slidenum">
               <a:rPr lang="en-US" smtClean="0"/>
-              <a:t>6</a:t>
+              <a:t>5</a:t>
             </a:fld>
             <a:endParaRPr lang="en-US"/>
           </a:p>
@@ -2215,7 +2147,7 @@
           <a:p>
             <a:fld id="{501499A2-1326-4FB0-82A2-456B0524BFAF}" type="slidenum">
               <a:rPr lang="en-US" smtClean="0"/>
-              <a:t>7</a:t>
+              <a:t>6</a:t>
             </a:fld>
             <a:endParaRPr lang="en-US"/>
           </a:p>
@@ -2299,7 +2231,7 @@
           <a:p>
             <a:fld id="{501499A2-1326-4FB0-82A2-456B0524BFAF}" type="slidenum">
               <a:rPr lang="en-US" smtClean="0"/>
-              <a:t>8</a:t>
+              <a:t>7</a:t>
             </a:fld>
             <a:endParaRPr lang="en-US"/>
           </a:p>
@@ -2308,7 +2240,7 @@
     </p:spTree>
     <p:extLst>
       <p:ext uri="{BB962C8B-B14F-4D97-AF65-F5344CB8AC3E}">
-        <p14:creationId xmlns:p14="http://schemas.microsoft.com/office/powerpoint/2010/main" val="2290954208"/>
+        <p14:creationId xmlns:p14="http://schemas.microsoft.com/office/powerpoint/2010/main" val="3108197133"/>
       </p:ext>
     </p:extLst>
   </p:cSld>
@@ -2415,7 +2347,7 @@
           <a:p>
             <a:fld id="{501499A2-1326-4FB0-82A2-456B0524BFAF}" type="slidenum">
               <a:rPr lang="en-US" smtClean="0"/>
-              <a:t>10</a:t>
+              <a:t>8</a:t>
             </a:fld>
             <a:endParaRPr lang="en-US"/>
           </a:p>
@@ -2514,7 +2446,7 @@
           <a:p>
             <a:fld id="{501499A2-1326-4FB0-82A2-456B0524BFAF}" type="slidenum">
               <a:rPr lang="en-US" smtClean="0"/>
-              <a:t>11</a:t>
+              <a:t>9</a:t>
             </a:fld>
             <a:endParaRPr lang="en-US"/>
           </a:p>
@@ -2680,7 +2612,7 @@
           <a:p>
             <a:fld id="{428E7421-5055-4702-868C-964BE14A0920}" type="datetimeFigureOut">
               <a:rPr lang="en-US" smtClean="0"/>
-              <a:t>3/7/2021</a:t>
+              <a:t>3/7/21</a:t>
             </a:fld>
             <a:endParaRPr lang="en-US"/>
           </a:p>
@@ -2878,7 +2810,7 @@
           <a:p>
             <a:fld id="{428E7421-5055-4702-868C-964BE14A0920}" type="datetimeFigureOut">
               <a:rPr lang="en-US" smtClean="0"/>
-              <a:t>3/7/2021</a:t>
+              <a:t>3/7/21</a:t>
             </a:fld>
             <a:endParaRPr lang="en-US"/>
           </a:p>
@@ -3086,7 +3018,7 @@
           <a:p>
             <a:fld id="{428E7421-5055-4702-868C-964BE14A0920}" type="datetimeFigureOut">
               <a:rPr lang="en-US" smtClean="0"/>
-              <a:t>3/7/2021</a:t>
+              <a:t>3/7/21</a:t>
             </a:fld>
             <a:endParaRPr lang="en-US"/>
           </a:p>
@@ -3284,7 +3216,7 @@
           <a:p>
             <a:fld id="{428E7421-5055-4702-868C-964BE14A0920}" type="datetimeFigureOut">
               <a:rPr lang="en-US" smtClean="0"/>
-              <a:t>3/7/2021</a:t>
+              <a:t>3/7/21</a:t>
             </a:fld>
             <a:endParaRPr lang="en-US"/>
           </a:p>
@@ -3559,7 +3491,7 @@
           <a:p>
             <a:fld id="{428E7421-5055-4702-868C-964BE14A0920}" type="datetimeFigureOut">
               <a:rPr lang="en-US" smtClean="0"/>
-              <a:t>3/7/2021</a:t>
+              <a:t>3/7/21</a:t>
             </a:fld>
             <a:endParaRPr lang="en-US"/>
           </a:p>
@@ -3824,7 +3756,7 @@
           <a:p>
             <a:fld id="{428E7421-5055-4702-868C-964BE14A0920}" type="datetimeFigureOut">
               <a:rPr lang="en-US" smtClean="0"/>
-              <a:t>3/7/2021</a:t>
+              <a:t>3/7/21</a:t>
             </a:fld>
             <a:endParaRPr lang="en-US"/>
           </a:p>
@@ -4236,7 +4168,7 @@
           <a:p>
             <a:fld id="{428E7421-5055-4702-868C-964BE14A0920}" type="datetimeFigureOut">
               <a:rPr lang="en-US" smtClean="0"/>
-              <a:t>3/7/2021</a:t>
+              <a:t>3/7/21</a:t>
             </a:fld>
             <a:endParaRPr lang="en-US"/>
           </a:p>
@@ -4377,7 +4309,7 @@
           <a:p>
             <a:fld id="{428E7421-5055-4702-868C-964BE14A0920}" type="datetimeFigureOut">
               <a:rPr lang="en-US" smtClean="0"/>
-              <a:t>3/7/2021</a:t>
+              <a:t>3/7/21</a:t>
             </a:fld>
             <a:endParaRPr lang="en-US"/>
           </a:p>
@@ -4490,7 +4422,7 @@
           <a:p>
             <a:fld id="{428E7421-5055-4702-868C-964BE14A0920}" type="datetimeFigureOut">
               <a:rPr lang="en-US" smtClean="0"/>
-              <a:t>3/7/2021</a:t>
+              <a:t>3/7/21</a:t>
             </a:fld>
             <a:endParaRPr lang="en-US"/>
           </a:p>
@@ -4801,7 +4733,7 @@
           <a:p>
             <a:fld id="{428E7421-5055-4702-868C-964BE14A0920}" type="datetimeFigureOut">
               <a:rPr lang="en-US" smtClean="0"/>
-              <a:t>3/7/2021</a:t>
+              <a:t>3/7/21</a:t>
             </a:fld>
             <a:endParaRPr lang="en-US"/>
           </a:p>
@@ -5089,7 +5021,7 @@
           <a:p>
             <a:fld id="{428E7421-5055-4702-868C-964BE14A0920}" type="datetimeFigureOut">
               <a:rPr lang="en-US" smtClean="0"/>
-              <a:t>3/7/2021</a:t>
+              <a:t>3/7/21</a:t>
             </a:fld>
             <a:endParaRPr lang="en-US"/>
           </a:p>
@@ -5330,7 +5262,7 @@
           <a:p>
             <a:fld id="{428E7421-5055-4702-868C-964BE14A0920}" type="datetimeFigureOut">
               <a:rPr lang="en-US" smtClean="0"/>
-              <a:t>3/7/2021</a:t>
+              <a:t>3/7/21</a:t>
             </a:fld>
             <a:endParaRPr lang="en-US"/>
           </a:p>
@@ -5763,23 +5695,21 @@
             <p:ph type="ctrTitle"/>
           </p:nvPr>
         </p:nvSpPr>
-        <p:spPr/>
+        <p:spPr>
+          <a:xfrm>
+            <a:off x="1524000" y="1927991"/>
+            <a:ext cx="9144000" cy="790986"/>
+          </a:xfrm>
+        </p:spPr>
         <p:txBody>
           <a:bodyPr>
-            <a:normAutofit/>
+            <a:normAutofit fontScale="90000"/>
           </a:bodyPr>
           <a:lstStyle/>
           <a:p>
             <a:r>
               <a:rPr lang="en-US" sz="5400" dirty="0"/>
-              <a:t>Beers and Breweries: ABV vs IBU</a:t>
-            </a:r>
-            <a:br>
-              <a:rPr lang="en-US" sz="5400" dirty="0"/>
-            </a:br>
-            <a:r>
-              <a:rPr lang="en-US" sz="5400" dirty="0"/>
-              <a:t>Initial EDA</a:t>
+              <a:t>Craft Beers and Breweries</a:t>
             </a:r>
           </a:p>
         </p:txBody>
@@ -5800,7 +5730,12 @@
             <p:ph type="subTitle" idx="1"/>
           </p:nvPr>
         </p:nvSpPr>
-        <p:spPr/>
+        <p:spPr>
+          <a:xfrm>
+            <a:off x="1475555" y="2954085"/>
+            <a:ext cx="9144000" cy="1655762"/>
+          </a:xfrm>
+        </p:spPr>
         <p:txBody>
           <a:bodyPr/>
           <a:lstStyle/>
@@ -5853,190 +5788,6 @@
           <p:cNvPr id="2" name="Title 1">
             <a:extLst>
               <a:ext uri="{FF2B5EF4-FFF2-40B4-BE49-F238E27FC236}">
-                <a16:creationId xmlns:a16="http://schemas.microsoft.com/office/drawing/2014/main" id="{33CE4418-39BC-8C41-86AB-4B606F648865}"/>
-              </a:ext>
-            </a:extLst>
-          </p:cNvPr>
-          <p:cNvSpPr>
-            <a:spLocks noGrp="1"/>
-          </p:cNvSpPr>
-          <p:nvPr>
-            <p:ph type="title"/>
-          </p:nvPr>
-        </p:nvSpPr>
-        <p:spPr/>
-        <p:txBody>
-          <a:bodyPr/>
-          <a:lstStyle/>
-          <a:p>
-            <a:r>
-              <a:rPr lang="en-US" dirty="0"/>
-              <a:t>Median ABV by State</a:t>
-            </a:r>
-          </a:p>
-        </p:txBody>
-      </p:sp>
-      <p:pic>
-        <p:nvPicPr>
-          <p:cNvPr id="7" name="Content Placeholder 6" descr="Chart, bar chart&#10;&#10;Description automatically generated">
-            <a:extLst>
-              <a:ext uri="{FF2B5EF4-FFF2-40B4-BE49-F238E27FC236}">
-                <a16:creationId xmlns:a16="http://schemas.microsoft.com/office/drawing/2014/main" id="{F6B83784-9DC2-4902-8DA3-7F07A229F54F}"/>
-              </a:ext>
-            </a:extLst>
-          </p:cNvPr>
-          <p:cNvPicPr>
-            <a:picLocks noGrp="1" noChangeAspect="1"/>
-          </p:cNvPicPr>
-          <p:nvPr>
-            <p:ph idx="1"/>
-          </p:nvPr>
-        </p:nvPicPr>
-        <p:blipFill rotWithShape="1">
-          <a:blip r:embed="rId3">
-            <a:extLst>
-              <a:ext uri="{28A0092B-C50C-407E-A947-70E740481C1C}">
-                <a14:useLocalDpi xmlns:a14="http://schemas.microsoft.com/office/drawing/2010/main" val="0"/>
-              </a:ext>
-            </a:extLst>
-          </a:blip>
-          <a:srcRect t="450" r="186"/>
-          <a:stretch/>
-        </p:blipFill>
-        <p:spPr>
-          <a:xfrm>
-            <a:off x="1397690" y="1498851"/>
-            <a:ext cx="9396620" cy="5232917"/>
-          </a:xfrm>
-        </p:spPr>
-      </p:pic>
-    </p:spTree>
-    <p:extLst>
-      <p:ext uri="{BB962C8B-B14F-4D97-AF65-F5344CB8AC3E}">
-        <p14:creationId xmlns:p14="http://schemas.microsoft.com/office/powerpoint/2010/main" val="382088822"/>
-      </p:ext>
-    </p:extLst>
-  </p:cSld>
-  <p:clrMapOvr>
-    <a:masterClrMapping/>
-  </p:clrMapOvr>
-</p:sld>
-</file>
-
-<file path=ppt/slides/slide11.xml><?xml version="1.0" encoding="utf-8"?>
-<p:sld xmlns:a="http://schemas.openxmlformats.org/drawingml/2006/main" xmlns:r="http://schemas.openxmlformats.org/officeDocument/2006/relationships" xmlns:p="http://schemas.openxmlformats.org/presentationml/2006/main">
-  <p:cSld>
-    <p:spTree>
-      <p:nvGrpSpPr>
-        <p:cNvPr id="1" name=""/>
-        <p:cNvGrpSpPr/>
-        <p:nvPr/>
-      </p:nvGrpSpPr>
-      <p:grpSpPr>
-        <a:xfrm>
-          <a:off x="0" y="0"/>
-          <a:ext cx="0" cy="0"/>
-          <a:chOff x="0" y="0"/>
-          <a:chExt cx="0" cy="0"/>
-        </a:xfrm>
-      </p:grpSpPr>
-      <p:sp>
-        <p:nvSpPr>
-          <p:cNvPr id="2" name="Title 1">
-            <a:extLst>
-              <a:ext uri="{FF2B5EF4-FFF2-40B4-BE49-F238E27FC236}">
-                <a16:creationId xmlns:a16="http://schemas.microsoft.com/office/drawing/2014/main" id="{9E0F04AD-A2D8-0B4E-B07B-494AB3A47290}"/>
-              </a:ext>
-            </a:extLst>
-          </p:cNvPr>
-          <p:cNvSpPr>
-            <a:spLocks noGrp="1"/>
-          </p:cNvSpPr>
-          <p:nvPr>
-            <p:ph type="title"/>
-          </p:nvPr>
-        </p:nvSpPr>
-        <p:spPr/>
-        <p:txBody>
-          <a:bodyPr/>
-          <a:lstStyle/>
-          <a:p>
-            <a:r>
-              <a:rPr lang="en-US" dirty="0"/>
-              <a:t>Median IBU by State</a:t>
-            </a:r>
-          </a:p>
-        </p:txBody>
-      </p:sp>
-      <p:pic>
-        <p:nvPicPr>
-          <p:cNvPr id="7" name="Content Placeholder 6" descr="Chart, histogram&#10;&#10;Description automatically generated">
-            <a:extLst>
-              <a:ext uri="{FF2B5EF4-FFF2-40B4-BE49-F238E27FC236}">
-                <a16:creationId xmlns:a16="http://schemas.microsoft.com/office/drawing/2014/main" id="{2A93BF9F-E082-4A82-8FD6-BC0C76BC82A0}"/>
-              </a:ext>
-            </a:extLst>
-          </p:cNvPr>
-          <p:cNvPicPr>
-            <a:picLocks noGrp="1" noChangeAspect="1"/>
-          </p:cNvPicPr>
-          <p:nvPr>
-            <p:ph idx="1"/>
-          </p:nvPr>
-        </p:nvPicPr>
-        <p:blipFill rotWithShape="1">
-          <a:blip r:embed="rId3">
-            <a:extLst>
-              <a:ext uri="{28A0092B-C50C-407E-A947-70E740481C1C}">
-                <a14:useLocalDpi xmlns:a14="http://schemas.microsoft.com/office/drawing/2010/main" val="0"/>
-              </a:ext>
-            </a:extLst>
-          </a:blip>
-          <a:srcRect t="598"/>
-          <a:stretch/>
-        </p:blipFill>
-        <p:spPr>
-          <a:xfrm>
-            <a:off x="1386840" y="1394459"/>
-            <a:ext cx="9418320" cy="5228699"/>
-          </a:xfrm>
-        </p:spPr>
-      </p:pic>
-    </p:spTree>
-    <p:extLst>
-      <p:ext uri="{BB962C8B-B14F-4D97-AF65-F5344CB8AC3E}">
-        <p14:creationId xmlns:p14="http://schemas.microsoft.com/office/powerpoint/2010/main" val="350394267"/>
-      </p:ext>
-    </p:extLst>
-  </p:cSld>
-  <p:clrMapOvr>
-    <a:masterClrMapping/>
-  </p:clrMapOvr>
-</p:sld>
-</file>
-
-<file path=ppt/slides/slide12.xml><?xml version="1.0" encoding="utf-8"?>
-<p:sld xmlns:a="http://schemas.openxmlformats.org/drawingml/2006/main" xmlns:r="http://schemas.openxmlformats.org/officeDocument/2006/relationships" xmlns:p="http://schemas.openxmlformats.org/presentationml/2006/main">
-  <p:cSld>
-    <p:spTree>
-      <p:nvGrpSpPr>
-        <p:cNvPr id="1" name=""/>
-        <p:cNvGrpSpPr/>
-        <p:nvPr/>
-      </p:nvGrpSpPr>
-      <p:grpSpPr>
-        <a:xfrm>
-          <a:off x="0" y="0"/>
-          <a:ext cx="0" cy="0"/>
-          <a:chOff x="0" y="0"/>
-          <a:chExt cx="0" cy="0"/>
-        </a:xfrm>
-      </p:grpSpPr>
-      <p:sp>
-        <p:nvSpPr>
-          <p:cNvPr id="2" name="Title 1">
-            <a:extLst>
-              <a:ext uri="{FF2B5EF4-FFF2-40B4-BE49-F238E27FC236}">
                 <a16:creationId xmlns:a16="http://schemas.microsoft.com/office/drawing/2014/main" id="{B6D01AB8-B1B3-4F8E-9FD6-A2EBA7EA7354}"/>
               </a:ext>
             </a:extLst>
@@ -6083,13 +5834,13 @@
           <a:p>
             <a:r>
               <a:rPr lang="en-US" dirty="0"/>
-              <a:t>Colorado has the max ABV at 0.128. </a:t>
+              <a:t>Colorado has the max ABV at 12.8%</a:t>
             </a:r>
           </a:p>
           <a:p>
             <a:r>
               <a:rPr lang="en-US" dirty="0"/>
-              <a:t>Oregon has the most IBU at 138. </a:t>
+              <a:t>Oregon has the highest IBU at 138. </a:t>
             </a:r>
           </a:p>
         </p:txBody>
@@ -6107,7 +5858,7 @@
 </p:sld>
 </file>
 
-<file path=ppt/slides/slide13.xml><?xml version="1.0" encoding="utf-8"?>
+<file path=ppt/slides/slide11.xml><?xml version="1.0" encoding="utf-8"?>
 <p:sld xmlns:a="http://schemas.openxmlformats.org/drawingml/2006/main" xmlns:r="http://schemas.openxmlformats.org/officeDocument/2006/relationships" xmlns:p="http://schemas.openxmlformats.org/presentationml/2006/main">
   <p:cSld>
     <p:spTree>
@@ -6202,7 +5953,7 @@
 </p:sld>
 </file>
 
-<file path=ppt/slides/slide14.xml><?xml version="1.0" encoding="utf-8"?>
+<file path=ppt/slides/slide12.xml><?xml version="1.0" encoding="utf-8"?>
 <p:sld xmlns:a="http://schemas.openxmlformats.org/drawingml/2006/main" xmlns:r="http://schemas.openxmlformats.org/officeDocument/2006/relationships" xmlns:p="http://schemas.openxmlformats.org/presentationml/2006/main">
   <p:cSld>
     <p:spTree>
@@ -6295,7 +6046,7 @@
 </p:sld>
 </file>
 
-<file path=ppt/slides/slide15.xml><?xml version="1.0" encoding="utf-8"?>
+<file path=ppt/slides/slide13.xml><?xml version="1.0" encoding="utf-8"?>
 <p:sld xmlns:a="http://schemas.openxmlformats.org/drawingml/2006/main" xmlns:r="http://schemas.openxmlformats.org/officeDocument/2006/relationships" xmlns:p="http://schemas.openxmlformats.org/presentationml/2006/main">
   <p:cSld>
     <p:spTree>
@@ -6382,97 +6133,7 @@
 </p:sld>
 </file>
 
-<file path=ppt/slides/slide16.xml><?xml version="1.0" encoding="utf-8"?>
-<p:sld xmlns:a="http://schemas.openxmlformats.org/drawingml/2006/main" xmlns:r="http://schemas.openxmlformats.org/officeDocument/2006/relationships" xmlns:p="http://schemas.openxmlformats.org/presentationml/2006/main">
-  <p:cSld>
-    <p:spTree>
-      <p:nvGrpSpPr>
-        <p:cNvPr id="1" name=""/>
-        <p:cNvGrpSpPr/>
-        <p:nvPr/>
-      </p:nvGrpSpPr>
-      <p:grpSpPr>
-        <a:xfrm>
-          <a:off x="0" y="0"/>
-          <a:ext cx="0" cy="0"/>
-          <a:chOff x="0" y="0"/>
-          <a:chExt cx="0" cy="0"/>
-        </a:xfrm>
-      </p:grpSpPr>
-      <p:sp>
-        <p:nvSpPr>
-          <p:cNvPr id="2" name="Title 1">
-            <a:extLst>
-              <a:ext uri="{FF2B5EF4-FFF2-40B4-BE49-F238E27FC236}">
-                <a16:creationId xmlns:a16="http://schemas.microsoft.com/office/drawing/2014/main" id="{8CD8555A-4C37-4C1F-AD36-CBE650EE6107}"/>
-              </a:ext>
-            </a:extLst>
-          </p:cNvPr>
-          <p:cNvSpPr>
-            <a:spLocks noGrp="1"/>
-          </p:cNvSpPr>
-          <p:nvPr>
-            <p:ph type="title"/>
-          </p:nvPr>
-        </p:nvSpPr>
-        <p:spPr/>
-        <p:txBody>
-          <a:bodyPr/>
-          <a:lstStyle/>
-          <a:p>
-            <a:r>
-              <a:rPr lang="en-US" dirty="0"/>
-              <a:t>ABV vs IBU Relationship</a:t>
-            </a:r>
-          </a:p>
-        </p:txBody>
-      </p:sp>
-      <p:pic>
-        <p:nvPicPr>
-          <p:cNvPr id="4" name="Content Placeholder 3">
-            <a:extLst>
-              <a:ext uri="{FF2B5EF4-FFF2-40B4-BE49-F238E27FC236}">
-                <a16:creationId xmlns:a16="http://schemas.microsoft.com/office/drawing/2014/main" id="{F62AADDC-3545-3A4F-865F-ECACDB169A9D}"/>
-              </a:ext>
-            </a:extLst>
-          </p:cNvPr>
-          <p:cNvPicPr>
-            <a:picLocks noGrp="1" noChangeAspect="1"/>
-          </p:cNvPicPr>
-          <p:nvPr>
-            <p:ph idx="1"/>
-          </p:nvPr>
-        </p:nvPicPr>
-        <p:blipFill>
-          <a:blip r:embed="rId3"/>
-          <a:stretch>
-            <a:fillRect/>
-          </a:stretch>
-        </p:blipFill>
-        <p:spPr>
-          <a:xfrm>
-            <a:off x="2191512" y="1262507"/>
-            <a:ext cx="7808976" cy="5230368"/>
-          </a:xfrm>
-          <a:prstGeom prst="rect">
-            <a:avLst/>
-          </a:prstGeom>
-        </p:spPr>
-      </p:pic>
-    </p:spTree>
-    <p:extLst>
-      <p:ext uri="{BB962C8B-B14F-4D97-AF65-F5344CB8AC3E}">
-        <p14:creationId xmlns:p14="http://schemas.microsoft.com/office/powerpoint/2010/main" val="3218705793"/>
-      </p:ext>
-    </p:extLst>
-  </p:cSld>
-  <p:clrMapOvr>
-    <a:masterClrMapping/>
-  </p:clrMapOvr>
-</p:sld>
-</file>
-
-<file path=ppt/slides/slide17.xml><?xml version="1.0" encoding="utf-8"?>
+<file path=ppt/slides/slide14.xml><?xml version="1.0" encoding="utf-8"?>
 <p:sld xmlns:a="http://schemas.openxmlformats.org/drawingml/2006/main" xmlns:r="http://schemas.openxmlformats.org/officeDocument/2006/relationships" xmlns:p="http://schemas.openxmlformats.org/presentationml/2006/main">
   <p:cSld>
     <p:spTree>
@@ -6567,6 +6228,295 @@
 </p:sld>
 </file>
 
+<file path=ppt/slides/slide15.xml><?xml version="1.0" encoding="utf-8"?>
+<p:sld xmlns:a="http://schemas.openxmlformats.org/drawingml/2006/main" xmlns:r="http://schemas.openxmlformats.org/officeDocument/2006/relationships" xmlns:p="http://schemas.openxmlformats.org/presentationml/2006/main">
+  <p:cSld>
+    <p:spTree>
+      <p:nvGrpSpPr>
+        <p:cNvPr id="1" name=""/>
+        <p:cNvGrpSpPr/>
+        <p:nvPr/>
+      </p:nvGrpSpPr>
+      <p:grpSpPr>
+        <a:xfrm>
+          <a:off x="0" y="0"/>
+          <a:ext cx="0" cy="0"/>
+          <a:chOff x="0" y="0"/>
+          <a:chExt cx="0" cy="0"/>
+        </a:xfrm>
+      </p:grpSpPr>
+      <p:sp>
+        <p:nvSpPr>
+          <p:cNvPr id="2" name="Title 1">
+            <a:extLst>
+              <a:ext uri="{FF2B5EF4-FFF2-40B4-BE49-F238E27FC236}">
+                <a16:creationId xmlns:a16="http://schemas.microsoft.com/office/drawing/2014/main" id="{F0903F04-E8E9-4816-8035-DDC55DE2ABCC}"/>
+              </a:ext>
+            </a:extLst>
+          </p:cNvPr>
+          <p:cNvSpPr>
+            <a:spLocks noGrp="1"/>
+          </p:cNvSpPr>
+          <p:nvPr>
+            <p:ph type="title"/>
+          </p:nvPr>
+        </p:nvSpPr>
+        <p:spPr/>
+        <p:txBody>
+          <a:bodyPr/>
+          <a:lstStyle/>
+          <a:p>
+            <a:r>
+              <a:rPr lang="en-US" dirty="0"/>
+              <a:t>What about IPA’s vs Other Ales?</a:t>
+            </a:r>
+          </a:p>
+        </p:txBody>
+      </p:sp>
+      <p:pic>
+        <p:nvPicPr>
+          <p:cNvPr id="9" name="Content Placeholder 8">
+            <a:extLst>
+              <a:ext uri="{FF2B5EF4-FFF2-40B4-BE49-F238E27FC236}">
+                <a16:creationId xmlns:a16="http://schemas.microsoft.com/office/drawing/2014/main" id="{8E12D92B-FFC3-4D74-B906-840BDA75A5DC}"/>
+              </a:ext>
+            </a:extLst>
+          </p:cNvPr>
+          <p:cNvPicPr>
+            <a:picLocks noGrp="1" noChangeAspect="1"/>
+          </p:cNvPicPr>
+          <p:nvPr>
+            <p:ph idx="1"/>
+          </p:nvPr>
+        </p:nvPicPr>
+        <p:blipFill>
+          <a:blip r:embed="rId3">
+            <a:extLst>
+              <a:ext uri="{28A0092B-C50C-407E-A947-70E740481C1C}">
+                <a14:useLocalDpi xmlns:a14="http://schemas.microsoft.com/office/drawing/2010/main" val="0"/>
+              </a:ext>
+            </a:extLst>
+          </a:blip>
+          <a:srcRect/>
+          <a:stretch/>
+        </p:blipFill>
+        <p:spPr>
+          <a:xfrm>
+            <a:off x="1127150" y="1387741"/>
+            <a:ext cx="9937699" cy="5214595"/>
+          </a:xfrm>
+        </p:spPr>
+      </p:pic>
+    </p:spTree>
+    <p:extLst>
+      <p:ext uri="{BB962C8B-B14F-4D97-AF65-F5344CB8AC3E}">
+        <p14:creationId xmlns:p14="http://schemas.microsoft.com/office/powerpoint/2010/main" val="3688509213"/>
+      </p:ext>
+    </p:extLst>
+  </p:cSld>
+  <p:clrMapOvr>
+    <a:masterClrMapping/>
+  </p:clrMapOvr>
+</p:sld>
+</file>
+
+<file path=ppt/slides/slide16.xml><?xml version="1.0" encoding="utf-8"?>
+<p:sld xmlns:a="http://schemas.openxmlformats.org/drawingml/2006/main" xmlns:r="http://schemas.openxmlformats.org/officeDocument/2006/relationships" xmlns:p="http://schemas.openxmlformats.org/presentationml/2006/main">
+  <p:cSld>
+    <p:spTree>
+      <p:nvGrpSpPr>
+        <p:cNvPr id="1" name=""/>
+        <p:cNvGrpSpPr/>
+        <p:nvPr/>
+      </p:nvGrpSpPr>
+      <p:grpSpPr>
+        <a:xfrm>
+          <a:off x="0" y="0"/>
+          <a:ext cx="0" cy="0"/>
+          <a:chOff x="0" y="0"/>
+          <a:chExt cx="0" cy="0"/>
+        </a:xfrm>
+      </p:grpSpPr>
+      <p:sp>
+        <p:nvSpPr>
+          <p:cNvPr id="2" name="Title 1">
+            <a:extLst>
+              <a:ext uri="{FF2B5EF4-FFF2-40B4-BE49-F238E27FC236}">
+                <a16:creationId xmlns:a16="http://schemas.microsoft.com/office/drawing/2014/main" id="{F0903F04-E8E9-4816-8035-DDC55DE2ABCC}"/>
+              </a:ext>
+            </a:extLst>
+          </p:cNvPr>
+          <p:cNvSpPr>
+            <a:spLocks noGrp="1"/>
+          </p:cNvSpPr>
+          <p:nvPr>
+            <p:ph type="title"/>
+          </p:nvPr>
+        </p:nvSpPr>
+        <p:spPr/>
+        <p:txBody>
+          <a:bodyPr/>
+          <a:lstStyle/>
+          <a:p>
+            <a:r>
+              <a:rPr lang="en-US"/>
+              <a:t>What about IPA’s vs Other Ales?</a:t>
+            </a:r>
+            <a:endParaRPr lang="en-US" dirty="0"/>
+          </a:p>
+        </p:txBody>
+      </p:sp>
+      <p:pic>
+        <p:nvPicPr>
+          <p:cNvPr id="9" name="Content Placeholder 8">
+            <a:extLst>
+              <a:ext uri="{FF2B5EF4-FFF2-40B4-BE49-F238E27FC236}">
+                <a16:creationId xmlns:a16="http://schemas.microsoft.com/office/drawing/2014/main" id="{8E12D92B-FFC3-4D74-B906-840BDA75A5DC}"/>
+              </a:ext>
+            </a:extLst>
+          </p:cNvPr>
+          <p:cNvPicPr>
+            <a:picLocks noGrp="1" noChangeAspect="1"/>
+          </p:cNvPicPr>
+          <p:nvPr>
+            <p:ph idx="1"/>
+          </p:nvPr>
+        </p:nvPicPr>
+        <p:blipFill rotWithShape="1">
+          <a:blip r:embed="rId3">
+            <a:extLst>
+              <a:ext uri="{28A0092B-C50C-407E-A947-70E740481C1C}">
+                <a14:useLocalDpi xmlns:a14="http://schemas.microsoft.com/office/drawing/2010/main" val="0"/>
+              </a:ext>
+            </a:extLst>
+          </a:blip>
+          <a:srcRect l="466" t="580" b="-1"/>
+          <a:stretch/>
+        </p:blipFill>
+        <p:spPr>
+          <a:xfrm>
+            <a:off x="1137767" y="1396968"/>
+            <a:ext cx="9916466" cy="5230368"/>
+          </a:xfrm>
+        </p:spPr>
+      </p:pic>
+    </p:spTree>
+    <p:extLst>
+      <p:ext uri="{BB962C8B-B14F-4D97-AF65-F5344CB8AC3E}">
+        <p14:creationId xmlns:p14="http://schemas.microsoft.com/office/powerpoint/2010/main" val="1966048146"/>
+      </p:ext>
+    </p:extLst>
+  </p:cSld>
+  <p:clrMapOvr>
+    <a:masterClrMapping/>
+  </p:clrMapOvr>
+</p:sld>
+</file>
+
+<file path=ppt/slides/slide17.xml><?xml version="1.0" encoding="utf-8"?>
+<p:sld xmlns:a="http://schemas.openxmlformats.org/drawingml/2006/main" xmlns:r="http://schemas.openxmlformats.org/officeDocument/2006/relationships" xmlns:p="http://schemas.openxmlformats.org/presentationml/2006/main">
+  <p:cSld>
+    <p:spTree>
+      <p:nvGrpSpPr>
+        <p:cNvPr id="1" name=""/>
+        <p:cNvGrpSpPr/>
+        <p:nvPr/>
+      </p:nvGrpSpPr>
+      <p:grpSpPr>
+        <a:xfrm>
+          <a:off x="0" y="0"/>
+          <a:ext cx="0" cy="0"/>
+          <a:chOff x="0" y="0"/>
+          <a:chExt cx="0" cy="0"/>
+        </a:xfrm>
+      </p:grpSpPr>
+      <p:sp>
+        <p:nvSpPr>
+          <p:cNvPr id="2" name="Title 1">
+            <a:extLst>
+              <a:ext uri="{FF2B5EF4-FFF2-40B4-BE49-F238E27FC236}">
+                <a16:creationId xmlns:a16="http://schemas.microsoft.com/office/drawing/2014/main" id="{E978B4E9-F367-41C8-AAF5-106C6A8C5D51}"/>
+              </a:ext>
+            </a:extLst>
+          </p:cNvPr>
+          <p:cNvSpPr>
+            <a:spLocks noGrp="1"/>
+          </p:cNvSpPr>
+          <p:nvPr>
+            <p:ph type="title"/>
+          </p:nvPr>
+        </p:nvSpPr>
+        <p:spPr/>
+        <p:txBody>
+          <a:bodyPr/>
+          <a:lstStyle/>
+          <a:p>
+            <a:r>
+              <a:rPr lang="en-US" dirty="0"/>
+              <a:t> Classification of ‘IPA’s’ vs ‘Other Ales’</a:t>
+            </a:r>
+          </a:p>
+        </p:txBody>
+      </p:sp>
+      <p:sp>
+        <p:nvSpPr>
+          <p:cNvPr id="3" name="Content Placeholder 2">
+            <a:extLst>
+              <a:ext uri="{FF2B5EF4-FFF2-40B4-BE49-F238E27FC236}">
+                <a16:creationId xmlns:a16="http://schemas.microsoft.com/office/drawing/2014/main" id="{798483FF-C869-42A0-A7E4-F1E130AE890A}"/>
+              </a:ext>
+            </a:extLst>
+          </p:cNvPr>
+          <p:cNvSpPr>
+            <a:spLocks noGrp="1"/>
+          </p:cNvSpPr>
+          <p:nvPr>
+            <p:ph idx="1"/>
+          </p:nvPr>
+        </p:nvSpPr>
+        <p:spPr/>
+        <p:txBody>
+          <a:bodyPr/>
+          <a:lstStyle/>
+          <a:p>
+            <a:r>
+              <a:rPr lang="en-US" dirty="0"/>
+              <a:t>We classified ‘IPA’s’ vs ‘Other Ales’ by IBU and ABV</a:t>
+            </a:r>
+          </a:p>
+          <a:p>
+            <a:r>
+              <a:rPr lang="en-US" dirty="0"/>
+              <a:t>We used a nonparametric model(kNN with k = 6) </a:t>
+            </a:r>
+          </a:p>
+          <a:p>
+            <a:r>
+              <a:rPr lang="en-US" dirty="0"/>
+              <a:t>Classification accuracy was 89% (P-value &lt; 2e-16)</a:t>
+            </a:r>
+          </a:p>
+          <a:p>
+            <a:r>
+              <a:rPr lang="en-US" dirty="0"/>
+              <a:t>We can be 95% confident that the true accuracy for our model is between [0.8537, 0.9355]</a:t>
+            </a:r>
+          </a:p>
+        </p:txBody>
+      </p:sp>
+    </p:spTree>
+    <p:extLst>
+      <p:ext uri="{BB962C8B-B14F-4D97-AF65-F5344CB8AC3E}">
+        <p14:creationId xmlns:p14="http://schemas.microsoft.com/office/powerpoint/2010/main" val="2322191418"/>
+      </p:ext>
+    </p:extLst>
+  </p:cSld>
+  <p:clrMapOvr>
+    <a:masterClrMapping/>
+  </p:clrMapOvr>
+</p:sld>
+</file>
+
 <file path=ppt/slides/slide18.xml><?xml version="1.0" encoding="utf-8"?>
 <p:sld xmlns:a="http://schemas.openxmlformats.org/drawingml/2006/main" xmlns:r="http://schemas.openxmlformats.org/officeDocument/2006/relationships" xmlns:p="http://schemas.openxmlformats.org/presentationml/2006/main">
   <p:cSld>
@@ -6584,40 +6534,12 @@
           <a:chExt cx="0" cy="0"/>
         </a:xfrm>
       </p:grpSpPr>
-      <p:sp>
-        <p:nvSpPr>
-          <p:cNvPr id="2" name="Title 1">
-            <a:extLst>
-              <a:ext uri="{FF2B5EF4-FFF2-40B4-BE49-F238E27FC236}">
-                <a16:creationId xmlns:a16="http://schemas.microsoft.com/office/drawing/2014/main" id="{F0903F04-E8E9-4816-8035-DDC55DE2ABCC}"/>
-              </a:ext>
-            </a:extLst>
-          </p:cNvPr>
-          <p:cNvSpPr>
-            <a:spLocks noGrp="1"/>
-          </p:cNvSpPr>
-          <p:nvPr>
-            <p:ph type="title"/>
-          </p:nvPr>
-        </p:nvSpPr>
-        <p:spPr/>
-        <p:txBody>
-          <a:bodyPr/>
-          <a:lstStyle/>
-          <a:p>
-            <a:r>
-              <a:rPr lang="en-US" dirty="0"/>
-              <a:t>What about IPA’s vs Other Ales?</a:t>
-            </a:r>
-          </a:p>
-        </p:txBody>
-      </p:sp>
       <p:pic>
         <p:nvPicPr>
-          <p:cNvPr id="9" name="Content Placeholder 8">
-            <a:extLst>
-              <a:ext uri="{FF2B5EF4-FFF2-40B4-BE49-F238E27FC236}">
-                <a16:creationId xmlns:a16="http://schemas.microsoft.com/office/drawing/2014/main" id="{8E12D92B-FFC3-4D74-B906-840BDA75A5DC}"/>
+          <p:cNvPr id="5" name="Content Placeholder 4" descr="Calendar&#10;&#10;Description automatically generated">
+            <a:extLst>
+              <a:ext uri="{FF2B5EF4-FFF2-40B4-BE49-F238E27FC236}">
+                <a16:creationId xmlns:a16="http://schemas.microsoft.com/office/drawing/2014/main" id="{53AD954E-8689-499A-80B0-A8D6CBF632D8}"/>
               </a:ext>
             </a:extLst>
           </p:cNvPr>
@@ -6628,7 +6550,7 @@
             <p:ph idx="1"/>
           </p:nvPr>
         </p:nvPicPr>
-        <p:blipFill>
+        <p:blipFill rotWithShape="1">
           <a:blip r:embed="rId3">
             <a:extLst>
               <a:ext uri="{28A0092B-C50C-407E-A947-70E740481C1C}">
@@ -6636,20 +6558,20 @@
               </a:ext>
             </a:extLst>
           </a:blip>
-          <a:srcRect/>
+          <a:srcRect r="829" b="486"/>
           <a:stretch/>
         </p:blipFill>
         <p:spPr>
           <a:xfrm>
-            <a:off x="1127150" y="1387741"/>
-            <a:ext cx="9937699" cy="5214595"/>
+            <a:off x="725714" y="124942"/>
+            <a:ext cx="10740571" cy="6608116"/>
           </a:xfrm>
         </p:spPr>
       </p:pic>
     </p:spTree>
     <p:extLst>
       <p:ext uri="{BB962C8B-B14F-4D97-AF65-F5344CB8AC3E}">
-        <p14:creationId xmlns:p14="http://schemas.microsoft.com/office/powerpoint/2010/main" val="3688509213"/>
+        <p14:creationId xmlns:p14="http://schemas.microsoft.com/office/powerpoint/2010/main" val="1523408636"/>
       </p:ext>
     </p:extLst>
   </p:cSld>
@@ -6681,7 +6603,7 @@
           <p:cNvPr id="2" name="Title 1">
             <a:extLst>
               <a:ext uri="{FF2B5EF4-FFF2-40B4-BE49-F238E27FC236}">
-                <a16:creationId xmlns:a16="http://schemas.microsoft.com/office/drawing/2014/main" id="{F0903F04-E8E9-4816-8035-DDC55DE2ABCC}"/>
+                <a16:creationId xmlns:a16="http://schemas.microsoft.com/office/drawing/2014/main" id="{E978B4E9-F367-41C8-AAF5-106C6A8C5D51}"/>
               </a:ext>
             </a:extLst>
           </p:cNvPr>
@@ -6698,51 +6620,62 @@
           <a:lstStyle/>
           <a:p>
             <a:r>
-              <a:rPr lang="en-US"/>
-              <a:t>What about IPA’s vs Other Ales?</a:t>
-            </a:r>
-            <a:endParaRPr lang="en-US" dirty="0"/>
-          </a:p>
-        </p:txBody>
-      </p:sp>
-      <p:pic>
-        <p:nvPicPr>
-          <p:cNvPr id="9" name="Content Placeholder 8">
-            <a:extLst>
-              <a:ext uri="{FF2B5EF4-FFF2-40B4-BE49-F238E27FC236}">
-                <a16:creationId xmlns:a16="http://schemas.microsoft.com/office/drawing/2014/main" id="{8E12D92B-FFC3-4D74-B906-840BDA75A5DC}"/>
-              </a:ext>
-            </a:extLst>
-          </p:cNvPr>
-          <p:cNvPicPr>
-            <a:picLocks noGrp="1" noChangeAspect="1"/>
-          </p:cNvPicPr>
+              <a:rPr lang="en-US" dirty="0"/>
+              <a:t> Classification of Ounces vs State</a:t>
+            </a:r>
+          </a:p>
+        </p:txBody>
+      </p:sp>
+      <p:sp>
+        <p:nvSpPr>
+          <p:cNvPr id="3" name="Content Placeholder 2">
+            <a:extLst>
+              <a:ext uri="{FF2B5EF4-FFF2-40B4-BE49-F238E27FC236}">
+                <a16:creationId xmlns:a16="http://schemas.microsoft.com/office/drawing/2014/main" id="{798483FF-C869-42A0-A7E4-F1E130AE890A}"/>
+              </a:ext>
+            </a:extLst>
+          </p:cNvPr>
+          <p:cNvSpPr>
+            <a:spLocks noGrp="1"/>
+          </p:cNvSpPr>
           <p:nvPr>
             <p:ph idx="1"/>
           </p:nvPr>
-        </p:nvPicPr>
-        <p:blipFill rotWithShape="1">
-          <a:blip r:embed="rId3">
-            <a:extLst>
-              <a:ext uri="{28A0092B-C50C-407E-A947-70E740481C1C}">
-                <a14:useLocalDpi xmlns:a14="http://schemas.microsoft.com/office/drawing/2010/main" val="0"/>
-              </a:ext>
-            </a:extLst>
-          </a:blip>
-          <a:srcRect l="466" t="580" b="-1"/>
-          <a:stretch/>
-        </p:blipFill>
-        <p:spPr>
-          <a:xfrm>
-            <a:off x="1137767" y="1396968"/>
-            <a:ext cx="9916466" cy="5230368"/>
-          </a:xfrm>
-        </p:spPr>
-      </p:pic>
+        </p:nvSpPr>
+        <p:spPr/>
+        <p:txBody>
+          <a:bodyPr/>
+          <a:lstStyle/>
+          <a:p>
+            <a:r>
+              <a:rPr lang="en-US" dirty="0"/>
+              <a:t>We classified Ounces vs State by IBU and ABV</a:t>
+            </a:r>
+          </a:p>
+          <a:p>
+            <a:r>
+              <a:rPr lang="en-US" dirty="0"/>
+              <a:t>We used a nonparametric model(kNN with k = 8) </a:t>
+            </a:r>
+          </a:p>
+          <a:p>
+            <a:r>
+              <a:rPr lang="en-US" dirty="0"/>
+              <a:t>Classification accuracy was 71.4 % (P-value &lt; 2e-16)</a:t>
+            </a:r>
+          </a:p>
+          <a:p>
+            <a:r>
+              <a:rPr lang="en-US" dirty="0"/>
+              <a:t>We can be 95% confident that the true accuracy for our model is between [0.8537, 0.9355]</a:t>
+            </a:r>
+          </a:p>
+        </p:txBody>
+      </p:sp>
     </p:spTree>
     <p:extLst>
       <p:ext uri="{BB962C8B-B14F-4D97-AF65-F5344CB8AC3E}">
-        <p14:creationId xmlns:p14="http://schemas.microsoft.com/office/powerpoint/2010/main" val="1966048146"/>
+        <p14:creationId xmlns:p14="http://schemas.microsoft.com/office/powerpoint/2010/main" val="3628741535"/>
       </p:ext>
     </p:extLst>
   </p:cSld>
@@ -6774,7 +6707,7 @@
           <p:cNvPr id="2" name="Title 1">
             <a:extLst>
               <a:ext uri="{FF2B5EF4-FFF2-40B4-BE49-F238E27FC236}">
-                <a16:creationId xmlns:a16="http://schemas.microsoft.com/office/drawing/2014/main" id="{4019EFAB-8699-47C0-9B42-3F7B7C471E55}"/>
+                <a16:creationId xmlns:a16="http://schemas.microsoft.com/office/drawing/2014/main" id="{5166DBBF-CE0E-9E44-8A5C-983D4C8FB6F1}"/>
               </a:ext>
             </a:extLst>
           </p:cNvPr>
@@ -6792,7 +6725,7 @@
           <a:p>
             <a:r>
               <a:rPr lang="en-US" dirty="0"/>
-              <a:t>Overview</a:t>
+              <a:t>Question of Interest: </a:t>
             </a:r>
           </a:p>
         </p:txBody>
@@ -6802,7 +6735,7 @@
           <p:cNvPr id="3" name="Content Placeholder 2">
             <a:extLst>
               <a:ext uri="{FF2B5EF4-FFF2-40B4-BE49-F238E27FC236}">
-                <a16:creationId xmlns:a16="http://schemas.microsoft.com/office/drawing/2014/main" id="{38228657-15A0-4693-BC46-BA34EC8CCF28}"/>
+                <a16:creationId xmlns:a16="http://schemas.microsoft.com/office/drawing/2014/main" id="{4755110A-933B-0849-991E-597F4B71B22D}"/>
               </a:ext>
             </a:extLst>
           </p:cNvPr>
@@ -6815,67 +6748,20 @@
         </p:nvSpPr>
         <p:spPr/>
         <p:txBody>
-          <a:bodyPr>
-            <a:normAutofit/>
-          </a:bodyPr>
+          <a:bodyPr/>
           <a:lstStyle/>
           <a:p>
             <a:r>
               <a:rPr lang="en-US" dirty="0"/>
-              <a:t>QOI</a:t>
-            </a:r>
-          </a:p>
-          <a:p>
-            <a:r>
-              <a:rPr lang="en-US" dirty="0"/>
-              <a:t>The Dataset</a:t>
-            </a:r>
-          </a:p>
-          <a:p>
-            <a:r>
-              <a:rPr lang="en-US" dirty="0"/>
-              <a:t>Number of Breweries in each state</a:t>
-            </a:r>
-          </a:p>
-          <a:p>
-            <a:r>
-              <a:rPr lang="en-US" dirty="0"/>
-              <a:t>Missing Values</a:t>
-            </a:r>
-          </a:p>
-          <a:p>
-            <a:r>
-              <a:rPr lang="en-US" dirty="0"/>
-              <a:t>Median ABV vs Median IBU</a:t>
-            </a:r>
-          </a:p>
-          <a:p>
-            <a:r>
-              <a:rPr lang="en-US" dirty="0"/>
-              <a:t>Max ABV/IBU</a:t>
-            </a:r>
-          </a:p>
-          <a:p>
-            <a:r>
-              <a:rPr lang="en-US" dirty="0"/>
-              <a:t>Summary Statistics for ABV</a:t>
-            </a:r>
-          </a:p>
-          <a:p>
-            <a:r>
-              <a:rPr lang="en-US" dirty="0"/>
-              <a:t>ABV vs IBU</a:t>
-            </a:r>
-          </a:p>
-          <a:p>
-            <a:endParaRPr lang="en-US" dirty="0"/>
+              <a:t>Assess relationships for craft beers across the united states</a:t>
+            </a:r>
           </a:p>
         </p:txBody>
       </p:sp>
     </p:spTree>
     <p:extLst>
       <p:ext uri="{BB962C8B-B14F-4D97-AF65-F5344CB8AC3E}">
-        <p14:creationId xmlns:p14="http://schemas.microsoft.com/office/powerpoint/2010/main" val="1698365165"/>
+        <p14:creationId xmlns:p14="http://schemas.microsoft.com/office/powerpoint/2010/main" val="2373452981"/>
       </p:ext>
     </p:extLst>
   </p:cSld>
@@ -6886,278 +6772,6 @@
 </file>
 
 <file path=ppt/slides/slide20.xml><?xml version="1.0" encoding="utf-8"?>
-<p:sld xmlns:a="http://schemas.openxmlformats.org/drawingml/2006/main" xmlns:r="http://schemas.openxmlformats.org/officeDocument/2006/relationships" xmlns:p="http://schemas.openxmlformats.org/presentationml/2006/main">
-  <p:cSld>
-    <p:spTree>
-      <p:nvGrpSpPr>
-        <p:cNvPr id="1" name=""/>
-        <p:cNvGrpSpPr/>
-        <p:nvPr/>
-      </p:nvGrpSpPr>
-      <p:grpSpPr>
-        <a:xfrm>
-          <a:off x="0" y="0"/>
-          <a:ext cx="0" cy="0"/>
-          <a:chOff x="0" y="0"/>
-          <a:chExt cx="0" cy="0"/>
-        </a:xfrm>
-      </p:grpSpPr>
-      <p:sp>
-        <p:nvSpPr>
-          <p:cNvPr id="2" name="Title 1">
-            <a:extLst>
-              <a:ext uri="{FF2B5EF4-FFF2-40B4-BE49-F238E27FC236}">
-                <a16:creationId xmlns:a16="http://schemas.microsoft.com/office/drawing/2014/main" id="{E978B4E9-F367-41C8-AAF5-106C6A8C5D51}"/>
-              </a:ext>
-            </a:extLst>
-          </p:cNvPr>
-          <p:cNvSpPr>
-            <a:spLocks noGrp="1"/>
-          </p:cNvSpPr>
-          <p:nvPr>
-            <p:ph type="title"/>
-          </p:nvPr>
-        </p:nvSpPr>
-        <p:spPr/>
-        <p:txBody>
-          <a:bodyPr/>
-          <a:lstStyle/>
-          <a:p>
-            <a:r>
-              <a:rPr lang="en-US" dirty="0"/>
-              <a:t> Classification of ‘IPA’s’ vs ‘Other Ales’</a:t>
-            </a:r>
-          </a:p>
-        </p:txBody>
-      </p:sp>
-      <p:sp>
-        <p:nvSpPr>
-          <p:cNvPr id="3" name="Content Placeholder 2">
-            <a:extLst>
-              <a:ext uri="{FF2B5EF4-FFF2-40B4-BE49-F238E27FC236}">
-                <a16:creationId xmlns:a16="http://schemas.microsoft.com/office/drawing/2014/main" id="{798483FF-C869-42A0-A7E4-F1E130AE890A}"/>
-              </a:ext>
-            </a:extLst>
-          </p:cNvPr>
-          <p:cNvSpPr>
-            <a:spLocks noGrp="1"/>
-          </p:cNvSpPr>
-          <p:nvPr>
-            <p:ph idx="1"/>
-          </p:nvPr>
-        </p:nvSpPr>
-        <p:spPr/>
-        <p:txBody>
-          <a:bodyPr/>
-          <a:lstStyle/>
-          <a:p>
-            <a:r>
-              <a:rPr lang="en-US" dirty="0"/>
-              <a:t>We classified ‘IPA’s’ vs ‘Other Ales’ by IBU and ABV</a:t>
-            </a:r>
-          </a:p>
-          <a:p>
-            <a:r>
-              <a:rPr lang="en-US" dirty="0"/>
-              <a:t>We used a nonparametric model(kNN with k = 6) </a:t>
-            </a:r>
-          </a:p>
-          <a:p>
-            <a:r>
-              <a:rPr lang="en-US" dirty="0"/>
-              <a:t>Classification accuracy was 89% (P-value &lt; 2e-16)</a:t>
-            </a:r>
-          </a:p>
-          <a:p>
-            <a:r>
-              <a:rPr lang="en-US" dirty="0"/>
-              <a:t>We can be 95% confident that the true accuracy for our model is between [0.8537, 0.9355]</a:t>
-            </a:r>
-          </a:p>
-        </p:txBody>
-      </p:sp>
-    </p:spTree>
-    <p:extLst>
-      <p:ext uri="{BB962C8B-B14F-4D97-AF65-F5344CB8AC3E}">
-        <p14:creationId xmlns:p14="http://schemas.microsoft.com/office/powerpoint/2010/main" val="2322191418"/>
-      </p:ext>
-    </p:extLst>
-  </p:cSld>
-  <p:clrMapOvr>
-    <a:masterClrMapping/>
-  </p:clrMapOvr>
-</p:sld>
-</file>
-
-<file path=ppt/slides/slide21.xml><?xml version="1.0" encoding="utf-8"?>
-<p:sld xmlns:a="http://schemas.openxmlformats.org/drawingml/2006/main" xmlns:r="http://schemas.openxmlformats.org/officeDocument/2006/relationships" xmlns:p="http://schemas.openxmlformats.org/presentationml/2006/main">
-  <p:cSld>
-    <p:spTree>
-      <p:nvGrpSpPr>
-        <p:cNvPr id="1" name=""/>
-        <p:cNvGrpSpPr/>
-        <p:nvPr/>
-      </p:nvGrpSpPr>
-      <p:grpSpPr>
-        <a:xfrm>
-          <a:off x="0" y="0"/>
-          <a:ext cx="0" cy="0"/>
-          <a:chOff x="0" y="0"/>
-          <a:chExt cx="0" cy="0"/>
-        </a:xfrm>
-      </p:grpSpPr>
-      <p:pic>
-        <p:nvPicPr>
-          <p:cNvPr id="5" name="Content Placeholder 4" descr="Calendar&#10;&#10;Description automatically generated">
-            <a:extLst>
-              <a:ext uri="{FF2B5EF4-FFF2-40B4-BE49-F238E27FC236}">
-                <a16:creationId xmlns:a16="http://schemas.microsoft.com/office/drawing/2014/main" id="{53AD954E-8689-499A-80B0-A8D6CBF632D8}"/>
-              </a:ext>
-            </a:extLst>
-          </p:cNvPr>
-          <p:cNvPicPr>
-            <a:picLocks noGrp="1" noChangeAspect="1"/>
-          </p:cNvPicPr>
-          <p:nvPr>
-            <p:ph idx="1"/>
-          </p:nvPr>
-        </p:nvPicPr>
-        <p:blipFill rotWithShape="1">
-          <a:blip r:embed="rId3">
-            <a:extLst>
-              <a:ext uri="{28A0092B-C50C-407E-A947-70E740481C1C}">
-                <a14:useLocalDpi xmlns:a14="http://schemas.microsoft.com/office/drawing/2010/main" val="0"/>
-              </a:ext>
-            </a:extLst>
-          </a:blip>
-          <a:srcRect r="829" b="486"/>
-          <a:stretch/>
-        </p:blipFill>
-        <p:spPr>
-          <a:xfrm>
-            <a:off x="725714" y="124942"/>
-            <a:ext cx="10740571" cy="6608116"/>
-          </a:xfrm>
-        </p:spPr>
-      </p:pic>
-    </p:spTree>
-    <p:extLst>
-      <p:ext uri="{BB962C8B-B14F-4D97-AF65-F5344CB8AC3E}">
-        <p14:creationId xmlns:p14="http://schemas.microsoft.com/office/powerpoint/2010/main" val="1523408636"/>
-      </p:ext>
-    </p:extLst>
-  </p:cSld>
-  <p:clrMapOvr>
-    <a:masterClrMapping/>
-  </p:clrMapOvr>
-</p:sld>
-</file>
-
-<file path=ppt/slides/slide22.xml><?xml version="1.0" encoding="utf-8"?>
-<p:sld xmlns:a="http://schemas.openxmlformats.org/drawingml/2006/main" xmlns:r="http://schemas.openxmlformats.org/officeDocument/2006/relationships" xmlns:p="http://schemas.openxmlformats.org/presentationml/2006/main">
-  <p:cSld>
-    <p:spTree>
-      <p:nvGrpSpPr>
-        <p:cNvPr id="1" name=""/>
-        <p:cNvGrpSpPr/>
-        <p:nvPr/>
-      </p:nvGrpSpPr>
-      <p:grpSpPr>
-        <a:xfrm>
-          <a:off x="0" y="0"/>
-          <a:ext cx="0" cy="0"/>
-          <a:chOff x="0" y="0"/>
-          <a:chExt cx="0" cy="0"/>
-        </a:xfrm>
-      </p:grpSpPr>
-      <p:sp>
-        <p:nvSpPr>
-          <p:cNvPr id="2" name="Title 1">
-            <a:extLst>
-              <a:ext uri="{FF2B5EF4-FFF2-40B4-BE49-F238E27FC236}">
-                <a16:creationId xmlns:a16="http://schemas.microsoft.com/office/drawing/2014/main" id="{E978B4E9-F367-41C8-AAF5-106C6A8C5D51}"/>
-              </a:ext>
-            </a:extLst>
-          </p:cNvPr>
-          <p:cNvSpPr>
-            <a:spLocks noGrp="1"/>
-          </p:cNvSpPr>
-          <p:nvPr>
-            <p:ph type="title"/>
-          </p:nvPr>
-        </p:nvSpPr>
-        <p:spPr/>
-        <p:txBody>
-          <a:bodyPr/>
-          <a:lstStyle/>
-          <a:p>
-            <a:r>
-              <a:rPr lang="en-US" dirty="0"/>
-              <a:t> Classification of Ounces vs State</a:t>
-            </a:r>
-          </a:p>
-        </p:txBody>
-      </p:sp>
-      <p:sp>
-        <p:nvSpPr>
-          <p:cNvPr id="3" name="Content Placeholder 2">
-            <a:extLst>
-              <a:ext uri="{FF2B5EF4-FFF2-40B4-BE49-F238E27FC236}">
-                <a16:creationId xmlns:a16="http://schemas.microsoft.com/office/drawing/2014/main" id="{798483FF-C869-42A0-A7E4-F1E130AE890A}"/>
-              </a:ext>
-            </a:extLst>
-          </p:cNvPr>
-          <p:cNvSpPr>
-            <a:spLocks noGrp="1"/>
-          </p:cNvSpPr>
-          <p:nvPr>
-            <p:ph idx="1"/>
-          </p:nvPr>
-        </p:nvSpPr>
-        <p:spPr/>
-        <p:txBody>
-          <a:bodyPr/>
-          <a:lstStyle/>
-          <a:p>
-            <a:r>
-              <a:rPr lang="en-US" dirty="0"/>
-              <a:t>We classified Ounces vs State by IBU and ABV</a:t>
-            </a:r>
-          </a:p>
-          <a:p>
-            <a:r>
-              <a:rPr lang="en-US" dirty="0"/>
-              <a:t>We used a nonparametric model(kNN with k = 8) </a:t>
-            </a:r>
-          </a:p>
-          <a:p>
-            <a:r>
-              <a:rPr lang="en-US" dirty="0"/>
-              <a:t>Classification accuracy was 71.4 % (P-value &lt; 2e-16)</a:t>
-            </a:r>
-          </a:p>
-          <a:p>
-            <a:r>
-              <a:rPr lang="en-US" dirty="0"/>
-              <a:t>We can be 95% confident that the true accuracy for our model is between [0.8537, 0.9355]</a:t>
-            </a:r>
-          </a:p>
-        </p:txBody>
-      </p:sp>
-    </p:spTree>
-    <p:extLst>
-      <p:ext uri="{BB962C8B-B14F-4D97-AF65-F5344CB8AC3E}">
-        <p14:creationId xmlns:p14="http://schemas.microsoft.com/office/powerpoint/2010/main" val="3628741535"/>
-      </p:ext>
-    </p:extLst>
-  </p:cSld>
-  <p:clrMapOvr>
-    <a:masterClrMapping/>
-  </p:clrMapOvr>
-</p:sld>
-</file>
-
-<file path=ppt/slides/slide23.xml><?xml version="1.0" encoding="utf-8"?>
 <p:sld xmlns:a="http://schemas.openxmlformats.org/drawingml/2006/main" xmlns:r="http://schemas.openxmlformats.org/officeDocument/2006/relationships" xmlns:p="http://schemas.openxmlformats.org/presentationml/2006/main">
   <p:cSld>
     <p:spTree>
@@ -7308,92 +6922,6 @@
           <p:cNvPr id="2" name="Title 1">
             <a:extLst>
               <a:ext uri="{FF2B5EF4-FFF2-40B4-BE49-F238E27FC236}">
-                <a16:creationId xmlns:a16="http://schemas.microsoft.com/office/drawing/2014/main" id="{5166DBBF-CE0E-9E44-8A5C-983D4C8FB6F1}"/>
-              </a:ext>
-            </a:extLst>
-          </p:cNvPr>
-          <p:cNvSpPr>
-            <a:spLocks noGrp="1"/>
-          </p:cNvSpPr>
-          <p:nvPr>
-            <p:ph type="title"/>
-          </p:nvPr>
-        </p:nvSpPr>
-        <p:spPr/>
-        <p:txBody>
-          <a:bodyPr/>
-          <a:lstStyle/>
-          <a:p>
-            <a:r>
-              <a:rPr lang="en-US" dirty="0"/>
-              <a:t>Question of Interest: </a:t>
-            </a:r>
-          </a:p>
-        </p:txBody>
-      </p:sp>
-      <p:sp>
-        <p:nvSpPr>
-          <p:cNvPr id="3" name="Content Placeholder 2">
-            <a:extLst>
-              <a:ext uri="{FF2B5EF4-FFF2-40B4-BE49-F238E27FC236}">
-                <a16:creationId xmlns:a16="http://schemas.microsoft.com/office/drawing/2014/main" id="{4755110A-933B-0849-991E-597F4B71B22D}"/>
-              </a:ext>
-            </a:extLst>
-          </p:cNvPr>
-          <p:cNvSpPr>
-            <a:spLocks noGrp="1"/>
-          </p:cNvSpPr>
-          <p:nvPr>
-            <p:ph idx="1"/>
-          </p:nvPr>
-        </p:nvSpPr>
-        <p:spPr/>
-        <p:txBody>
-          <a:bodyPr/>
-          <a:lstStyle/>
-          <a:p>
-            <a:r>
-              <a:rPr lang="en-US" dirty="0"/>
-              <a:t>Assess the relationship between IBU and ABV for beers across different states</a:t>
-            </a:r>
-          </a:p>
-        </p:txBody>
-      </p:sp>
-    </p:spTree>
-    <p:extLst>
-      <p:ext uri="{BB962C8B-B14F-4D97-AF65-F5344CB8AC3E}">
-        <p14:creationId xmlns:p14="http://schemas.microsoft.com/office/powerpoint/2010/main" val="2373452981"/>
-      </p:ext>
-    </p:extLst>
-  </p:cSld>
-  <p:clrMapOvr>
-    <a:masterClrMapping/>
-  </p:clrMapOvr>
-</p:sld>
-</file>
-
-<file path=ppt/slides/slide4.xml><?xml version="1.0" encoding="utf-8"?>
-<p:sld xmlns:a="http://schemas.openxmlformats.org/drawingml/2006/main" xmlns:r="http://schemas.openxmlformats.org/officeDocument/2006/relationships" xmlns:p="http://schemas.openxmlformats.org/presentationml/2006/main">
-  <p:cSld>
-    <p:spTree>
-      <p:nvGrpSpPr>
-        <p:cNvPr id="1" name=""/>
-        <p:cNvGrpSpPr/>
-        <p:nvPr/>
-      </p:nvGrpSpPr>
-      <p:grpSpPr>
-        <a:xfrm>
-          <a:off x="0" y="0"/>
-          <a:ext cx="0" cy="0"/>
-          <a:chOff x="0" y="0"/>
-          <a:chExt cx="0" cy="0"/>
-        </a:xfrm>
-      </p:grpSpPr>
-      <p:sp>
-        <p:nvSpPr>
-          <p:cNvPr id="2" name="Title 1">
-            <a:extLst>
-              <a:ext uri="{FF2B5EF4-FFF2-40B4-BE49-F238E27FC236}">
                 <a16:creationId xmlns:a16="http://schemas.microsoft.com/office/drawing/2014/main" id="{E73945CD-353B-2040-810E-E752C9A5A012}"/>
               </a:ext>
             </a:extLst>
@@ -7500,7 +7028,7 @@
 </p:sld>
 </file>
 
-<file path=ppt/slides/slide5.xml><?xml version="1.0" encoding="utf-8"?>
+<file path=ppt/slides/slide4.xml><?xml version="1.0" encoding="utf-8"?>
 <p:sld xmlns:a="http://schemas.openxmlformats.org/drawingml/2006/main" xmlns:r="http://schemas.openxmlformats.org/officeDocument/2006/relationships" xmlns:p="http://schemas.openxmlformats.org/presentationml/2006/main">
   <p:cSld>
     <p:spTree>
@@ -7636,7 +7164,7 @@
 </p:sld>
 </file>
 
-<file path=ppt/slides/slide6.xml><?xml version="1.0" encoding="utf-8"?>
+<file path=ppt/slides/slide5.xml><?xml version="1.0" encoding="utf-8"?>
 <p:sld xmlns:a="http://schemas.openxmlformats.org/drawingml/2006/main" xmlns:r="http://schemas.openxmlformats.org/officeDocument/2006/relationships" xmlns:p="http://schemas.openxmlformats.org/presentationml/2006/main">
   <p:cSld>
     <p:spTree>
@@ -7725,6 +7253,104 @@
 </p:sld>
 </file>
 
+<file path=ppt/slides/slide6.xml><?xml version="1.0" encoding="utf-8"?>
+<p:sld xmlns:a="http://schemas.openxmlformats.org/drawingml/2006/main" xmlns:r="http://schemas.openxmlformats.org/officeDocument/2006/relationships" xmlns:p="http://schemas.openxmlformats.org/presentationml/2006/main">
+  <p:cSld>
+    <p:spTree>
+      <p:nvGrpSpPr>
+        <p:cNvPr id="1" name=""/>
+        <p:cNvGrpSpPr/>
+        <p:nvPr/>
+      </p:nvGrpSpPr>
+      <p:grpSpPr>
+        <a:xfrm>
+          <a:off x="0" y="0"/>
+          <a:ext cx="0" cy="0"/>
+          <a:chOff x="0" y="0"/>
+          <a:chExt cx="0" cy="0"/>
+        </a:xfrm>
+      </p:grpSpPr>
+      <p:sp>
+        <p:nvSpPr>
+          <p:cNvPr id="2" name="Title 1">
+            <a:extLst>
+              <a:ext uri="{FF2B5EF4-FFF2-40B4-BE49-F238E27FC236}">
+                <a16:creationId xmlns:a16="http://schemas.microsoft.com/office/drawing/2014/main" id="{505798CA-8928-E940-B7E5-33D3A7E05222}"/>
+              </a:ext>
+            </a:extLst>
+          </p:cNvPr>
+          <p:cNvSpPr>
+            <a:spLocks noGrp="1"/>
+          </p:cNvSpPr>
+          <p:nvPr>
+            <p:ph type="title"/>
+          </p:nvPr>
+        </p:nvSpPr>
+        <p:spPr/>
+        <p:txBody>
+          <a:bodyPr/>
+          <a:lstStyle/>
+          <a:p>
+            <a:r>
+              <a:rPr lang="en-US" dirty="0"/>
+              <a:t>Missing Data: Strategy</a:t>
+            </a:r>
+          </a:p>
+        </p:txBody>
+      </p:sp>
+      <p:sp>
+        <p:nvSpPr>
+          <p:cNvPr id="3" name="Content Placeholder 2">
+            <a:extLst>
+              <a:ext uri="{FF2B5EF4-FFF2-40B4-BE49-F238E27FC236}">
+                <a16:creationId xmlns:a16="http://schemas.microsoft.com/office/drawing/2014/main" id="{14AA9F38-3DD3-0742-BD18-CCCCA0E94C38}"/>
+              </a:ext>
+            </a:extLst>
+          </p:cNvPr>
+          <p:cNvSpPr>
+            <a:spLocks noGrp="1"/>
+          </p:cNvSpPr>
+          <p:nvPr>
+            <p:ph idx="1"/>
+          </p:nvPr>
+        </p:nvSpPr>
+        <p:spPr/>
+        <p:txBody>
+          <a:bodyPr/>
+          <a:lstStyle/>
+          <a:p>
+            <a:r>
+              <a:rPr lang="en-US" dirty="0"/>
+              <a:t>Hand enter all data missing BOTH IBU and ABV</a:t>
+            </a:r>
+          </a:p>
+          <a:p>
+            <a:r>
+              <a:rPr lang="en-US" dirty="0"/>
+              <a:t>Drop entries missing both IBU and ABV with no available data</a:t>
+            </a:r>
+          </a:p>
+          <a:p>
+            <a:r>
+              <a:rPr lang="en-US" dirty="0"/>
+              <a:t>Impute IBU based on Median IBU by style for entries that ONLY lack IBU data. </a:t>
+            </a:r>
+          </a:p>
+        </p:txBody>
+      </p:sp>
+    </p:spTree>
+    <p:extLst>
+      <p:ext uri="{BB962C8B-B14F-4D97-AF65-F5344CB8AC3E}">
+        <p14:creationId xmlns:p14="http://schemas.microsoft.com/office/powerpoint/2010/main" val="2686119804"/>
+      </p:ext>
+    </p:extLst>
+  </p:cSld>
+  <p:clrMapOvr>
+    <a:masterClrMapping/>
+  </p:clrMapOvr>
+</p:sld>
+</file>
+
 <file path=ppt/slides/slide7.xml><?xml version="1.0" encoding="utf-8"?>
 <p:sld xmlns:a="http://schemas.openxmlformats.org/drawingml/2006/main" xmlns:r="http://schemas.openxmlformats.org/officeDocument/2006/relationships" xmlns:p="http://schemas.openxmlformats.org/presentationml/2006/main">
   <p:cSld>
@@ -7747,7 +7373,7 @@
           <p:cNvPr id="2" name="Title 1">
             <a:extLst>
               <a:ext uri="{FF2B5EF4-FFF2-40B4-BE49-F238E27FC236}">
-                <a16:creationId xmlns:a16="http://schemas.microsoft.com/office/drawing/2014/main" id="{505798CA-8928-E940-B7E5-33D3A7E05222}"/>
+                <a16:creationId xmlns:a16="http://schemas.microsoft.com/office/drawing/2014/main" id="{97E01514-23C4-BB46-82C6-B8B4857D3625}"/>
               </a:ext>
             </a:extLst>
           </p:cNvPr>
@@ -7765,47 +7391,181 @@
           <a:p>
             <a:r>
               <a:rPr lang="en-US" dirty="0"/>
-              <a:t>Missing Data: Strategy</a:t>
-            </a:r>
-          </a:p>
-        </p:txBody>
-      </p:sp>
-      <p:sp>
-        <p:nvSpPr>
-          <p:cNvPr id="3" name="Content Placeholder 2">
-            <a:extLst>
-              <a:ext uri="{FF2B5EF4-FFF2-40B4-BE49-F238E27FC236}">
-                <a16:creationId xmlns:a16="http://schemas.microsoft.com/office/drawing/2014/main" id="{14AA9F38-3DD3-0742-BD18-CCCCA0E94C38}"/>
-              </a:ext>
-            </a:extLst>
-          </p:cNvPr>
-          <p:cNvSpPr>
-            <a:spLocks noGrp="1"/>
-          </p:cNvSpPr>
+              <a:t>Missing Data: IBU Imputation </a:t>
+            </a:r>
+          </a:p>
+        </p:txBody>
+      </p:sp>
+      <p:pic>
+        <p:nvPicPr>
+          <p:cNvPr id="4" name="Content Placeholder 3">
+            <a:extLst>
+              <a:ext uri="{FF2B5EF4-FFF2-40B4-BE49-F238E27FC236}">
+                <a16:creationId xmlns:a16="http://schemas.microsoft.com/office/drawing/2014/main" id="{6CE8CEF7-59D6-9B43-A414-FF6B13FF099A}"/>
+              </a:ext>
+            </a:extLst>
+          </p:cNvPr>
+          <p:cNvPicPr>
+            <a:picLocks noGrp="1" noChangeAspect="1"/>
+          </p:cNvPicPr>
           <p:nvPr>
             <p:ph idx="1"/>
           </p:nvPr>
-        </p:nvSpPr>
-        <p:spPr/>
-        <p:txBody>
-          <a:bodyPr/>
+        </p:nvPicPr>
+        <p:blipFill>
+          <a:blip r:embed="rId3"/>
+          <a:stretch>
+            <a:fillRect/>
+          </a:stretch>
+        </p:blipFill>
+        <p:spPr>
+          <a:xfrm>
+            <a:off x="4449721" y="4506760"/>
+            <a:ext cx="4983948" cy="1986115"/>
+          </a:xfrm>
+          <a:prstGeom prst="rect">
+            <a:avLst/>
+          </a:prstGeom>
+        </p:spPr>
+      </p:pic>
+      <p:pic>
+        <p:nvPicPr>
+          <p:cNvPr id="5" name="Picture 4">
+            <a:extLst>
+              <a:ext uri="{FF2B5EF4-FFF2-40B4-BE49-F238E27FC236}">
+                <a16:creationId xmlns:a16="http://schemas.microsoft.com/office/drawing/2014/main" id="{2C4381EC-D1A5-B440-A7EE-D7A0D7096518}"/>
+              </a:ext>
+            </a:extLst>
+          </p:cNvPr>
+          <p:cNvPicPr>
+            <a:picLocks noChangeAspect="1"/>
+          </p:cNvPicPr>
+          <p:nvPr/>
+        </p:nvPicPr>
+        <p:blipFill>
+          <a:blip r:embed="rId4"/>
+          <a:stretch>
+            <a:fillRect/>
+          </a:stretch>
+        </p:blipFill>
+        <p:spPr>
+          <a:xfrm>
+            <a:off x="4324837" y="1997361"/>
+            <a:ext cx="4974336" cy="1803196"/>
+          </a:xfrm>
+          <a:prstGeom prst="rect">
+            <a:avLst/>
+          </a:prstGeom>
+        </p:spPr>
+      </p:pic>
+      <p:sp>
+        <p:nvSpPr>
+          <p:cNvPr id="6" name="TextBox 5">
+            <a:extLst>
+              <a:ext uri="{FF2B5EF4-FFF2-40B4-BE49-F238E27FC236}">
+                <a16:creationId xmlns:a16="http://schemas.microsoft.com/office/drawing/2014/main" id="{8E93F844-83AD-F147-852E-791EB246F713}"/>
+              </a:ext>
+            </a:extLst>
+          </p:cNvPr>
+          <p:cNvSpPr txBox="1"/>
+          <p:nvPr/>
+        </p:nvSpPr>
+        <p:spPr>
+          <a:xfrm>
+            <a:off x="4652888" y="1628029"/>
+            <a:ext cx="2159117" cy="369332"/>
+          </a:xfrm>
+          <a:prstGeom prst="rect">
+            <a:avLst/>
+          </a:prstGeom>
+          <a:noFill/>
+        </p:spPr>
+        <p:txBody>
+          <a:bodyPr wrap="none" rtlCol="0">
+            <a:spAutoFit/>
+          </a:bodyPr>
           <a:lstStyle/>
           <a:p>
             <a:r>
               <a:rPr lang="en-US" dirty="0"/>
-              <a:t>Hand enter all data missing IBU and ABV</a:t>
-            </a:r>
-          </a:p>
+              <a:t>Before IBU Imputation</a:t>
+            </a:r>
+          </a:p>
+        </p:txBody>
+      </p:sp>
+      <p:sp>
+        <p:nvSpPr>
+          <p:cNvPr id="7" name="TextBox 6">
+            <a:extLst>
+              <a:ext uri="{FF2B5EF4-FFF2-40B4-BE49-F238E27FC236}">
+                <a16:creationId xmlns:a16="http://schemas.microsoft.com/office/drawing/2014/main" id="{98915DF3-7D6A-DC44-A756-02648D666FB3}"/>
+              </a:ext>
+            </a:extLst>
+          </p:cNvPr>
+          <p:cNvSpPr txBox="1"/>
+          <p:nvPr/>
+        </p:nvSpPr>
+        <p:spPr>
+          <a:xfrm>
+            <a:off x="4620733" y="4083704"/>
+            <a:ext cx="2091214" cy="646331"/>
+          </a:xfrm>
+          <a:prstGeom prst="rect">
+            <a:avLst/>
+          </a:prstGeom>
+          <a:noFill/>
+        </p:spPr>
+        <p:txBody>
+          <a:bodyPr wrap="none" rtlCol="0">
+            <a:spAutoFit/>
+          </a:bodyPr>
+          <a:lstStyle/>
           <a:p>
             <a:r>
               <a:rPr lang="en-US" dirty="0"/>
-              <a:t>Drop entries missing both IBU and ABV with no data online </a:t>
-            </a:r>
-          </a:p>
-          <a:p>
+              <a:t>After IBU Imputation</a:t>
+            </a:r>
+          </a:p>
+          <a:p>
+            <a:endParaRPr lang="en-US" dirty="0"/>
+          </a:p>
+        </p:txBody>
+      </p:sp>
+      <p:sp>
+        <p:nvSpPr>
+          <p:cNvPr id="14" name="TextBox 13">
+            <a:extLst>
+              <a:ext uri="{FF2B5EF4-FFF2-40B4-BE49-F238E27FC236}">
+                <a16:creationId xmlns:a16="http://schemas.microsoft.com/office/drawing/2014/main" id="{D7A6B74F-B316-4643-BB2C-5F43B5DCE9BE}"/>
+              </a:ext>
+            </a:extLst>
+          </p:cNvPr>
+          <p:cNvSpPr txBox="1"/>
+          <p:nvPr/>
+        </p:nvSpPr>
+        <p:spPr>
+          <a:xfrm>
+            <a:off x="233652" y="1942728"/>
+            <a:ext cx="4139018" cy="369332"/>
+          </a:xfrm>
+          <a:prstGeom prst="rect">
+            <a:avLst/>
+          </a:prstGeom>
+          <a:noFill/>
+        </p:spPr>
+        <p:txBody>
+          <a:bodyPr wrap="square" rtlCol="0">
+            <a:spAutoFit/>
+          </a:bodyPr>
+          <a:lstStyle/>
+          <a:p>
+            <a:pPr marL="285750" indent="-285750">
+              <a:buFont typeface="Arial" panose="020B0604020202020204" pitchFamily="34" charset="0"/>
+              <a:buChar char="•"/>
+            </a:pPr>
             <a:r>
               <a:rPr lang="en-US" dirty="0"/>
-              <a:t>Impute IBU based on Median IBU by style for entries that ONLY lack IBU data. </a:t>
+              <a:t>Impute via the median IBU per style… </a:t>
             </a:r>
           </a:p>
         </p:txBody>
@@ -7813,7 +7573,7 @@
     </p:spTree>
     <p:extLst>
       <p:ext uri="{BB962C8B-B14F-4D97-AF65-F5344CB8AC3E}">
-        <p14:creationId xmlns:p14="http://schemas.microsoft.com/office/powerpoint/2010/main" val="2686119804"/>
+        <p14:creationId xmlns:p14="http://schemas.microsoft.com/office/powerpoint/2010/main" val="3419396976"/>
       </p:ext>
     </p:extLst>
   </p:cSld>
@@ -7845,7 +7605,7 @@
           <p:cNvPr id="2" name="Title 1">
             <a:extLst>
               <a:ext uri="{FF2B5EF4-FFF2-40B4-BE49-F238E27FC236}">
-                <a16:creationId xmlns:a16="http://schemas.microsoft.com/office/drawing/2014/main" id="{6BFE0BAC-2DF6-2B45-B347-BB2D7CF6A8DC}"/>
+                <a16:creationId xmlns:a16="http://schemas.microsoft.com/office/drawing/2014/main" id="{33CE4418-39BC-8C41-86AB-4B606F648865}"/>
               </a:ext>
             </a:extLst>
           </p:cNvPr>
@@ -7863,140 +7623,49 @@
           <a:p>
             <a:r>
               <a:rPr lang="en-US" dirty="0"/>
-              <a:t>Missing Data: Hand Entry</a:t>
-            </a:r>
-          </a:p>
-        </p:txBody>
-      </p:sp>
-      <p:sp>
-        <p:nvSpPr>
-          <p:cNvPr id="3" name="Content Placeholder 2">
-            <a:extLst>
-              <a:ext uri="{FF2B5EF4-FFF2-40B4-BE49-F238E27FC236}">
-                <a16:creationId xmlns:a16="http://schemas.microsoft.com/office/drawing/2014/main" id="{D04AFAB5-0330-E341-BDA1-14A3CA7380FF}"/>
-              </a:ext>
-            </a:extLst>
-          </p:cNvPr>
-          <p:cNvSpPr>
-            <a:spLocks noGrp="1"/>
-          </p:cNvSpPr>
+              <a:t>Median ABV by State</a:t>
+            </a:r>
+          </a:p>
+        </p:txBody>
+      </p:sp>
+      <p:pic>
+        <p:nvPicPr>
+          <p:cNvPr id="7" name="Content Placeholder 6" descr="Chart, bar chart&#10;&#10;Description automatically generated">
+            <a:extLst>
+              <a:ext uri="{FF2B5EF4-FFF2-40B4-BE49-F238E27FC236}">
+                <a16:creationId xmlns:a16="http://schemas.microsoft.com/office/drawing/2014/main" id="{F6B83784-9DC2-4902-8DA3-7F07A229F54F}"/>
+              </a:ext>
+            </a:extLst>
+          </p:cNvPr>
+          <p:cNvPicPr>
+            <a:picLocks noGrp="1" noChangeAspect="1"/>
+          </p:cNvPicPr>
           <p:nvPr>
             <p:ph idx="1"/>
           </p:nvPr>
-        </p:nvSpPr>
+        </p:nvPicPr>
+        <p:blipFill rotWithShape="1">
+          <a:blip r:embed="rId3">
+            <a:extLst>
+              <a:ext uri="{28A0092B-C50C-407E-A947-70E740481C1C}">
+                <a14:useLocalDpi xmlns:a14="http://schemas.microsoft.com/office/drawing/2010/main" val="0"/>
+              </a:ext>
+            </a:extLst>
+          </a:blip>
+          <a:srcRect t="450" r="186"/>
+          <a:stretch/>
+        </p:blipFill>
         <p:spPr>
           <a:xfrm>
-            <a:off x="838200" y="1710231"/>
-            <a:ext cx="10515600" cy="4351338"/>
+            <a:off x="1397690" y="1498851"/>
+            <a:ext cx="9396620" cy="5232917"/>
           </a:xfrm>
         </p:spPr>
-        <p:txBody>
-          <a:bodyPr>
-            <a:normAutofit fontScale="70000" lnSpcReduction="20000"/>
-          </a:bodyPr>
-          <a:lstStyle/>
-          <a:p>
-            <a:pPr marL="0" indent="0">
-              <a:buNone/>
-            </a:pPr>
-            <a:r>
-              <a:rPr lang="en-US" dirty="0"/>
-              <a:t>No data was found and thus entries with missing data are dropped for: </a:t>
-            </a:r>
-          </a:p>
-          <a:p>
-            <a:r>
-              <a:rPr lang="en-US" dirty="0"/>
-              <a:t>Cedar Creek - Special Release is ambiguous, missing ABV/IBU/Style it does not solve the QOI.</a:t>
-            </a:r>
-          </a:p>
-          <a:p>
-            <a:r>
-              <a:rPr lang="en-US" dirty="0"/>
-              <a:t>Oskar Blues Brewery - The </a:t>
-            </a:r>
-            <a:r>
-              <a:rPr lang="en-US" dirty="0" err="1"/>
-              <a:t>Crowler</a:t>
-            </a:r>
-            <a:r>
-              <a:rPr lang="en-US" dirty="0"/>
-              <a:t> is not an actual beer but a type of can.</a:t>
-            </a:r>
-          </a:p>
-          <a:p>
-            <a:r>
-              <a:rPr lang="en-US" dirty="0"/>
-              <a:t>Oskar Blues Brewery - </a:t>
-            </a:r>
-            <a:r>
-              <a:rPr lang="en-US" dirty="0" err="1"/>
-              <a:t>Can’d</a:t>
-            </a:r>
-            <a:r>
-              <a:rPr lang="en-US" dirty="0"/>
-              <a:t> aid foundation is a relief effort that sends water so it does not fit in the dataset.</a:t>
-            </a:r>
-          </a:p>
-          <a:p>
-            <a:r>
-              <a:rPr lang="en-US" dirty="0"/>
-              <a:t>Beer ID 2364, Royal Lager of Weston Brewing has no ABV/IBU.</a:t>
-            </a:r>
-          </a:p>
-          <a:p>
-            <a:r>
-              <a:rPr lang="en-US" dirty="0"/>
-              <a:t>Beer ID 2322,  Fort Pitt Brewing Company Fort Pitt Ale.</a:t>
-            </a:r>
-          </a:p>
-          <a:p>
-            <a:r>
-              <a:rPr lang="en-US" dirty="0"/>
-              <a:t>Beer ID 1750, Oskar Blues Brewery Birth IPA.</a:t>
-            </a:r>
-          </a:p>
-          <a:p>
-            <a:r>
-              <a:rPr lang="en-US" dirty="0"/>
-              <a:t>Beer ID 710, no data.</a:t>
-            </a:r>
-          </a:p>
-          <a:p>
-            <a:r>
-              <a:rPr lang="en-US" dirty="0"/>
-              <a:t>Beer ID 273, </a:t>
-            </a:r>
-            <a:r>
-              <a:rPr lang="en-US" dirty="0" err="1"/>
-              <a:t>MillKing</a:t>
-            </a:r>
-            <a:r>
-              <a:rPr lang="en-US" dirty="0"/>
-              <a:t> It Productions AXL Pale Ale, out of business no info.</a:t>
-            </a:r>
-          </a:p>
-          <a:p>
-            <a:r>
-              <a:rPr lang="en-US" dirty="0"/>
-              <a:t>Beer ID 1095, no data.</a:t>
-            </a:r>
-          </a:p>
-          <a:p>
-            <a:r>
-              <a:rPr lang="en-US" dirty="0"/>
-              <a:t>Beer ID 963, no data.</a:t>
-            </a:r>
-          </a:p>
-          <a:p>
-            <a:endParaRPr lang="en-US" dirty="0"/>
-          </a:p>
-        </p:txBody>
-      </p:sp>
+      </p:pic>
     </p:spTree>
     <p:extLst>
       <p:ext uri="{BB962C8B-B14F-4D97-AF65-F5344CB8AC3E}">
-        <p14:creationId xmlns:p14="http://schemas.microsoft.com/office/powerpoint/2010/main" val="550357753"/>
+        <p14:creationId xmlns:p14="http://schemas.microsoft.com/office/powerpoint/2010/main" val="382088822"/>
       </p:ext>
     </p:extLst>
   </p:cSld>
@@ -8028,7 +7697,7 @@
           <p:cNvPr id="2" name="Title 1">
             <a:extLst>
               <a:ext uri="{FF2B5EF4-FFF2-40B4-BE49-F238E27FC236}">
-                <a16:creationId xmlns:a16="http://schemas.microsoft.com/office/drawing/2014/main" id="{97E01514-23C4-BB46-82C6-B8B4857D3625}"/>
+                <a16:creationId xmlns:a16="http://schemas.microsoft.com/office/drawing/2014/main" id="{9E0F04AD-A2D8-0B4E-B07B-494AB3A47290}"/>
               </a:ext>
             </a:extLst>
           </p:cNvPr>
@@ -8046,17 +7715,17 @@
           <a:p>
             <a:r>
               <a:rPr lang="en-US" dirty="0"/>
-              <a:t>Missing Data: IBU Imputation </a:t>
+              <a:t>Median IBU by State</a:t>
             </a:r>
           </a:p>
         </p:txBody>
       </p:sp>
       <p:pic>
         <p:nvPicPr>
-          <p:cNvPr id="4" name="Content Placeholder 3">
-            <a:extLst>
-              <a:ext uri="{FF2B5EF4-FFF2-40B4-BE49-F238E27FC236}">
-                <a16:creationId xmlns:a16="http://schemas.microsoft.com/office/drawing/2014/main" id="{6CE8CEF7-59D6-9B43-A414-FF6B13FF099A}"/>
+          <p:cNvPr id="7" name="Content Placeholder 6" descr="Chart, histogram&#10;&#10;Description automatically generated">
+            <a:extLst>
+              <a:ext uri="{FF2B5EF4-FFF2-40B4-BE49-F238E27FC236}">
+                <a16:creationId xmlns:a16="http://schemas.microsoft.com/office/drawing/2014/main" id="{2A93BF9F-E082-4A82-8FD6-BC0C76BC82A0}"/>
               </a:ext>
             </a:extLst>
           </p:cNvPr>
@@ -8067,168 +7736,28 @@
             <p:ph idx="1"/>
           </p:nvPr>
         </p:nvPicPr>
-        <p:blipFill>
-          <a:blip r:embed="rId2"/>
-          <a:stretch>
-            <a:fillRect/>
-          </a:stretch>
+        <p:blipFill rotWithShape="1">
+          <a:blip r:embed="rId3">
+            <a:extLst>
+              <a:ext uri="{28A0092B-C50C-407E-A947-70E740481C1C}">
+                <a14:useLocalDpi xmlns:a14="http://schemas.microsoft.com/office/drawing/2010/main" val="0"/>
+              </a:ext>
+            </a:extLst>
+          </a:blip>
+          <a:srcRect t="598"/>
+          <a:stretch/>
         </p:blipFill>
         <p:spPr>
           <a:xfrm>
-            <a:off x="6032524" y="4506760"/>
-            <a:ext cx="4983948" cy="1986115"/>
+            <a:off x="1386840" y="1394459"/>
+            <a:ext cx="9418320" cy="5228699"/>
           </a:xfrm>
-          <a:prstGeom prst="rect">
-            <a:avLst/>
-          </a:prstGeom>
         </p:spPr>
       </p:pic>
-      <p:pic>
-        <p:nvPicPr>
-          <p:cNvPr id="5" name="Picture 4">
-            <a:extLst>
-              <a:ext uri="{FF2B5EF4-FFF2-40B4-BE49-F238E27FC236}">
-                <a16:creationId xmlns:a16="http://schemas.microsoft.com/office/drawing/2014/main" id="{2C4381EC-D1A5-B440-A7EE-D7A0D7096518}"/>
-              </a:ext>
-            </a:extLst>
-          </p:cNvPr>
-          <p:cNvPicPr>
-            <a:picLocks noChangeAspect="1"/>
-          </p:cNvPicPr>
-          <p:nvPr/>
-        </p:nvPicPr>
-        <p:blipFill>
-          <a:blip r:embed="rId3"/>
-          <a:stretch>
-            <a:fillRect/>
-          </a:stretch>
-        </p:blipFill>
-        <p:spPr>
-          <a:xfrm>
-            <a:off x="6032524" y="1942728"/>
-            <a:ext cx="4974336" cy="1803196"/>
-          </a:xfrm>
-          <a:prstGeom prst="rect">
-            <a:avLst/>
-          </a:prstGeom>
-        </p:spPr>
-      </p:pic>
-      <p:sp>
-        <p:nvSpPr>
-          <p:cNvPr id="6" name="TextBox 5">
-            <a:extLst>
-              <a:ext uri="{FF2B5EF4-FFF2-40B4-BE49-F238E27FC236}">
-                <a16:creationId xmlns:a16="http://schemas.microsoft.com/office/drawing/2014/main" id="{8E93F844-83AD-F147-852E-791EB246F713}"/>
-              </a:ext>
-            </a:extLst>
-          </p:cNvPr>
-          <p:cNvSpPr txBox="1"/>
-          <p:nvPr/>
-        </p:nvSpPr>
-        <p:spPr>
-          <a:xfrm>
-            <a:off x="7187889" y="1573396"/>
-            <a:ext cx="2159117" cy="369332"/>
-          </a:xfrm>
-          <a:prstGeom prst="rect">
-            <a:avLst/>
-          </a:prstGeom>
-          <a:noFill/>
-        </p:spPr>
-        <p:txBody>
-          <a:bodyPr wrap="none" rtlCol="0">
-            <a:spAutoFit/>
-          </a:bodyPr>
-          <a:lstStyle/>
-          <a:p>
-            <a:r>
-              <a:rPr lang="en-US" dirty="0"/>
-              <a:t>Before IBU Imputation</a:t>
-            </a:r>
-          </a:p>
-        </p:txBody>
-      </p:sp>
-      <p:sp>
-        <p:nvSpPr>
-          <p:cNvPr id="7" name="TextBox 6">
-            <a:extLst>
-              <a:ext uri="{FF2B5EF4-FFF2-40B4-BE49-F238E27FC236}">
-                <a16:creationId xmlns:a16="http://schemas.microsoft.com/office/drawing/2014/main" id="{98915DF3-7D6A-DC44-A756-02648D666FB3}"/>
-              </a:ext>
-            </a:extLst>
-          </p:cNvPr>
-          <p:cNvSpPr txBox="1"/>
-          <p:nvPr/>
-        </p:nvSpPr>
-        <p:spPr>
-          <a:xfrm>
-            <a:off x="6975647" y="4112469"/>
-            <a:ext cx="2091214" cy="646331"/>
-          </a:xfrm>
-          <a:prstGeom prst="rect">
-            <a:avLst/>
-          </a:prstGeom>
-          <a:noFill/>
-        </p:spPr>
-        <p:txBody>
-          <a:bodyPr wrap="none" rtlCol="0">
-            <a:spAutoFit/>
-          </a:bodyPr>
-          <a:lstStyle/>
-          <a:p>
-            <a:r>
-              <a:rPr lang="en-US" dirty="0"/>
-              <a:t>After IBU Imputation</a:t>
-            </a:r>
-          </a:p>
-          <a:p>
-            <a:endParaRPr lang="en-US" dirty="0"/>
-          </a:p>
-        </p:txBody>
-      </p:sp>
-      <p:sp>
-        <p:nvSpPr>
-          <p:cNvPr id="14" name="TextBox 13">
-            <a:extLst>
-              <a:ext uri="{FF2B5EF4-FFF2-40B4-BE49-F238E27FC236}">
-                <a16:creationId xmlns:a16="http://schemas.microsoft.com/office/drawing/2014/main" id="{D7A6B74F-B316-4643-BB2C-5F43B5DCE9BE}"/>
-              </a:ext>
-            </a:extLst>
-          </p:cNvPr>
-          <p:cNvSpPr txBox="1"/>
-          <p:nvPr/>
-        </p:nvSpPr>
-        <p:spPr>
-          <a:xfrm>
-            <a:off x="969579" y="2120462"/>
-            <a:ext cx="4139018" cy="369332"/>
-          </a:xfrm>
-          <a:prstGeom prst="rect">
-            <a:avLst/>
-          </a:prstGeom>
-          <a:noFill/>
-        </p:spPr>
-        <p:txBody>
-          <a:bodyPr wrap="square" rtlCol="0">
-            <a:spAutoFit/>
-          </a:bodyPr>
-          <a:lstStyle/>
-          <a:p>
-            <a:pPr marL="285750" indent="-285750">
-              <a:buFont typeface="Arial" panose="020B0604020202020204" pitchFamily="34" charset="0"/>
-              <a:buChar char="•"/>
-            </a:pPr>
-            <a:r>
-              <a:rPr lang="en-US" dirty="0"/>
-              <a:t>Impute via the median IBU per style… </a:t>
-            </a:r>
-          </a:p>
-        </p:txBody>
-      </p:sp>
     </p:spTree>
     <p:extLst>
       <p:ext uri="{BB962C8B-B14F-4D97-AF65-F5344CB8AC3E}">
-        <p14:creationId xmlns:p14="http://schemas.microsoft.com/office/powerpoint/2010/main" val="3419396976"/>
+        <p14:creationId xmlns:p14="http://schemas.microsoft.com/office/powerpoint/2010/main" val="350394267"/>
       </p:ext>
     </p:extLst>
   </p:cSld>

</xml_diff>

<commit_message>
fix: powerpoint slim down
</commit_message>
<xml_diff>
--- a/Beers_and_Breweries.pptx
+++ b/Beers_and_Breweries.pptx
@@ -527,12 +527,6 @@
           <a:bodyPr/>
           <a:lstStyle/>
           <a:p>
-            <a:r>
-              <a:rPr lang="en-US" dirty="0"/>
-              <a:t>voice inflection, Name introduction</a:t>
-            </a:r>
-          </a:p>
-          <a:p>
             <a:endParaRPr lang="en-US" dirty="0"/>
           </a:p>
         </p:txBody>
@@ -1564,7 +1558,7 @@
             </a:r>
             <a:r>
               <a:rPr lang="en-US"/>
-              <a:t>to asses </a:t>
+              <a:t>to assess </a:t>
             </a:r>
             <a:r>
               <a:rPr lang="en-US" dirty="0"/>
@@ -2210,7 +2204,10 @@
           <a:bodyPr/>
           <a:lstStyle/>
           <a:p>
-            <a:endParaRPr lang="en-US" dirty="0"/>
+            <a:r>
+              <a:rPr lang="en-US" dirty="0"/>
+              <a:t>As you can see, after imputation the median and mean IBU values drop slightly, but this effect is somewhat negligible. We proceeded with our imputed IBU values. </a:t>
+            </a:r>
           </a:p>
         </p:txBody>
       </p:sp>

</xml_diff>